<commit_message>
Fixing typos and presentation
</commit_message>
<xml_diff>
--- a/docs/Prezentacija diplomskog rada.pptx
+++ b/docs/Prezentacija diplomskog rada.pptx
@@ -11,13 +11,13 @@
     <p:sldId id="259" r:id="rId5"/>
     <p:sldId id="262" r:id="rId6"/>
     <p:sldId id="260" r:id="rId7"/>
-    <p:sldId id="263" r:id="rId8"/>
-    <p:sldId id="265" r:id="rId9"/>
-    <p:sldId id="266" r:id="rId10"/>
-    <p:sldId id="269" r:id="rId11"/>
-    <p:sldId id="267" r:id="rId12"/>
-    <p:sldId id="268" r:id="rId13"/>
-    <p:sldId id="270" r:id="rId14"/>
+    <p:sldId id="271" r:id="rId8"/>
+    <p:sldId id="263" r:id="rId9"/>
+    <p:sldId id="265" r:id="rId10"/>
+    <p:sldId id="266" r:id="rId11"/>
+    <p:sldId id="269" r:id="rId12"/>
+    <p:sldId id="267" r:id="rId13"/>
+    <p:sldId id="268" r:id="rId14"/>
     <p:sldId id="264" r:id="rId15"/>
     <p:sldId id="261" r:id="rId16"/>
   </p:sldIdLst>
@@ -118,6 +118,11 @@
       </a:defRPr>
     </a:lvl9pPr>
   </p:defaultTextStyle>
+  <p:extLst>
+    <p:ext uri="{EFAFB233-063F-42B5-8137-9DF3F51BA10A}">
+      <p15:sldGuideLst xmlns:p15="http://schemas.microsoft.com/office/powerpoint/2012/main"/>
+    </p:ext>
+  </p:extLst>
 </p:presentation>
 </file>
 
@@ -347,7 +352,7 @@
           <a:p>
             <a:fld id="{D95769E4-9C45-4562-9034-D558FA4342B8}" type="datetimeFigureOut">
               <a:rPr lang="sr-Latn-RS" smtClean="0"/>
-              <a:t>10.1.2021.</a:t>
+              <a:t>13.1.2021.</a:t>
             </a:fld>
             <a:endParaRPr lang="sr-Latn-RS"/>
           </a:p>
@@ -555,7 +560,7 @@
           <a:p>
             <a:fld id="{D95769E4-9C45-4562-9034-D558FA4342B8}" type="datetimeFigureOut">
               <a:rPr lang="sr-Latn-RS" smtClean="0"/>
-              <a:t>10.1.2021.</a:t>
+              <a:t>13.1.2021.</a:t>
             </a:fld>
             <a:endParaRPr lang="sr-Latn-RS"/>
           </a:p>
@@ -811,7 +816,7 @@
           <a:p>
             <a:fld id="{D95769E4-9C45-4562-9034-D558FA4342B8}" type="datetimeFigureOut">
               <a:rPr lang="sr-Latn-RS" smtClean="0"/>
-              <a:t>10.1.2021.</a:t>
+              <a:t>13.1.2021.</a:t>
             </a:fld>
             <a:endParaRPr lang="sr-Latn-RS"/>
           </a:p>
@@ -985,7 +990,7 @@
           <a:p>
             <a:fld id="{D95769E4-9C45-4562-9034-D558FA4342B8}" type="datetimeFigureOut">
               <a:rPr lang="sr-Latn-RS" smtClean="0"/>
-              <a:t>10.1.2021.</a:t>
+              <a:t>13.1.2021.</a:t>
             </a:fld>
             <a:endParaRPr lang="sr-Latn-RS"/>
           </a:p>
@@ -1328,7 +1333,7 @@
           <a:p>
             <a:fld id="{D95769E4-9C45-4562-9034-D558FA4342B8}" type="datetimeFigureOut">
               <a:rPr lang="sr-Latn-RS" smtClean="0"/>
-              <a:t>10.1.2021.</a:t>
+              <a:t>13.1.2021.</a:t>
             </a:fld>
             <a:endParaRPr lang="sr-Latn-RS"/>
           </a:p>
@@ -1603,7 +1608,7 @@
           <a:p>
             <a:fld id="{D95769E4-9C45-4562-9034-D558FA4342B8}" type="datetimeFigureOut">
               <a:rPr lang="sr-Latn-RS" smtClean="0"/>
-              <a:t>10.1.2021.</a:t>
+              <a:t>13.1.2021.</a:t>
             </a:fld>
             <a:endParaRPr lang="sr-Latn-RS"/>
           </a:p>
@@ -1982,7 +1987,7 @@
           <a:p>
             <a:fld id="{D95769E4-9C45-4562-9034-D558FA4342B8}" type="datetimeFigureOut">
               <a:rPr lang="sr-Latn-RS" smtClean="0"/>
-              <a:t>10.1.2021.</a:t>
+              <a:t>13.1.2021.</a:t>
             </a:fld>
             <a:endParaRPr lang="sr-Latn-RS"/>
           </a:p>
@@ -2100,7 +2105,7 @@
           <a:p>
             <a:fld id="{D95769E4-9C45-4562-9034-D558FA4342B8}" type="datetimeFigureOut">
               <a:rPr lang="sr-Latn-RS" smtClean="0"/>
-              <a:t>10.1.2021.</a:t>
+              <a:t>13.1.2021.</a:t>
             </a:fld>
             <a:endParaRPr lang="sr-Latn-RS"/>
           </a:p>
@@ -2271,7 +2276,7 @@
           <a:p>
             <a:fld id="{D95769E4-9C45-4562-9034-D558FA4342B8}" type="datetimeFigureOut">
               <a:rPr lang="sr-Latn-RS" smtClean="0"/>
-              <a:t>10.1.2021.</a:t>
+              <a:t>13.1.2021.</a:t>
             </a:fld>
             <a:endParaRPr lang="sr-Latn-RS"/>
           </a:p>
@@ -2625,7 +2630,7 @@
           <a:p>
             <a:fld id="{D95769E4-9C45-4562-9034-D558FA4342B8}" type="datetimeFigureOut">
               <a:rPr lang="sr-Latn-RS" smtClean="0"/>
-              <a:t>10.1.2021.</a:t>
+              <a:t>13.1.2021.</a:t>
             </a:fld>
             <a:endParaRPr lang="sr-Latn-RS"/>
           </a:p>
@@ -3007,7 +3012,7 @@
           <a:p>
             <a:fld id="{D95769E4-9C45-4562-9034-D558FA4342B8}" type="datetimeFigureOut">
               <a:rPr lang="sr-Latn-RS" smtClean="0"/>
-              <a:t>10.1.2021.</a:t>
+              <a:t>13.1.2021.</a:t>
             </a:fld>
             <a:endParaRPr lang="sr-Latn-RS"/>
           </a:p>
@@ -3294,7 +3299,7 @@
           <a:p>
             <a:fld id="{D95769E4-9C45-4562-9034-D558FA4342B8}" type="datetimeFigureOut">
               <a:rPr lang="sr-Latn-RS" smtClean="0"/>
-              <a:t>10.1.2021.</a:t>
+              <a:t>13.1.2021.</a:t>
             </a:fld>
             <a:endParaRPr lang="sr-Latn-RS"/>
           </a:p>
@@ -3932,7 +3937,7 @@
         <p:spPr>
           <a:xfrm>
             <a:off x="9465076" y="4625265"/>
-            <a:ext cx="1836198" cy="646331"/>
+            <a:ext cx="1836198" cy="923330"/>
           </a:xfrm>
           <a:prstGeom prst="rect">
             <a:avLst/>
@@ -3962,6 +3967,16 @@
                 </a:solidFill>
               </a:rPr>
               <a:t>Toma Joksimović</a:t>
+            </a:r>
+          </a:p>
+          <a:p>
+            <a:r>
+              <a:rPr lang="sr-Latn-RS" dirty="0">
+                <a:solidFill>
+                  <a:schemeClr val="accent2"/>
+                </a:solidFill>
+              </a:rPr>
+              <a:t>2016201222</a:t>
             </a:r>
           </a:p>
         </p:txBody>
@@ -4001,7 +4016,7 @@
           <p:cNvPr id="2" name="TextBox 1">
             <a:extLst>
               <a:ext uri="{FF2B5EF4-FFF2-40B4-BE49-F238E27FC236}">
-                <a16:creationId xmlns:a16="http://schemas.microsoft.com/office/drawing/2014/main" id="{7D3AA088-3C33-4CC3-917C-6A3D52DECAE7}"/>
+                <a16:creationId xmlns:a16="http://schemas.microsoft.com/office/drawing/2014/main" id="{5BEBD908-5EE6-474B-936D-86D8322C6E6E}"/>
               </a:ext>
             </a:extLst>
           </p:cNvPr>
@@ -4011,7 +4026,7 @@
         <p:spPr>
           <a:xfrm>
             <a:off x="577048" y="186430"/>
-            <a:ext cx="3421771" cy="584775"/>
+            <a:ext cx="6762044" cy="584775"/>
           </a:xfrm>
           <a:prstGeom prst="rect">
             <a:avLst/>
@@ -4030,7 +4045,7 @@
                   <a:schemeClr val="accent2"/>
                 </a:solidFill>
               </a:rPr>
-              <a:t>Unakrsna </a:t>
+              <a:t>Obučavanje </a:t>
             </a:r>
             <a:r>
               <a:rPr lang="sr-Latn-RS" sz="3200" dirty="0" err="1">
@@ -4038,9 +4053,1120 @@
                   <a:schemeClr val="accent2"/>
                 </a:solidFill>
               </a:rPr>
-              <a:t>Validacija</a:t>
-            </a:r>
-            <a:endParaRPr lang="sr-Latn-RS" sz="3200" dirty="0">
+              <a:t>Gradijentnim</a:t>
+            </a:r>
+            <a:r>
+              <a:rPr lang="sr-Latn-RS" sz="3200" dirty="0">
+                <a:solidFill>
+                  <a:schemeClr val="accent2"/>
+                </a:solidFill>
+              </a:rPr>
+              <a:t> Podsticanjem</a:t>
+            </a:r>
+          </a:p>
+        </p:txBody>
+      </p:sp>
+      <p:pic>
+        <p:nvPicPr>
+          <p:cNvPr id="3" name="Picture 2">
+            <a:extLst>
+              <a:ext uri="{FF2B5EF4-FFF2-40B4-BE49-F238E27FC236}">
+                <a16:creationId xmlns:a16="http://schemas.microsoft.com/office/drawing/2014/main" id="{9F20C856-F98B-4486-97EF-17B8466A6258}"/>
+              </a:ext>
+            </a:extLst>
+          </p:cNvPr>
+          <p:cNvPicPr>
+            <a:picLocks noChangeAspect="1"/>
+          </p:cNvPicPr>
+          <p:nvPr/>
+        </p:nvPicPr>
+        <p:blipFill>
+          <a:blip r:embed="rId2"/>
+          <a:stretch>
+            <a:fillRect/>
+          </a:stretch>
+        </p:blipFill>
+        <p:spPr>
+          <a:xfrm>
+            <a:off x="546820" y="4633670"/>
+            <a:ext cx="9429713" cy="764815"/>
+          </a:xfrm>
+          <a:prstGeom prst="rect">
+            <a:avLst/>
+          </a:prstGeom>
+          <a:ln w="12700">
+            <a:solidFill>
+              <a:schemeClr val="accent2"/>
+            </a:solidFill>
+          </a:ln>
+        </p:spPr>
+      </p:pic>
+      <p:pic>
+        <p:nvPicPr>
+          <p:cNvPr id="4" name="Picture 3">
+            <a:extLst>
+              <a:ext uri="{FF2B5EF4-FFF2-40B4-BE49-F238E27FC236}">
+                <a16:creationId xmlns:a16="http://schemas.microsoft.com/office/drawing/2014/main" id="{A4688F1D-1A78-4920-AEE4-617CC0D960D7}"/>
+              </a:ext>
+            </a:extLst>
+          </p:cNvPr>
+          <p:cNvPicPr>
+            <a:picLocks noChangeAspect="1"/>
+          </p:cNvPicPr>
+          <p:nvPr/>
+        </p:nvPicPr>
+        <p:blipFill>
+          <a:blip r:embed="rId3"/>
+          <a:stretch>
+            <a:fillRect/>
+          </a:stretch>
+        </p:blipFill>
+        <p:spPr>
+          <a:xfrm>
+            <a:off x="552487" y="5585327"/>
+            <a:ext cx="4599989" cy="442611"/>
+          </a:xfrm>
+          <a:prstGeom prst="rect">
+            <a:avLst/>
+          </a:prstGeom>
+          <a:ln w="12700">
+            <a:solidFill>
+              <a:schemeClr val="accent2"/>
+            </a:solidFill>
+          </a:ln>
+        </p:spPr>
+      </p:pic>
+      <mc:AlternateContent xmlns:mc="http://schemas.openxmlformats.org/markup-compatibility/2006">
+        <mc:Choice xmlns:a14="http://schemas.microsoft.com/office/drawing/2010/main" Requires="a14">
+          <p:sp>
+            <p:nvSpPr>
+              <p:cNvPr id="6" name="TextBox 5">
+                <a:extLst>
+                  <a:ext uri="{FF2B5EF4-FFF2-40B4-BE49-F238E27FC236}">
+                    <a16:creationId xmlns:a16="http://schemas.microsoft.com/office/drawing/2014/main" id="{0A8E4D82-6CD0-4F49-9DBD-A4E77F641D00}"/>
+                  </a:ext>
+                </a:extLst>
+              </p:cNvPr>
+              <p:cNvSpPr txBox="1"/>
+              <p:nvPr/>
+            </p:nvSpPr>
+            <p:spPr>
+              <a:xfrm>
+                <a:off x="301837" y="3133861"/>
+                <a:ext cx="5963202" cy="576055"/>
+              </a:xfrm>
+              <a:prstGeom prst="rect">
+                <a:avLst/>
+              </a:prstGeom>
+              <a:noFill/>
+            </p:spPr>
+            <p:txBody>
+              <a:bodyPr wrap="square">
+                <a:spAutoFit/>
+              </a:bodyPr>
+              <a:lstStyle/>
+              <a:p>
+                <a:pPr/>
+                <a14:m>
+                  <m:oMathPara xmlns:m="http://schemas.openxmlformats.org/officeDocument/2006/math">
+                    <m:oMathParaPr>
+                      <m:jc m:val="centerGroup"/>
+                    </m:oMathParaPr>
+                    <m:oMath xmlns:m="http://schemas.openxmlformats.org/officeDocument/2006/math">
+                      <m:sSub>
+                        <m:sSubPr>
+                          <m:ctrlPr>
+                            <a:rPr lang="sr-Latn-RS" sz="1600" i="1" smtClean="0">
+                              <a:solidFill>
+                                <a:schemeClr val="accent2"/>
+                              </a:solidFill>
+                              <a:latin typeface="Cambria Math" panose="02040503050406030204" pitchFamily="18" charset="0"/>
+                            </a:rPr>
+                          </m:ctrlPr>
+                        </m:sSubPr>
+                        <m:e>
+                          <m:r>
+                            <a:rPr lang="sr-Latn-RS" sz="1600" i="1">
+                              <a:solidFill>
+                                <a:schemeClr val="accent2"/>
+                              </a:solidFill>
+                              <a:latin typeface="Cambria Math" panose="02040503050406030204" pitchFamily="18" charset="0"/>
+                            </a:rPr>
+                            <m:t>𝐹</m:t>
+                          </m:r>
+                        </m:e>
+                        <m:sub>
+                          <m:r>
+                            <a:rPr lang="sr-Latn-RS" sz="1600" i="1">
+                              <a:solidFill>
+                                <a:schemeClr val="accent2"/>
+                              </a:solidFill>
+                              <a:latin typeface="Cambria Math" panose="02040503050406030204" pitchFamily="18" charset="0"/>
+                            </a:rPr>
+                            <m:t>𝑚</m:t>
+                          </m:r>
+                        </m:sub>
+                      </m:sSub>
+                      <m:d>
+                        <m:dPr>
+                          <m:ctrlPr>
+                            <a:rPr lang="sr-Latn-RS" sz="1600" i="1">
+                              <a:solidFill>
+                                <a:schemeClr val="accent2"/>
+                              </a:solidFill>
+                              <a:latin typeface="Cambria Math" panose="02040503050406030204" pitchFamily="18" charset="0"/>
+                            </a:rPr>
+                          </m:ctrlPr>
+                        </m:dPr>
+                        <m:e>
+                          <m:r>
+                            <a:rPr lang="sr-Latn-RS" sz="1600" i="1">
+                              <a:solidFill>
+                                <a:schemeClr val="accent2"/>
+                              </a:solidFill>
+                              <a:latin typeface="Cambria Math" panose="02040503050406030204" pitchFamily="18" charset="0"/>
+                            </a:rPr>
+                            <m:t>𝑥</m:t>
+                          </m:r>
+                        </m:e>
+                      </m:d>
+                      <m:r>
+                        <a:rPr lang="sr-Latn-RS" sz="1600" i="0">
+                          <a:solidFill>
+                            <a:schemeClr val="accent2"/>
+                          </a:solidFill>
+                          <a:latin typeface="Cambria Math" panose="02040503050406030204" pitchFamily="18" charset="0"/>
+                        </a:rPr>
+                        <m:t>= </m:t>
+                      </m:r>
+                      <m:sSub>
+                        <m:sSubPr>
+                          <m:ctrlPr>
+                            <a:rPr lang="sr-Latn-RS" sz="1600" i="1">
+                              <a:solidFill>
+                                <a:schemeClr val="accent2"/>
+                              </a:solidFill>
+                              <a:latin typeface="Cambria Math" panose="02040503050406030204" pitchFamily="18" charset="0"/>
+                            </a:rPr>
+                          </m:ctrlPr>
+                        </m:sSubPr>
+                        <m:e>
+                          <m:r>
+                            <a:rPr lang="sr-Latn-RS" sz="1600" i="1">
+                              <a:solidFill>
+                                <a:schemeClr val="accent2"/>
+                              </a:solidFill>
+                              <a:latin typeface="Cambria Math" panose="02040503050406030204" pitchFamily="18" charset="0"/>
+                            </a:rPr>
+                            <m:t>𝐹</m:t>
+                          </m:r>
+                        </m:e>
+                        <m:sub>
+                          <m:r>
+                            <a:rPr lang="sr-Latn-RS" sz="1600" i="1">
+                              <a:solidFill>
+                                <a:schemeClr val="accent2"/>
+                              </a:solidFill>
+                              <a:latin typeface="Cambria Math" panose="02040503050406030204" pitchFamily="18" charset="0"/>
+                            </a:rPr>
+                            <m:t>𝑚</m:t>
+                          </m:r>
+                          <m:r>
+                            <a:rPr lang="sr-Latn-RS" sz="1600" i="0">
+                              <a:solidFill>
+                                <a:schemeClr val="accent2"/>
+                              </a:solidFill>
+                              <a:latin typeface="Cambria Math" panose="02040503050406030204" pitchFamily="18" charset="0"/>
+                            </a:rPr>
+                            <m:t>−1</m:t>
+                          </m:r>
+                        </m:sub>
+                      </m:sSub>
+                      <m:d>
+                        <m:dPr>
+                          <m:ctrlPr>
+                            <a:rPr lang="sr-Latn-RS" sz="1600" i="1">
+                              <a:solidFill>
+                                <a:schemeClr val="accent2"/>
+                              </a:solidFill>
+                              <a:latin typeface="Cambria Math" panose="02040503050406030204" pitchFamily="18" charset="0"/>
+                            </a:rPr>
+                          </m:ctrlPr>
+                        </m:dPr>
+                        <m:e>
+                          <m:r>
+                            <a:rPr lang="sr-Latn-RS" sz="1600" i="1">
+                              <a:solidFill>
+                                <a:schemeClr val="accent2"/>
+                              </a:solidFill>
+                              <a:latin typeface="Cambria Math" panose="02040503050406030204" pitchFamily="18" charset="0"/>
+                            </a:rPr>
+                            <m:t>𝑥</m:t>
+                          </m:r>
+                        </m:e>
+                      </m:d>
+                      <m:r>
+                        <a:rPr lang="sr-Latn-RS" sz="1600" i="0">
+                          <a:solidFill>
+                            <a:schemeClr val="accent2"/>
+                          </a:solidFill>
+                          <a:latin typeface="Cambria Math" panose="02040503050406030204" pitchFamily="18" charset="0"/>
+                        </a:rPr>
+                        <m:t>+</m:t>
+                      </m:r>
+                      <m:r>
+                        <a:rPr lang="sr-Latn-RS" sz="1600" i="1">
+                          <a:solidFill>
+                            <a:schemeClr val="accent2"/>
+                          </a:solidFill>
+                          <a:latin typeface="Cambria Math" panose="02040503050406030204" pitchFamily="18" charset="0"/>
+                        </a:rPr>
+                        <m:t>𝑎𝑟𝑔𝑚𝑖𝑛</m:t>
+                      </m:r>
+                      <m:nary>
+                        <m:naryPr>
+                          <m:chr m:val="∑"/>
+                          <m:limLoc m:val="subSup"/>
+                          <m:grow m:val="on"/>
+                          <m:ctrlPr>
+                            <a:rPr lang="sr-Latn-RS" sz="1600" i="1">
+                              <a:solidFill>
+                                <a:schemeClr val="accent2"/>
+                              </a:solidFill>
+                              <a:latin typeface="Cambria Math" panose="02040503050406030204" pitchFamily="18" charset="0"/>
+                            </a:rPr>
+                          </m:ctrlPr>
+                        </m:naryPr>
+                        <m:sub>
+                          <m:r>
+                            <a:rPr lang="sr-Latn-RS" sz="1600" i="1">
+                              <a:solidFill>
+                                <a:schemeClr val="accent2"/>
+                              </a:solidFill>
+                              <a:latin typeface="Cambria Math" panose="02040503050406030204" pitchFamily="18" charset="0"/>
+                            </a:rPr>
+                            <m:t>𝑖</m:t>
+                          </m:r>
+                          <m:r>
+                            <a:rPr lang="sr-Latn-RS" sz="1600" i="0">
+                              <a:solidFill>
+                                <a:schemeClr val="accent2"/>
+                              </a:solidFill>
+                              <a:latin typeface="Cambria Math" panose="02040503050406030204" pitchFamily="18" charset="0"/>
+                            </a:rPr>
+                            <m:t>=1</m:t>
+                          </m:r>
+                        </m:sub>
+                        <m:sup>
+                          <m:r>
+                            <a:rPr lang="sr-Latn-RS" sz="1600" i="1">
+                              <a:solidFill>
+                                <a:schemeClr val="accent2"/>
+                              </a:solidFill>
+                              <a:latin typeface="Cambria Math" panose="02040503050406030204" pitchFamily="18" charset="0"/>
+                            </a:rPr>
+                            <m:t>𝑛</m:t>
+                          </m:r>
+                        </m:sup>
+                        <m:e>
+                          <m:r>
+                            <a:rPr lang="sr-Latn-RS" sz="1600" i="1">
+                              <a:solidFill>
+                                <a:schemeClr val="accent2"/>
+                              </a:solidFill>
+                              <a:latin typeface="Cambria Math" panose="02040503050406030204" pitchFamily="18" charset="0"/>
+                            </a:rPr>
+                            <m:t>𝐿</m:t>
+                          </m:r>
+                          <m:d>
+                            <m:dPr>
+                              <m:ctrlPr>
+                                <a:rPr lang="sr-Latn-RS" sz="1600" i="1">
+                                  <a:solidFill>
+                                    <a:schemeClr val="accent2"/>
+                                  </a:solidFill>
+                                  <a:latin typeface="Cambria Math" panose="02040503050406030204" pitchFamily="18" charset="0"/>
+                                </a:rPr>
+                              </m:ctrlPr>
+                            </m:dPr>
+                            <m:e>
+                              <m:sSub>
+                                <m:sSubPr>
+                                  <m:ctrlPr>
+                                    <a:rPr lang="sr-Latn-RS" sz="1600" i="1">
+                                      <a:solidFill>
+                                        <a:schemeClr val="accent2"/>
+                                      </a:solidFill>
+                                      <a:latin typeface="Cambria Math" panose="02040503050406030204" pitchFamily="18" charset="0"/>
+                                    </a:rPr>
+                                  </m:ctrlPr>
+                                </m:sSubPr>
+                                <m:e>
+                                  <m:r>
+                                    <a:rPr lang="sr-Latn-RS" sz="1600" i="1">
+                                      <a:solidFill>
+                                        <a:schemeClr val="accent2"/>
+                                      </a:solidFill>
+                                      <a:latin typeface="Cambria Math" panose="02040503050406030204" pitchFamily="18" charset="0"/>
+                                    </a:rPr>
+                                    <m:t>𝑦</m:t>
+                                  </m:r>
+                                </m:e>
+                                <m:sub>
+                                  <m:r>
+                                    <a:rPr lang="sr-Latn-RS" sz="1600" i="1">
+                                      <a:solidFill>
+                                        <a:schemeClr val="accent2"/>
+                                      </a:solidFill>
+                                      <a:latin typeface="Cambria Math" panose="02040503050406030204" pitchFamily="18" charset="0"/>
+                                    </a:rPr>
+                                    <m:t>𝑖</m:t>
+                                  </m:r>
+                                </m:sub>
+                              </m:sSub>
+                              <m:r>
+                                <a:rPr lang="sr-Latn-RS" sz="1600" i="0">
+                                  <a:solidFill>
+                                    <a:schemeClr val="accent2"/>
+                                  </a:solidFill>
+                                  <a:latin typeface="Cambria Math" panose="02040503050406030204" pitchFamily="18" charset="0"/>
+                                </a:rPr>
+                                <m:t>,</m:t>
+                              </m:r>
+                              <m:sSub>
+                                <m:sSubPr>
+                                  <m:ctrlPr>
+                                    <a:rPr lang="sr-Latn-RS" sz="1600" i="1">
+                                      <a:solidFill>
+                                        <a:schemeClr val="accent2"/>
+                                      </a:solidFill>
+                                      <a:latin typeface="Cambria Math" panose="02040503050406030204" pitchFamily="18" charset="0"/>
+                                    </a:rPr>
+                                  </m:ctrlPr>
+                                </m:sSubPr>
+                                <m:e>
+                                  <m:r>
+                                    <a:rPr lang="sr-Latn-RS" sz="1600" i="1">
+                                      <a:solidFill>
+                                        <a:schemeClr val="accent2"/>
+                                      </a:solidFill>
+                                      <a:latin typeface="Cambria Math" panose="02040503050406030204" pitchFamily="18" charset="0"/>
+                                    </a:rPr>
+                                    <m:t>𝐹</m:t>
+                                  </m:r>
+                                </m:e>
+                                <m:sub>
+                                  <m:r>
+                                    <a:rPr lang="sr-Latn-RS" sz="1600" i="1">
+                                      <a:solidFill>
+                                        <a:schemeClr val="accent2"/>
+                                      </a:solidFill>
+                                      <a:latin typeface="Cambria Math" panose="02040503050406030204" pitchFamily="18" charset="0"/>
+                                    </a:rPr>
+                                    <m:t>𝑚</m:t>
+                                  </m:r>
+                                  <m:r>
+                                    <a:rPr lang="sr-Latn-RS" sz="1600" i="0">
+                                      <a:solidFill>
+                                        <a:schemeClr val="accent2"/>
+                                      </a:solidFill>
+                                      <a:latin typeface="Cambria Math" panose="02040503050406030204" pitchFamily="18" charset="0"/>
+                                    </a:rPr>
+                                    <m:t>−1</m:t>
+                                  </m:r>
+                                </m:sub>
+                              </m:sSub>
+                              <m:d>
+                                <m:dPr>
+                                  <m:ctrlPr>
+                                    <a:rPr lang="sr-Latn-RS" sz="1600" i="1">
+                                      <a:solidFill>
+                                        <a:schemeClr val="accent2"/>
+                                      </a:solidFill>
+                                      <a:latin typeface="Cambria Math" panose="02040503050406030204" pitchFamily="18" charset="0"/>
+                                    </a:rPr>
+                                  </m:ctrlPr>
+                                </m:dPr>
+                                <m:e>
+                                  <m:sSub>
+                                    <m:sSubPr>
+                                      <m:ctrlPr>
+                                        <a:rPr lang="sr-Latn-RS" sz="1600" i="1">
+                                          <a:solidFill>
+                                            <a:schemeClr val="accent2"/>
+                                          </a:solidFill>
+                                          <a:latin typeface="Cambria Math" panose="02040503050406030204" pitchFamily="18" charset="0"/>
+                                        </a:rPr>
+                                      </m:ctrlPr>
+                                    </m:sSubPr>
+                                    <m:e>
+                                      <m:r>
+                                        <a:rPr lang="sr-Latn-RS" sz="1600" i="1">
+                                          <a:solidFill>
+                                            <a:schemeClr val="accent2"/>
+                                          </a:solidFill>
+                                          <a:latin typeface="Cambria Math" panose="02040503050406030204" pitchFamily="18" charset="0"/>
+                                        </a:rPr>
+                                        <m:t>𝑥</m:t>
+                                      </m:r>
+                                    </m:e>
+                                    <m:sub>
+                                      <m:r>
+                                        <a:rPr lang="sr-Latn-RS" sz="1600" i="1">
+                                          <a:solidFill>
+                                            <a:schemeClr val="accent2"/>
+                                          </a:solidFill>
+                                          <a:latin typeface="Cambria Math" panose="02040503050406030204" pitchFamily="18" charset="0"/>
+                                        </a:rPr>
+                                        <m:t>𝑖</m:t>
+                                      </m:r>
+                                    </m:sub>
+                                  </m:sSub>
+                                </m:e>
+                              </m:d>
+                              <m:r>
+                                <a:rPr lang="sr-Latn-RS" sz="1600" i="0">
+                                  <a:solidFill>
+                                    <a:schemeClr val="accent2"/>
+                                  </a:solidFill>
+                                  <a:latin typeface="Cambria Math" panose="02040503050406030204" pitchFamily="18" charset="0"/>
+                                </a:rPr>
+                                <m:t>+ </m:t>
+                              </m:r>
+                              <m:r>
+                                <a:rPr lang="sr-Latn-RS" sz="1600" i="1">
+                                  <a:solidFill>
+                                    <a:schemeClr val="accent2"/>
+                                  </a:solidFill>
+                                  <a:latin typeface="Cambria Math" panose="02040503050406030204" pitchFamily="18" charset="0"/>
+                                </a:rPr>
+                                <m:t>h</m:t>
+                              </m:r>
+                              <m:d>
+                                <m:dPr>
+                                  <m:ctrlPr>
+                                    <a:rPr lang="sr-Latn-RS" sz="1600" i="1">
+                                      <a:solidFill>
+                                        <a:schemeClr val="accent2"/>
+                                      </a:solidFill>
+                                      <a:latin typeface="Cambria Math" panose="02040503050406030204" pitchFamily="18" charset="0"/>
+                                    </a:rPr>
+                                  </m:ctrlPr>
+                                </m:dPr>
+                                <m:e>
+                                  <m:sSub>
+                                    <m:sSubPr>
+                                      <m:ctrlPr>
+                                        <a:rPr lang="sr-Latn-RS" sz="1600" i="1">
+                                          <a:solidFill>
+                                            <a:schemeClr val="accent2"/>
+                                          </a:solidFill>
+                                          <a:latin typeface="Cambria Math" panose="02040503050406030204" pitchFamily="18" charset="0"/>
+                                        </a:rPr>
+                                      </m:ctrlPr>
+                                    </m:sSubPr>
+                                    <m:e>
+                                      <m:r>
+                                        <a:rPr lang="sr-Latn-RS" sz="1600" i="1">
+                                          <a:solidFill>
+                                            <a:schemeClr val="accent2"/>
+                                          </a:solidFill>
+                                          <a:latin typeface="Cambria Math" panose="02040503050406030204" pitchFamily="18" charset="0"/>
+                                        </a:rPr>
+                                        <m:t>𝑥</m:t>
+                                      </m:r>
+                                    </m:e>
+                                    <m:sub>
+                                      <m:r>
+                                        <a:rPr lang="sr-Latn-RS" sz="1600" i="1">
+                                          <a:solidFill>
+                                            <a:schemeClr val="accent2"/>
+                                          </a:solidFill>
+                                          <a:latin typeface="Cambria Math" panose="02040503050406030204" pitchFamily="18" charset="0"/>
+                                        </a:rPr>
+                                        <m:t>𝑖</m:t>
+                                      </m:r>
+                                    </m:sub>
+                                  </m:sSub>
+                                </m:e>
+                              </m:d>
+                            </m:e>
+                          </m:d>
+                        </m:e>
+                      </m:nary>
+                    </m:oMath>
+                  </m:oMathPara>
+                </a14:m>
+                <a:endParaRPr lang="sr-Latn-RS" sz="1600" dirty="0"/>
+              </a:p>
+            </p:txBody>
+          </p:sp>
+        </mc:Choice>
+        <mc:Fallback>
+          <p:sp>
+            <p:nvSpPr>
+              <p:cNvPr id="6" name="TextBox 5">
+                <a:extLst>
+                  <a:ext uri="{FF2B5EF4-FFF2-40B4-BE49-F238E27FC236}">
+                    <a16:creationId xmlns:a16="http://schemas.microsoft.com/office/drawing/2014/main" id="{0A8E4D82-6CD0-4F49-9DBD-A4E77F641D00}"/>
+                  </a:ext>
+                </a:extLst>
+              </p:cNvPr>
+              <p:cNvSpPr txBox="1">
+                <a:spLocks noRot="1" noChangeAspect="1" noMove="1" noResize="1" noEditPoints="1" noAdjustHandles="1" noChangeArrowheads="1" noChangeShapeType="1" noTextEdit="1"/>
+              </p:cNvSpPr>
+              <p:nvPr/>
+            </p:nvSpPr>
+            <p:spPr>
+              <a:xfrm>
+                <a:off x="301837" y="3133861"/>
+                <a:ext cx="5963202" cy="576055"/>
+              </a:xfrm>
+              <a:prstGeom prst="rect">
+                <a:avLst/>
+              </a:prstGeom>
+              <a:blipFill>
+                <a:blip r:embed="rId4"/>
+                <a:stretch>
+                  <a:fillRect/>
+                </a:stretch>
+              </a:blipFill>
+            </p:spPr>
+            <p:txBody>
+              <a:bodyPr/>
+              <a:lstStyle/>
+              <a:p>
+                <a:r>
+                  <a:rPr lang="sr-Latn-RS">
+                    <a:noFill/>
+                  </a:rPr>
+                  <a:t> </a:t>
+                </a:r>
+              </a:p>
+            </p:txBody>
+          </p:sp>
+        </mc:Fallback>
+      </mc:AlternateContent>
+      <mc:AlternateContent xmlns:mc="http://schemas.openxmlformats.org/markup-compatibility/2006">
+        <mc:Choice xmlns:a14="http://schemas.microsoft.com/office/drawing/2010/main" Requires="a14">
+          <p:sp>
+            <p:nvSpPr>
+              <p:cNvPr id="8" name="TextBox 7">
+                <a:extLst>
+                  <a:ext uri="{FF2B5EF4-FFF2-40B4-BE49-F238E27FC236}">
+                    <a16:creationId xmlns:a16="http://schemas.microsoft.com/office/drawing/2014/main" id="{529016E4-8CCC-482E-A8E2-01ACB63C1452}"/>
+                  </a:ext>
+                </a:extLst>
+              </p:cNvPr>
+              <p:cNvSpPr txBox="1"/>
+              <p:nvPr/>
+            </p:nvSpPr>
+            <p:spPr>
+              <a:xfrm>
+                <a:off x="976914" y="1789652"/>
+                <a:ext cx="4216523" cy="338554"/>
+              </a:xfrm>
+              <a:prstGeom prst="rect">
+                <a:avLst/>
+              </a:prstGeom>
+              <a:noFill/>
+            </p:spPr>
+            <p:txBody>
+              <a:bodyPr wrap="square">
+                <a:spAutoFit/>
+              </a:bodyPr>
+              <a:lstStyle/>
+              <a:p>
+                <a:pPr/>
+                <a14:m>
+                  <m:oMathPara xmlns:m="http://schemas.openxmlformats.org/officeDocument/2006/math">
+                    <m:oMathParaPr>
+                      <m:jc m:val="centerGroup"/>
+                    </m:oMathParaPr>
+                    <m:oMath xmlns:m="http://schemas.openxmlformats.org/officeDocument/2006/math">
+                      <m:sSub>
+                        <m:sSubPr>
+                          <m:ctrlPr>
+                            <a:rPr lang="sr-Latn-RS" sz="1600" i="1" smtClean="0">
+                              <a:solidFill>
+                                <a:schemeClr val="accent2"/>
+                              </a:solidFill>
+                              <a:latin typeface="Cambria Math" panose="02040503050406030204" pitchFamily="18" charset="0"/>
+                            </a:rPr>
+                          </m:ctrlPr>
+                        </m:sSubPr>
+                        <m:e>
+                          <m:r>
+                            <a:rPr lang="sr-Latn-RS" sz="1600" i="1">
+                              <a:solidFill>
+                                <a:schemeClr val="accent2"/>
+                              </a:solidFill>
+                              <a:latin typeface="Cambria Math" panose="02040503050406030204" pitchFamily="18" charset="0"/>
+                            </a:rPr>
+                            <m:t>𝐹</m:t>
+                          </m:r>
+                        </m:e>
+                        <m:sub>
+                          <m:r>
+                            <a:rPr lang="sr-Latn-RS" sz="1600" i="1">
+                              <a:solidFill>
+                                <a:schemeClr val="accent2"/>
+                              </a:solidFill>
+                              <a:latin typeface="Cambria Math" panose="02040503050406030204" pitchFamily="18" charset="0"/>
+                            </a:rPr>
+                            <m:t>𝑚</m:t>
+                          </m:r>
+                        </m:sub>
+                      </m:sSub>
+                      <m:d>
+                        <m:dPr>
+                          <m:ctrlPr>
+                            <a:rPr lang="sr-Latn-RS" sz="1600" i="1">
+                              <a:solidFill>
+                                <a:schemeClr val="accent2"/>
+                              </a:solidFill>
+                              <a:latin typeface="Cambria Math" panose="02040503050406030204" pitchFamily="18" charset="0"/>
+                            </a:rPr>
+                          </m:ctrlPr>
+                        </m:dPr>
+                        <m:e>
+                          <m:r>
+                            <a:rPr lang="sr-Latn-RS" sz="1600" i="1">
+                              <a:solidFill>
+                                <a:schemeClr val="accent2"/>
+                              </a:solidFill>
+                              <a:latin typeface="Cambria Math" panose="02040503050406030204" pitchFamily="18" charset="0"/>
+                            </a:rPr>
+                            <m:t>𝑥</m:t>
+                          </m:r>
+                        </m:e>
+                      </m:d>
+                      <m:r>
+                        <a:rPr lang="sr-Latn-RS" sz="1600" i="0">
+                          <a:solidFill>
+                            <a:schemeClr val="accent2"/>
+                          </a:solidFill>
+                          <a:latin typeface="Cambria Math" panose="02040503050406030204" pitchFamily="18" charset="0"/>
+                        </a:rPr>
+                        <m:t>= </m:t>
+                      </m:r>
+                      <m:sSub>
+                        <m:sSubPr>
+                          <m:ctrlPr>
+                            <a:rPr lang="sr-Latn-RS" sz="1600" i="1">
+                              <a:solidFill>
+                                <a:schemeClr val="accent2"/>
+                              </a:solidFill>
+                              <a:latin typeface="Cambria Math" panose="02040503050406030204" pitchFamily="18" charset="0"/>
+                            </a:rPr>
+                          </m:ctrlPr>
+                        </m:sSubPr>
+                        <m:e>
+                          <m:r>
+                            <a:rPr lang="sr-Latn-RS" sz="1600" i="1">
+                              <a:solidFill>
+                                <a:schemeClr val="accent2"/>
+                              </a:solidFill>
+                              <a:latin typeface="Cambria Math" panose="02040503050406030204" pitchFamily="18" charset="0"/>
+                            </a:rPr>
+                            <m:t>𝐹</m:t>
+                          </m:r>
+                        </m:e>
+                        <m:sub>
+                          <m:r>
+                            <a:rPr lang="sr-Latn-RS" sz="1600" i="1">
+                              <a:solidFill>
+                                <a:schemeClr val="accent2"/>
+                              </a:solidFill>
+                              <a:latin typeface="Cambria Math" panose="02040503050406030204" pitchFamily="18" charset="0"/>
+                            </a:rPr>
+                            <m:t>𝑚</m:t>
+                          </m:r>
+                          <m:r>
+                            <a:rPr lang="sr-Latn-RS" sz="1600" i="0">
+                              <a:solidFill>
+                                <a:schemeClr val="accent2"/>
+                              </a:solidFill>
+                              <a:latin typeface="Cambria Math" panose="02040503050406030204" pitchFamily="18" charset="0"/>
+                            </a:rPr>
+                            <m:t>−1</m:t>
+                          </m:r>
+                        </m:sub>
+                      </m:sSub>
+                      <m:d>
+                        <m:dPr>
+                          <m:ctrlPr>
+                            <a:rPr lang="sr-Latn-RS" sz="1600" i="1">
+                              <a:solidFill>
+                                <a:schemeClr val="accent2"/>
+                              </a:solidFill>
+                              <a:latin typeface="Cambria Math" panose="02040503050406030204" pitchFamily="18" charset="0"/>
+                            </a:rPr>
+                          </m:ctrlPr>
+                        </m:dPr>
+                        <m:e>
+                          <m:r>
+                            <a:rPr lang="sr-Latn-RS" sz="1600" i="1">
+                              <a:solidFill>
+                                <a:schemeClr val="accent2"/>
+                              </a:solidFill>
+                              <a:latin typeface="Cambria Math" panose="02040503050406030204" pitchFamily="18" charset="0"/>
+                            </a:rPr>
+                            <m:t>𝑥</m:t>
+                          </m:r>
+                        </m:e>
+                      </m:d>
+                      <m:r>
+                        <a:rPr lang="sr-Latn-RS" sz="1600" i="0">
+                          <a:solidFill>
+                            <a:schemeClr val="accent2"/>
+                          </a:solidFill>
+                          <a:latin typeface="Cambria Math" panose="02040503050406030204" pitchFamily="18" charset="0"/>
+                        </a:rPr>
+                        <m:t>+ </m:t>
+                      </m:r>
+                      <m:sSub>
+                        <m:sSubPr>
+                          <m:ctrlPr>
+                            <a:rPr lang="sr-Latn-RS" sz="1600" i="1">
+                              <a:solidFill>
+                                <a:schemeClr val="accent2"/>
+                              </a:solidFill>
+                              <a:latin typeface="Cambria Math" panose="02040503050406030204" pitchFamily="18" charset="0"/>
+                            </a:rPr>
+                          </m:ctrlPr>
+                        </m:sSubPr>
+                        <m:e>
+                          <m:r>
+                            <m:rPr>
+                              <m:sty m:val="p"/>
+                            </m:rPr>
+                            <a:rPr lang="sr-Latn-RS" sz="1600" i="0">
+                              <a:solidFill>
+                                <a:schemeClr val="accent2"/>
+                              </a:solidFill>
+                              <a:latin typeface="Cambria Math" panose="02040503050406030204" pitchFamily="18" charset="0"/>
+                            </a:rPr>
+                            <m:t>γ</m:t>
+                          </m:r>
+                        </m:e>
+                        <m:sub>
+                          <m:r>
+                            <a:rPr lang="sr-Latn-RS" sz="1600" i="1">
+                              <a:solidFill>
+                                <a:schemeClr val="accent2"/>
+                              </a:solidFill>
+                              <a:latin typeface="Cambria Math" panose="02040503050406030204" pitchFamily="18" charset="0"/>
+                            </a:rPr>
+                            <m:t>𝑚</m:t>
+                          </m:r>
+                        </m:sub>
+                      </m:sSub>
+                      <m:sSub>
+                        <m:sSubPr>
+                          <m:ctrlPr>
+                            <a:rPr lang="sr-Latn-RS" sz="1600" i="1">
+                              <a:solidFill>
+                                <a:schemeClr val="accent2"/>
+                              </a:solidFill>
+                              <a:latin typeface="Cambria Math" panose="02040503050406030204" pitchFamily="18" charset="0"/>
+                            </a:rPr>
+                          </m:ctrlPr>
+                        </m:sSubPr>
+                        <m:e>
+                          <m:r>
+                            <a:rPr lang="sr-Latn-RS" sz="1600" i="1">
+                              <a:solidFill>
+                                <a:schemeClr val="accent2"/>
+                              </a:solidFill>
+                              <a:latin typeface="Cambria Math" panose="02040503050406030204" pitchFamily="18" charset="0"/>
+                            </a:rPr>
+                            <m:t>h</m:t>
+                          </m:r>
+                        </m:e>
+                        <m:sub>
+                          <m:r>
+                            <a:rPr lang="sr-Latn-RS" sz="1600" i="1">
+                              <a:solidFill>
+                                <a:schemeClr val="accent2"/>
+                              </a:solidFill>
+                              <a:latin typeface="Cambria Math" panose="02040503050406030204" pitchFamily="18" charset="0"/>
+                            </a:rPr>
+                            <m:t>𝑚</m:t>
+                          </m:r>
+                        </m:sub>
+                      </m:sSub>
+                      <m:d>
+                        <m:dPr>
+                          <m:ctrlPr>
+                            <a:rPr lang="sr-Latn-RS" sz="1600" i="1">
+                              <a:solidFill>
+                                <a:schemeClr val="accent2"/>
+                              </a:solidFill>
+                              <a:latin typeface="Cambria Math" panose="02040503050406030204" pitchFamily="18" charset="0"/>
+                            </a:rPr>
+                          </m:ctrlPr>
+                        </m:dPr>
+                        <m:e>
+                          <m:r>
+                            <a:rPr lang="sr-Latn-RS" sz="1600" i="1">
+                              <a:solidFill>
+                                <a:schemeClr val="accent2"/>
+                              </a:solidFill>
+                              <a:latin typeface="Cambria Math" panose="02040503050406030204" pitchFamily="18" charset="0"/>
+                            </a:rPr>
+                            <m:t>𝑥</m:t>
+                          </m:r>
+                        </m:e>
+                      </m:d>
+                    </m:oMath>
+                  </m:oMathPara>
+                </a14:m>
+                <a:endParaRPr lang="sr-Latn-RS" sz="1600" dirty="0"/>
+              </a:p>
+            </p:txBody>
+          </p:sp>
+        </mc:Choice>
+        <mc:Fallback>
+          <p:sp>
+            <p:nvSpPr>
+              <p:cNvPr id="8" name="TextBox 7">
+                <a:extLst>
+                  <a:ext uri="{FF2B5EF4-FFF2-40B4-BE49-F238E27FC236}">
+                    <a16:creationId xmlns:a16="http://schemas.microsoft.com/office/drawing/2014/main" id="{529016E4-8CCC-482E-A8E2-01ACB63C1452}"/>
+                  </a:ext>
+                </a:extLst>
+              </p:cNvPr>
+              <p:cNvSpPr txBox="1">
+                <a:spLocks noRot="1" noChangeAspect="1" noMove="1" noResize="1" noEditPoints="1" noAdjustHandles="1" noChangeArrowheads="1" noChangeShapeType="1" noTextEdit="1"/>
+              </p:cNvSpPr>
+              <p:nvPr/>
+            </p:nvSpPr>
+            <p:spPr>
+              <a:xfrm>
+                <a:off x="976914" y="1789652"/>
+                <a:ext cx="4216523" cy="338554"/>
+              </a:xfrm>
+              <a:prstGeom prst="rect">
+                <a:avLst/>
+              </a:prstGeom>
+              <a:blipFill>
+                <a:blip r:embed="rId5"/>
+                <a:stretch>
+                  <a:fillRect b="-1818"/>
+                </a:stretch>
+              </a:blipFill>
+            </p:spPr>
+            <p:txBody>
+              <a:bodyPr/>
+              <a:lstStyle/>
+              <a:p>
+                <a:r>
+                  <a:rPr lang="sr-Latn-RS">
+                    <a:noFill/>
+                  </a:rPr>
+                  <a:t> </a:t>
+                </a:r>
+              </a:p>
+            </p:txBody>
+          </p:sp>
+        </mc:Fallback>
+      </mc:AlternateContent>
+      <p:cxnSp>
+        <p:nvCxnSpPr>
+          <p:cNvPr id="10" name="Straight Arrow Connector 9">
+            <a:extLst>
+              <a:ext uri="{FF2B5EF4-FFF2-40B4-BE49-F238E27FC236}">
+                <a16:creationId xmlns:a16="http://schemas.microsoft.com/office/drawing/2014/main" id="{799D67AE-B0EC-4D21-AE55-8ABC6F60DBD1}"/>
+              </a:ext>
+            </a:extLst>
+          </p:cNvPr>
+          <p:cNvCxnSpPr>
+            <a:cxnSpLocks/>
+          </p:cNvCxnSpPr>
+          <p:nvPr/>
+        </p:nvCxnSpPr>
+        <p:spPr>
+          <a:xfrm>
+            <a:off x="2902998" y="2272689"/>
+            <a:ext cx="0" cy="719850"/>
+          </a:xfrm>
+          <a:prstGeom prst="straightConnector1">
+            <a:avLst/>
+          </a:prstGeom>
+          <a:ln w="38100">
+            <a:solidFill>
+              <a:schemeClr val="accent2"/>
+            </a:solidFill>
+            <a:tailEnd type="triangle"/>
+          </a:ln>
+        </p:spPr>
+        <p:style>
+          <a:lnRef idx="1">
+            <a:schemeClr val="accent1"/>
+          </a:lnRef>
+          <a:fillRef idx="0">
+            <a:schemeClr val="accent1"/>
+          </a:fillRef>
+          <a:effectRef idx="0">
+            <a:schemeClr val="accent1"/>
+          </a:effectRef>
+          <a:fontRef idx="minor">
+            <a:schemeClr val="tx1"/>
+          </a:fontRef>
+        </p:style>
+      </p:cxnSp>
+      <p:sp>
+        <p:nvSpPr>
+          <p:cNvPr id="5" name="TextBox 4">
+            <a:extLst>
+              <a:ext uri="{FF2B5EF4-FFF2-40B4-BE49-F238E27FC236}">
+                <a16:creationId xmlns:a16="http://schemas.microsoft.com/office/drawing/2014/main" id="{69B79A9C-AD6B-4ED7-8B88-0EBD064D7FEA}"/>
+              </a:ext>
+            </a:extLst>
+          </p:cNvPr>
+          <p:cNvSpPr txBox="1"/>
+          <p:nvPr/>
+        </p:nvSpPr>
+        <p:spPr>
+          <a:xfrm>
+            <a:off x="527226" y="904832"/>
+            <a:ext cx="11241860" cy="646331"/>
+          </a:xfrm>
+          <a:prstGeom prst="rect">
+            <a:avLst/>
+          </a:prstGeom>
+          <a:noFill/>
+        </p:spPr>
+        <p:txBody>
+          <a:bodyPr wrap="none" rtlCol="0">
+            <a:spAutoFit/>
+          </a:bodyPr>
+          <a:lstStyle/>
+          <a:p>
+            <a:pPr marL="285750" indent="-285750">
+              <a:buFont typeface="Arial" panose="020B0604020202020204" pitchFamily="34" charset="0"/>
+              <a:buChar char="•"/>
+            </a:pPr>
+            <a:r>
+              <a:rPr lang="en-US" dirty="0" err="1">
+                <a:solidFill>
+                  <a:schemeClr val="accent2"/>
+                </a:solidFill>
+              </a:rPr>
+              <a:t>Svako</a:t>
+            </a:r>
+            <a:r>
+              <a:rPr lang="en-US" dirty="0">
+                <a:solidFill>
+                  <a:schemeClr val="accent2"/>
+                </a:solidFill>
+              </a:rPr>
+              <a:t> </a:t>
+            </a:r>
+            <a:r>
+              <a:rPr lang="en-US" dirty="0" err="1">
+                <a:solidFill>
+                  <a:schemeClr val="accent2"/>
+                </a:solidFill>
+              </a:rPr>
+              <a:t>naredno</a:t>
+            </a:r>
+            <a:r>
+              <a:rPr lang="en-US" dirty="0">
+                <a:solidFill>
+                  <a:schemeClr val="accent2"/>
+                </a:solidFill>
+              </a:rPr>
+              <a:t> </a:t>
+            </a:r>
+            <a:r>
+              <a:rPr lang="en-US" dirty="0" err="1">
+                <a:solidFill>
+                  <a:schemeClr val="accent2"/>
+                </a:solidFill>
+              </a:rPr>
+              <a:t>stablo</a:t>
+            </a:r>
+            <a:r>
+              <a:rPr lang="en-US" dirty="0">
+                <a:solidFill>
+                  <a:schemeClr val="accent2"/>
+                </a:solidFill>
+              </a:rPr>
+              <a:t> u </a:t>
+            </a:r>
+            <a:r>
+              <a:rPr lang="en-US" dirty="0" err="1">
+                <a:solidFill>
+                  <a:schemeClr val="accent2"/>
+                </a:solidFill>
+              </a:rPr>
+              <a:t>ansamblu</a:t>
+            </a:r>
+            <a:r>
+              <a:rPr lang="en-US" dirty="0">
+                <a:solidFill>
+                  <a:schemeClr val="accent2"/>
+                </a:solidFill>
+              </a:rPr>
+              <a:t> </a:t>
+            </a:r>
+            <a:r>
+              <a:rPr lang="en-US" dirty="0" err="1">
+                <a:solidFill>
+                  <a:schemeClr val="accent2"/>
+                </a:solidFill>
+              </a:rPr>
+              <a:t>ispravlja</a:t>
+            </a:r>
+            <a:r>
+              <a:rPr lang="en-US" dirty="0">
+                <a:solidFill>
+                  <a:schemeClr val="accent2"/>
+                </a:solidFill>
+              </a:rPr>
+              <a:t> </a:t>
+            </a:r>
+            <a:r>
+              <a:rPr lang="en-US" dirty="0" err="1">
+                <a:solidFill>
+                  <a:schemeClr val="accent2"/>
+                </a:solidFill>
+              </a:rPr>
+              <a:t>gre</a:t>
+            </a:r>
+            <a:r>
+              <a:rPr lang="sr-Latn-RS" dirty="0" err="1">
+                <a:solidFill>
+                  <a:schemeClr val="accent2"/>
+                </a:solidFill>
+              </a:rPr>
+              <a:t>ške</a:t>
+            </a:r>
+            <a:r>
+              <a:rPr lang="sr-Latn-RS" dirty="0">
+                <a:solidFill>
+                  <a:schemeClr val="accent2"/>
+                </a:solidFill>
+              </a:rPr>
+              <a:t> prethodnog stabla</a:t>
+            </a:r>
+          </a:p>
+          <a:p>
+            <a:pPr marL="285750" indent="-285750">
+              <a:buFont typeface="Arial" panose="020B0604020202020204" pitchFamily="34" charset="0"/>
+              <a:buChar char="•"/>
+            </a:pPr>
+            <a:r>
+              <a:rPr lang="sr-Latn-RS" dirty="0">
+                <a:solidFill>
+                  <a:schemeClr val="accent2"/>
+                </a:solidFill>
+              </a:rPr>
+              <a:t>Svakom narednom modelu se kao ciljna promenljiva prosleđuje razlika između stvarne ciljne i predviđene vrednosti</a:t>
+            </a:r>
+            <a:endParaRPr lang="en-US" dirty="0">
               <a:solidFill>
                 <a:schemeClr val="accent2"/>
               </a:solidFill>
@@ -4048,10 +5174,45 @@
           </a:p>
         </p:txBody>
       </p:sp>
+      <p:pic>
+        <p:nvPicPr>
+          <p:cNvPr id="7" name="Picture 6">
+            <a:extLst>
+              <a:ext uri="{FF2B5EF4-FFF2-40B4-BE49-F238E27FC236}">
+                <a16:creationId xmlns:a16="http://schemas.microsoft.com/office/drawing/2014/main" id="{3419FB6A-B40E-435E-AD98-4CC6EA2FC95E}"/>
+              </a:ext>
+            </a:extLst>
+          </p:cNvPr>
+          <p:cNvPicPr>
+            <a:picLocks noChangeAspect="1"/>
+          </p:cNvPicPr>
+          <p:nvPr/>
+        </p:nvPicPr>
+        <p:blipFill>
+          <a:blip r:embed="rId6"/>
+          <a:stretch>
+            <a:fillRect/>
+          </a:stretch>
+        </p:blipFill>
+        <p:spPr>
+          <a:xfrm>
+            <a:off x="6265039" y="1684790"/>
+            <a:ext cx="4814293" cy="2708040"/>
+          </a:xfrm>
+          <a:prstGeom prst="rect">
+            <a:avLst/>
+          </a:prstGeom>
+          <a:ln w="12700">
+            <a:solidFill>
+              <a:schemeClr val="accent2"/>
+            </a:solidFill>
+          </a:ln>
+        </p:spPr>
+      </p:pic>
     </p:spTree>
     <p:extLst>
       <p:ext uri="{BB962C8B-B14F-4D97-AF65-F5344CB8AC3E}">
-        <p14:creationId xmlns:p14="http://schemas.microsoft.com/office/powerpoint/2010/main" val="2548335458"/>
+        <p14:creationId xmlns:p14="http://schemas.microsoft.com/office/powerpoint/2010/main" val="683805731"/>
       </p:ext>
     </p:extLst>
   </p:cSld>
@@ -4083,7 +5244,7 @@
           <p:cNvPr id="2" name="TextBox 1">
             <a:extLst>
               <a:ext uri="{FF2B5EF4-FFF2-40B4-BE49-F238E27FC236}">
-                <a16:creationId xmlns:a16="http://schemas.microsoft.com/office/drawing/2014/main" id="{6B213EA9-B1B6-48E3-AD11-96AF9FA40DCF}"/>
+                <a16:creationId xmlns:a16="http://schemas.microsoft.com/office/drawing/2014/main" id="{7D3AA088-3C33-4CC3-917C-6A3D52DECAE7}"/>
               </a:ext>
             </a:extLst>
           </p:cNvPr>
@@ -4093,7 +5254,7 @@
         <p:spPr>
           <a:xfrm>
             <a:off x="577048" y="186430"/>
-            <a:ext cx="3173048" cy="584775"/>
+            <a:ext cx="5597879" cy="584775"/>
           </a:xfrm>
           <a:prstGeom prst="rect">
             <a:avLst/>
@@ -4112,7 +5273,210 @@
                   <a:schemeClr val="accent2"/>
                 </a:solidFill>
               </a:rPr>
-              <a:t>Evaluacija modela</a:t>
+              <a:t>Ponavljajuća Unakrsna </a:t>
+            </a:r>
+            <a:r>
+              <a:rPr lang="sr-Latn-RS" sz="3200" dirty="0" err="1">
+                <a:solidFill>
+                  <a:schemeClr val="accent2"/>
+                </a:solidFill>
+              </a:rPr>
+              <a:t>Validacija</a:t>
+            </a:r>
+            <a:endParaRPr lang="sr-Latn-RS" sz="3200" dirty="0">
+              <a:solidFill>
+                <a:schemeClr val="accent2"/>
+              </a:solidFill>
+            </a:endParaRPr>
+          </a:p>
+        </p:txBody>
+      </p:sp>
+      <p:pic>
+        <p:nvPicPr>
+          <p:cNvPr id="3" name="Picture 2">
+            <a:extLst>
+              <a:ext uri="{FF2B5EF4-FFF2-40B4-BE49-F238E27FC236}">
+                <a16:creationId xmlns:a16="http://schemas.microsoft.com/office/drawing/2014/main" id="{4F333624-1D4D-4C0B-8E16-97D3E8C303E2}"/>
+              </a:ext>
+            </a:extLst>
+          </p:cNvPr>
+          <p:cNvPicPr>
+            <a:picLocks noChangeAspect="1"/>
+          </p:cNvPicPr>
+          <p:nvPr/>
+        </p:nvPicPr>
+        <p:blipFill>
+          <a:blip r:embed="rId2"/>
+          <a:stretch>
+            <a:fillRect/>
+          </a:stretch>
+        </p:blipFill>
+        <p:spPr>
+          <a:xfrm>
+            <a:off x="781235" y="4643021"/>
+            <a:ext cx="9339621" cy="1078637"/>
+          </a:xfrm>
+          <a:prstGeom prst="rect">
+            <a:avLst/>
+          </a:prstGeom>
+          <a:ln w="19050">
+            <a:solidFill>
+              <a:schemeClr val="accent2"/>
+            </a:solidFill>
+          </a:ln>
+        </p:spPr>
+      </p:pic>
+      <p:sp>
+        <p:nvSpPr>
+          <p:cNvPr id="4" name="TextBox 3">
+            <a:extLst>
+              <a:ext uri="{FF2B5EF4-FFF2-40B4-BE49-F238E27FC236}">
+                <a16:creationId xmlns:a16="http://schemas.microsoft.com/office/drawing/2014/main" id="{DB04CFFE-EBEC-4498-9ACC-BC453D1A3357}"/>
+              </a:ext>
+            </a:extLst>
+          </p:cNvPr>
+          <p:cNvSpPr txBox="1"/>
+          <p:nvPr/>
+        </p:nvSpPr>
+        <p:spPr>
+          <a:xfrm>
+            <a:off x="692458" y="1136342"/>
+            <a:ext cx="8733738" cy="3293209"/>
+          </a:xfrm>
+          <a:prstGeom prst="rect">
+            <a:avLst/>
+          </a:prstGeom>
+          <a:noFill/>
+        </p:spPr>
+        <p:txBody>
+          <a:bodyPr wrap="none" rtlCol="0">
+            <a:spAutoFit/>
+          </a:bodyPr>
+          <a:lstStyle/>
+          <a:p>
+            <a:pPr marL="285750" indent="-285750">
+              <a:spcAft>
+                <a:spcPts val="2400"/>
+              </a:spcAft>
+              <a:buFont typeface="Arial" panose="020B0604020202020204" pitchFamily="34" charset="0"/>
+              <a:buChar char="•"/>
+            </a:pPr>
+            <a:r>
+              <a:rPr lang="sr-Latn-RS" dirty="0" err="1">
+                <a:solidFill>
+                  <a:schemeClr val="accent2"/>
+                </a:solidFill>
+              </a:rPr>
+              <a:t>Robustnija</a:t>
+            </a:r>
+            <a:r>
+              <a:rPr lang="sr-Latn-RS" dirty="0">
+                <a:solidFill>
+                  <a:schemeClr val="accent2"/>
+                </a:solidFill>
+              </a:rPr>
+              <a:t> od Unakrsne </a:t>
+            </a:r>
+            <a:r>
+              <a:rPr lang="sr-Latn-RS" dirty="0" err="1">
+                <a:solidFill>
+                  <a:schemeClr val="accent2"/>
+                </a:solidFill>
+              </a:rPr>
+              <a:t>Validacije</a:t>
+            </a:r>
+            <a:r>
+              <a:rPr lang="sr-Latn-RS" dirty="0">
+                <a:solidFill>
+                  <a:schemeClr val="accent2"/>
+                </a:solidFill>
+              </a:rPr>
+              <a:t> bez ponavljanja kada postoje zašumljeni podaci</a:t>
+            </a:r>
+          </a:p>
+          <a:p>
+            <a:pPr marL="285750" indent="-285750">
+              <a:spcAft>
+                <a:spcPts val="2400"/>
+              </a:spcAft>
+              <a:buFont typeface="Arial" panose="020B0604020202020204" pitchFamily="34" charset="0"/>
+              <a:buChar char="•"/>
+            </a:pPr>
+            <a:r>
+              <a:rPr lang="sr-Latn-RS" dirty="0">
+                <a:solidFill>
+                  <a:schemeClr val="accent2"/>
+                </a:solidFill>
+              </a:rPr>
+              <a:t>Podela skupa podataka u zadani broj delova</a:t>
+            </a:r>
+          </a:p>
+          <a:p>
+            <a:pPr marL="285750" indent="-285750">
+              <a:spcAft>
+                <a:spcPts val="2400"/>
+              </a:spcAft>
+              <a:buFont typeface="Arial" panose="020B0604020202020204" pitchFamily="34" charset="0"/>
+              <a:buChar char="•"/>
+            </a:pPr>
+            <a:r>
+              <a:rPr lang="sr-Latn-RS" dirty="0">
+                <a:solidFill>
+                  <a:schemeClr val="accent2"/>
+                </a:solidFill>
+              </a:rPr>
+              <a:t>Iterativno se svaki put model iznova obučava nad drugim test skupom</a:t>
+            </a:r>
+          </a:p>
+          <a:p>
+            <a:pPr marL="285750" indent="-285750">
+              <a:spcAft>
+                <a:spcPts val="2400"/>
+              </a:spcAft>
+              <a:buFont typeface="Arial" panose="020B0604020202020204" pitchFamily="34" charset="0"/>
+              <a:buChar char="•"/>
+            </a:pPr>
+            <a:r>
+              <a:rPr lang="sr-Latn-RS" dirty="0">
+                <a:solidFill>
+                  <a:schemeClr val="accent2"/>
+                </a:solidFill>
+              </a:rPr>
+              <a:t>Na konkretnom primeru se skup podelio na 10 jednakih delova</a:t>
+            </a:r>
+          </a:p>
+          <a:p>
+            <a:pPr marL="285750" indent="-285750">
+              <a:spcAft>
+                <a:spcPts val="2400"/>
+              </a:spcAft>
+              <a:buFont typeface="Arial" panose="020B0604020202020204" pitchFamily="34" charset="0"/>
+              <a:buChar char="•"/>
+            </a:pPr>
+            <a:r>
+              <a:rPr lang="sr-Latn-RS" dirty="0">
+                <a:solidFill>
+                  <a:schemeClr val="accent2"/>
+                </a:solidFill>
+              </a:rPr>
+              <a:t>Ceo proces se ponavlja 3 puta, ovaj parametar se određuje u zavisnosti od šuma u skupu</a:t>
+            </a:r>
+          </a:p>
+          <a:p>
+            <a:pPr marL="285750" indent="-285750">
+              <a:spcAft>
+                <a:spcPts val="2400"/>
+              </a:spcAft>
+              <a:buFont typeface="Arial" panose="020B0604020202020204" pitchFamily="34" charset="0"/>
+              <a:buChar char="•"/>
+            </a:pPr>
+            <a:r>
+              <a:rPr lang="sr-Latn-RS" dirty="0">
+                <a:solidFill>
+                  <a:schemeClr val="accent2"/>
+                </a:solidFill>
+              </a:rPr>
+              <a:t>Razmatra se prosečna tačnost (89.5 %)</a:t>
             </a:r>
           </a:p>
         </p:txBody>
@@ -4120,7 +5484,7 @@
     </p:spTree>
     <p:extLst>
       <p:ext uri="{BB962C8B-B14F-4D97-AF65-F5344CB8AC3E}">
-        <p14:creationId xmlns:p14="http://schemas.microsoft.com/office/powerpoint/2010/main" val="1058796398"/>
+        <p14:creationId xmlns:p14="http://schemas.microsoft.com/office/powerpoint/2010/main" val="2548335458"/>
       </p:ext>
     </p:extLst>
   </p:cSld>
@@ -4152,7 +5516,7 @@
           <p:cNvPr id="2" name="TextBox 1">
             <a:extLst>
               <a:ext uri="{FF2B5EF4-FFF2-40B4-BE49-F238E27FC236}">
-                <a16:creationId xmlns:a16="http://schemas.microsoft.com/office/drawing/2014/main" id="{1E0E666E-6E9F-46E9-952D-B4D06865F4B2}"/>
+                <a16:creationId xmlns:a16="http://schemas.microsoft.com/office/drawing/2014/main" id="{6B213EA9-B1B6-48E3-AD11-96AF9FA40DCF}"/>
               </a:ext>
             </a:extLst>
           </p:cNvPr>
@@ -4162,7 +5526,7 @@
         <p:spPr>
           <a:xfrm>
             <a:off x="577048" y="186430"/>
-            <a:ext cx="2929007" cy="584775"/>
+            <a:ext cx="3173048" cy="584775"/>
           </a:xfrm>
           <a:prstGeom prst="rect">
             <a:avLst/>
@@ -4181,15 +5545,225 @@
                   <a:schemeClr val="accent2"/>
                 </a:solidFill>
               </a:rPr>
-              <a:t>Primena modela</a:t>
-            </a:r>
-          </a:p>
-        </p:txBody>
-      </p:sp>
+              <a:t>Evaluacija modela</a:t>
+            </a:r>
+          </a:p>
+        </p:txBody>
+      </p:sp>
+      <p:pic>
+        <p:nvPicPr>
+          <p:cNvPr id="10" name="Picture 9">
+            <a:extLst>
+              <a:ext uri="{FF2B5EF4-FFF2-40B4-BE49-F238E27FC236}">
+                <a16:creationId xmlns:a16="http://schemas.microsoft.com/office/drawing/2014/main" id="{CAE274E0-0F25-410E-8315-B4CFF29C947E}"/>
+              </a:ext>
+            </a:extLst>
+          </p:cNvPr>
+          <p:cNvPicPr>
+            <a:picLocks noChangeAspect="1"/>
+          </p:cNvPicPr>
+          <p:nvPr/>
+        </p:nvPicPr>
+        <p:blipFill>
+          <a:blip r:embed="rId2"/>
+          <a:stretch>
+            <a:fillRect/>
+          </a:stretch>
+        </p:blipFill>
+        <p:spPr>
+          <a:xfrm>
+            <a:off x="5345633" y="3937511"/>
+            <a:ext cx="2908685" cy="1913237"/>
+          </a:xfrm>
+          <a:prstGeom prst="rect">
+            <a:avLst/>
+          </a:prstGeom>
+          <a:ln w="12700">
+            <a:solidFill>
+              <a:schemeClr val="accent2"/>
+            </a:solidFill>
+          </a:ln>
+        </p:spPr>
+      </p:pic>
+      <p:pic>
+        <p:nvPicPr>
+          <p:cNvPr id="12" name="Picture 11">
+            <a:extLst>
+              <a:ext uri="{FF2B5EF4-FFF2-40B4-BE49-F238E27FC236}">
+                <a16:creationId xmlns:a16="http://schemas.microsoft.com/office/drawing/2014/main" id="{660B38B8-8805-4997-A552-1861AD68CF46}"/>
+              </a:ext>
+            </a:extLst>
+          </p:cNvPr>
+          <p:cNvPicPr>
+            <a:picLocks noChangeAspect="1"/>
+          </p:cNvPicPr>
+          <p:nvPr/>
+        </p:nvPicPr>
+        <p:blipFill>
+          <a:blip r:embed="rId3"/>
+          <a:stretch>
+            <a:fillRect/>
+          </a:stretch>
+        </p:blipFill>
+        <p:spPr>
+          <a:xfrm>
+            <a:off x="8773609" y="3937511"/>
+            <a:ext cx="2805658" cy="1946782"/>
+          </a:xfrm>
+          <a:prstGeom prst="rect">
+            <a:avLst/>
+          </a:prstGeom>
+          <a:ln w="12700">
+            <a:solidFill>
+              <a:schemeClr val="accent2"/>
+            </a:solidFill>
+          </a:ln>
+        </p:spPr>
+      </p:pic>
+      <p:pic>
+        <p:nvPicPr>
+          <p:cNvPr id="15" name="Picture 14">
+            <a:extLst>
+              <a:ext uri="{FF2B5EF4-FFF2-40B4-BE49-F238E27FC236}">
+                <a16:creationId xmlns:a16="http://schemas.microsoft.com/office/drawing/2014/main" id="{7FC85D26-9CF1-4188-9D10-D6CFF8963EE5}"/>
+              </a:ext>
+            </a:extLst>
+          </p:cNvPr>
+          <p:cNvPicPr>
+            <a:picLocks noChangeAspect="1"/>
+          </p:cNvPicPr>
+          <p:nvPr/>
+        </p:nvPicPr>
+        <p:blipFill>
+          <a:blip r:embed="rId4"/>
+          <a:stretch>
+            <a:fillRect/>
+          </a:stretch>
+        </p:blipFill>
+        <p:spPr>
+          <a:xfrm>
+            <a:off x="489035" y="1461564"/>
+            <a:ext cx="3805975" cy="1878838"/>
+          </a:xfrm>
+          <a:prstGeom prst="rect">
+            <a:avLst/>
+          </a:prstGeom>
+          <a:ln w="12700">
+            <a:solidFill>
+              <a:schemeClr val="accent2"/>
+            </a:solidFill>
+          </a:ln>
+        </p:spPr>
+      </p:pic>
+      <p:pic>
+        <p:nvPicPr>
+          <p:cNvPr id="16" name="Picture 15">
+            <a:extLst>
+              <a:ext uri="{FF2B5EF4-FFF2-40B4-BE49-F238E27FC236}">
+                <a16:creationId xmlns:a16="http://schemas.microsoft.com/office/drawing/2014/main" id="{46DE24C7-EA5B-4954-8A41-B0CFE269D8F7}"/>
+              </a:ext>
+            </a:extLst>
+          </p:cNvPr>
+          <p:cNvPicPr>
+            <a:picLocks noChangeAspect="1"/>
+          </p:cNvPicPr>
+          <p:nvPr/>
+        </p:nvPicPr>
+        <p:blipFill>
+          <a:blip r:embed="rId5"/>
+          <a:stretch>
+            <a:fillRect/>
+          </a:stretch>
+        </p:blipFill>
+        <p:spPr>
+          <a:xfrm>
+            <a:off x="4514955" y="1007252"/>
+            <a:ext cx="2908684" cy="2649277"/>
+          </a:xfrm>
+          <a:prstGeom prst="rect">
+            <a:avLst/>
+          </a:prstGeom>
+          <a:ln w="12700">
+            <a:solidFill>
+              <a:schemeClr val="accent2"/>
+            </a:solidFill>
+          </a:ln>
+        </p:spPr>
+      </p:pic>
+      <p:pic>
+        <p:nvPicPr>
+          <p:cNvPr id="17" name="Picture 16">
+            <a:extLst>
+              <a:ext uri="{FF2B5EF4-FFF2-40B4-BE49-F238E27FC236}">
+                <a16:creationId xmlns:a16="http://schemas.microsoft.com/office/drawing/2014/main" id="{4827D992-AE68-45D2-A684-6FAB8F67ADAF}"/>
+              </a:ext>
+            </a:extLst>
+          </p:cNvPr>
+          <p:cNvPicPr>
+            <a:picLocks noChangeAspect="1"/>
+          </p:cNvPicPr>
+          <p:nvPr/>
+        </p:nvPicPr>
+        <p:blipFill>
+          <a:blip r:embed="rId6"/>
+          <a:stretch>
+            <a:fillRect/>
+          </a:stretch>
+        </p:blipFill>
+        <p:spPr>
+          <a:xfrm>
+            <a:off x="7988427" y="1041356"/>
+            <a:ext cx="3915692" cy="2581070"/>
+          </a:xfrm>
+          <a:prstGeom prst="rect">
+            <a:avLst/>
+          </a:prstGeom>
+          <a:ln w="12700">
+            <a:solidFill>
+              <a:schemeClr val="accent2"/>
+            </a:solidFill>
+          </a:ln>
+        </p:spPr>
+      </p:pic>
+      <p:pic>
+        <p:nvPicPr>
+          <p:cNvPr id="18" name="Picture 17">
+            <a:extLst>
+              <a:ext uri="{FF2B5EF4-FFF2-40B4-BE49-F238E27FC236}">
+                <a16:creationId xmlns:a16="http://schemas.microsoft.com/office/drawing/2014/main" id="{14BF28B0-9DF1-4D52-8482-DF421810B566}"/>
+              </a:ext>
+            </a:extLst>
+          </p:cNvPr>
+          <p:cNvPicPr>
+            <a:picLocks noChangeAspect="1"/>
+          </p:cNvPicPr>
+          <p:nvPr/>
+        </p:nvPicPr>
+        <p:blipFill>
+          <a:blip r:embed="rId7"/>
+          <a:stretch>
+            <a:fillRect/>
+          </a:stretch>
+        </p:blipFill>
+        <p:spPr>
+          <a:xfrm>
+            <a:off x="287881" y="3879677"/>
+            <a:ext cx="4613930" cy="2082504"/>
+          </a:xfrm>
+          <a:prstGeom prst="rect">
+            <a:avLst/>
+          </a:prstGeom>
+          <a:ln w="12700">
+            <a:solidFill>
+              <a:schemeClr val="accent2"/>
+            </a:solidFill>
+          </a:ln>
+        </p:spPr>
+      </p:pic>
     </p:spTree>
     <p:extLst>
       <p:ext uri="{BB962C8B-B14F-4D97-AF65-F5344CB8AC3E}">
-        <p14:creationId xmlns:p14="http://schemas.microsoft.com/office/powerpoint/2010/main" val="3855291550"/>
+        <p14:creationId xmlns:p14="http://schemas.microsoft.com/office/powerpoint/2010/main" val="1058796398"/>
       </p:ext>
     </p:extLst>
   </p:cSld>
@@ -4221,7 +5795,7 @@
           <p:cNvPr id="2" name="TextBox 1">
             <a:extLst>
               <a:ext uri="{FF2B5EF4-FFF2-40B4-BE49-F238E27FC236}">
-                <a16:creationId xmlns:a16="http://schemas.microsoft.com/office/drawing/2014/main" id="{498A0D1E-474B-4EFA-8C17-8C0DA9855CCF}"/>
+                <a16:creationId xmlns:a16="http://schemas.microsoft.com/office/drawing/2014/main" id="{1E0E666E-6E9F-46E9-952D-B4D06865F4B2}"/>
               </a:ext>
             </a:extLst>
           </p:cNvPr>
@@ -4231,7 +5805,7 @@
         <p:spPr>
           <a:xfrm>
             <a:off x="577048" y="186430"/>
-            <a:ext cx="1719766" cy="584775"/>
+            <a:ext cx="2929007" cy="584775"/>
           </a:xfrm>
           <a:prstGeom prst="rect">
             <a:avLst/>
@@ -4250,15 +5824,255 @@
                   <a:schemeClr val="accent2"/>
                 </a:solidFill>
               </a:rPr>
-              <a:t>Zaključak</a:t>
-            </a:r>
+              <a:t>Primena modela</a:t>
+            </a:r>
+          </a:p>
+        </p:txBody>
+      </p:sp>
+      <p:pic>
+        <p:nvPicPr>
+          <p:cNvPr id="4" name="Picture 3">
+            <a:extLst>
+              <a:ext uri="{FF2B5EF4-FFF2-40B4-BE49-F238E27FC236}">
+                <a16:creationId xmlns:a16="http://schemas.microsoft.com/office/drawing/2014/main" id="{DB952BAB-3274-4A65-8AC8-2CED9462FBCB}"/>
+              </a:ext>
+            </a:extLst>
+          </p:cNvPr>
+          <p:cNvPicPr>
+            <a:picLocks noChangeAspect="1"/>
+          </p:cNvPicPr>
+          <p:nvPr/>
+        </p:nvPicPr>
+        <p:blipFill>
+          <a:blip r:embed="rId2"/>
+          <a:stretch>
+            <a:fillRect/>
+          </a:stretch>
+        </p:blipFill>
+        <p:spPr>
+          <a:xfrm>
+            <a:off x="3506054" y="3696371"/>
+            <a:ext cx="6013879" cy="2501382"/>
+          </a:xfrm>
+          <a:prstGeom prst="rect">
+            <a:avLst/>
+          </a:prstGeom>
+          <a:ln w="12700">
+            <a:solidFill>
+              <a:schemeClr val="accent2"/>
+            </a:solidFill>
+          </a:ln>
+        </p:spPr>
+      </p:pic>
+      <p:pic>
+        <p:nvPicPr>
+          <p:cNvPr id="10" name="Picture 9">
+            <a:extLst>
+              <a:ext uri="{FF2B5EF4-FFF2-40B4-BE49-F238E27FC236}">
+                <a16:creationId xmlns:a16="http://schemas.microsoft.com/office/drawing/2014/main" id="{C1C876E3-392B-4E15-992B-1F2478593E48}"/>
+              </a:ext>
+            </a:extLst>
+          </p:cNvPr>
+          <p:cNvPicPr>
+            <a:picLocks noChangeAspect="1"/>
+          </p:cNvPicPr>
+          <p:nvPr/>
+        </p:nvPicPr>
+        <p:blipFill>
+          <a:blip r:embed="rId3"/>
+          <a:stretch>
+            <a:fillRect/>
+          </a:stretch>
+        </p:blipFill>
+        <p:spPr>
+          <a:xfrm>
+            <a:off x="3506054" y="771205"/>
+            <a:ext cx="6650827" cy="2801047"/>
+          </a:xfrm>
+          <a:prstGeom prst="rect">
+            <a:avLst/>
+          </a:prstGeom>
+          <a:ln w="12700">
+            <a:solidFill>
+              <a:schemeClr val="accent2"/>
+            </a:solidFill>
+          </a:ln>
+        </p:spPr>
+      </p:pic>
+      <p:sp>
+        <p:nvSpPr>
+          <p:cNvPr id="11" name="TextBox 10">
+            <a:extLst>
+              <a:ext uri="{FF2B5EF4-FFF2-40B4-BE49-F238E27FC236}">
+                <a16:creationId xmlns:a16="http://schemas.microsoft.com/office/drawing/2014/main" id="{74C544D1-159A-4324-9FF9-363FAAB3D4AE}"/>
+              </a:ext>
+            </a:extLst>
+          </p:cNvPr>
+          <p:cNvSpPr txBox="1"/>
+          <p:nvPr/>
+        </p:nvSpPr>
+        <p:spPr>
+          <a:xfrm>
+            <a:off x="577048" y="1617730"/>
+            <a:ext cx="1980927" cy="369332"/>
+          </a:xfrm>
+          <a:prstGeom prst="rect">
+            <a:avLst/>
+          </a:prstGeom>
+          <a:noFill/>
+        </p:spPr>
+        <p:txBody>
+          <a:bodyPr wrap="none" rtlCol="0">
+            <a:spAutoFit/>
+          </a:bodyPr>
+          <a:lstStyle/>
+          <a:p>
+            <a:r>
+              <a:rPr lang="sr-Latn-RS" dirty="0">
+                <a:solidFill>
+                  <a:schemeClr val="accent2"/>
+                </a:solidFill>
+              </a:rPr>
+              <a:t>Kako sada izgleda? </a:t>
+            </a:r>
+          </a:p>
+        </p:txBody>
+      </p:sp>
+      <p:sp>
+        <p:nvSpPr>
+          <p:cNvPr id="12" name="Arrow: Right 11">
+            <a:extLst>
+              <a:ext uri="{FF2B5EF4-FFF2-40B4-BE49-F238E27FC236}">
+                <a16:creationId xmlns:a16="http://schemas.microsoft.com/office/drawing/2014/main" id="{EE51C657-0714-408D-8B04-955173CF8485}"/>
+              </a:ext>
+            </a:extLst>
+          </p:cNvPr>
+          <p:cNvSpPr/>
+          <p:nvPr/>
+        </p:nvSpPr>
+        <p:spPr>
+          <a:xfrm>
+            <a:off x="2690514" y="1682547"/>
+            <a:ext cx="648070" cy="239697"/>
+          </a:xfrm>
+          <a:prstGeom prst="rightArrow">
+            <a:avLst/>
+          </a:prstGeom>
+        </p:spPr>
+        <p:style>
+          <a:lnRef idx="2">
+            <a:schemeClr val="accent1">
+              <a:shade val="50000"/>
+            </a:schemeClr>
+          </a:lnRef>
+          <a:fillRef idx="1">
+            <a:schemeClr val="accent1"/>
+          </a:fillRef>
+          <a:effectRef idx="0">
+            <a:schemeClr val="accent1"/>
+          </a:effectRef>
+          <a:fontRef idx="minor">
+            <a:schemeClr val="lt1"/>
+          </a:fontRef>
+        </p:style>
+        <p:txBody>
+          <a:bodyPr rtlCol="0" anchor="ctr"/>
+          <a:lstStyle/>
+          <a:p>
+            <a:pPr algn="ctr"/>
+            <a:endParaRPr lang="sr-Latn-RS"/>
+          </a:p>
+        </p:txBody>
+      </p:sp>
+      <p:sp>
+        <p:nvSpPr>
+          <p:cNvPr id="13" name="TextBox 12">
+            <a:extLst>
+              <a:ext uri="{FF2B5EF4-FFF2-40B4-BE49-F238E27FC236}">
+                <a16:creationId xmlns:a16="http://schemas.microsoft.com/office/drawing/2014/main" id="{E2D76018-97E0-4DD2-B15E-56168CE69613}"/>
+              </a:ext>
+            </a:extLst>
+          </p:cNvPr>
+          <p:cNvSpPr txBox="1"/>
+          <p:nvPr/>
+        </p:nvSpPr>
+        <p:spPr>
+          <a:xfrm>
+            <a:off x="581102" y="4577730"/>
+            <a:ext cx="1941942" cy="369332"/>
+          </a:xfrm>
+          <a:prstGeom prst="rect">
+            <a:avLst/>
+          </a:prstGeom>
+          <a:noFill/>
+        </p:spPr>
+        <p:txBody>
+          <a:bodyPr wrap="none" rtlCol="0">
+            <a:spAutoFit/>
+          </a:bodyPr>
+          <a:lstStyle/>
+          <a:p>
+            <a:r>
+              <a:rPr lang="sr-Latn-RS" dirty="0">
+                <a:solidFill>
+                  <a:schemeClr val="accent2"/>
+                </a:solidFill>
+              </a:rPr>
+              <a:t>Kako će izgledati? </a:t>
+            </a:r>
+          </a:p>
+        </p:txBody>
+      </p:sp>
+      <p:sp>
+        <p:nvSpPr>
+          <p:cNvPr id="14" name="Arrow: Right 13">
+            <a:extLst>
+              <a:ext uri="{FF2B5EF4-FFF2-40B4-BE49-F238E27FC236}">
+                <a16:creationId xmlns:a16="http://schemas.microsoft.com/office/drawing/2014/main" id="{795E7331-D9D8-4057-9C75-26087C06EDF0}"/>
+              </a:ext>
+            </a:extLst>
+          </p:cNvPr>
+          <p:cNvSpPr/>
+          <p:nvPr/>
+        </p:nvSpPr>
+        <p:spPr>
+          <a:xfrm>
+            <a:off x="2690514" y="4631242"/>
+            <a:ext cx="648070" cy="239697"/>
+          </a:xfrm>
+          <a:prstGeom prst="rightArrow">
+            <a:avLst/>
+          </a:prstGeom>
+        </p:spPr>
+        <p:style>
+          <a:lnRef idx="2">
+            <a:schemeClr val="accent1">
+              <a:shade val="50000"/>
+            </a:schemeClr>
+          </a:lnRef>
+          <a:fillRef idx="1">
+            <a:schemeClr val="accent1"/>
+          </a:fillRef>
+          <a:effectRef idx="0">
+            <a:schemeClr val="accent1"/>
+          </a:effectRef>
+          <a:fontRef idx="minor">
+            <a:schemeClr val="lt1"/>
+          </a:fontRef>
+        </p:style>
+        <p:txBody>
+          <a:bodyPr rtlCol="0" anchor="ctr"/>
+          <a:lstStyle/>
+          <a:p>
+            <a:pPr algn="ctr"/>
+            <a:endParaRPr lang="sr-Latn-RS"/>
           </a:p>
         </p:txBody>
       </p:sp>
     </p:spTree>
     <p:extLst>
       <p:ext uri="{BB962C8B-B14F-4D97-AF65-F5344CB8AC3E}">
-        <p14:creationId xmlns:p14="http://schemas.microsoft.com/office/powerpoint/2010/main" val="940826710"/>
+        <p14:creationId xmlns:p14="http://schemas.microsoft.com/office/powerpoint/2010/main" val="3855291550"/>
       </p:ext>
     </p:extLst>
   </p:cSld>
@@ -5495,7 +7309,7 @@
         <p:spPr>
           <a:xfrm>
             <a:off x="514905" y="186430"/>
-            <a:ext cx="2102242" cy="584775"/>
+            <a:ext cx="4154792" cy="584775"/>
           </a:xfrm>
           <a:prstGeom prst="rect">
             <a:avLst/>
@@ -5514,7 +7328,7 @@
                   <a:schemeClr val="accent2"/>
                 </a:solidFill>
               </a:rPr>
-              <a:t>Tehnologije</a:t>
+              <a:t>Programski alati i paketi</a:t>
             </a:r>
           </a:p>
         </p:txBody>
@@ -5541,8 +7355,8 @@
         </p:blipFill>
         <p:spPr>
           <a:xfrm>
-            <a:off x="2308969" y="1628684"/>
-            <a:ext cx="1193631" cy="1193631"/>
+            <a:off x="8870070" y="1341262"/>
+            <a:ext cx="895912" cy="895912"/>
           </a:xfrm>
           <a:prstGeom prst="rect">
             <a:avLst/>
@@ -5571,8 +7385,8 @@
         </p:blipFill>
         <p:spPr>
           <a:xfrm>
-            <a:off x="6427641" y="1693627"/>
-            <a:ext cx="3149308" cy="1063743"/>
+            <a:off x="4529150" y="1525630"/>
+            <a:ext cx="2459289" cy="830675"/>
           </a:xfrm>
           <a:prstGeom prst="rect">
             <a:avLst/>
@@ -5601,8 +7415,8 @@
         </p:blipFill>
         <p:spPr>
           <a:xfrm>
-            <a:off x="7117660" y="3316042"/>
-            <a:ext cx="1769269" cy="1769269"/>
+            <a:off x="8708397" y="4085888"/>
+            <a:ext cx="1412450" cy="1412450"/>
           </a:xfrm>
           <a:prstGeom prst="rect">
             <a:avLst/>
@@ -5631,8 +7445,164 @@
         </p:blipFill>
         <p:spPr>
           <a:xfrm>
-            <a:off x="1935471" y="3679794"/>
-            <a:ext cx="1932003" cy="1041766"/>
+            <a:off x="5219169" y="4378352"/>
+            <a:ext cx="1412450" cy="761615"/>
+          </a:xfrm>
+          <a:prstGeom prst="rect">
+            <a:avLst/>
+          </a:prstGeom>
+        </p:spPr>
+      </p:pic>
+      <p:pic>
+        <p:nvPicPr>
+          <p:cNvPr id="8" name="Picture 7">
+            <a:extLst>
+              <a:ext uri="{FF2B5EF4-FFF2-40B4-BE49-F238E27FC236}">
+                <a16:creationId xmlns:a16="http://schemas.microsoft.com/office/drawing/2014/main" id="{9BEC0448-241B-45A5-AA97-DF4813883EE8}"/>
+              </a:ext>
+            </a:extLst>
+          </p:cNvPr>
+          <p:cNvPicPr>
+            <a:picLocks noChangeAspect="1"/>
+          </p:cNvPicPr>
+          <p:nvPr/>
+        </p:nvPicPr>
+        <p:blipFill>
+          <a:blip r:embed="rId6"/>
+          <a:stretch>
+            <a:fillRect/>
+          </a:stretch>
+        </p:blipFill>
+        <p:spPr>
+          <a:xfrm>
+            <a:off x="1918727" y="1341261"/>
+            <a:ext cx="904372" cy="1052203"/>
+          </a:xfrm>
+          <a:prstGeom prst="rect">
+            <a:avLst/>
+          </a:prstGeom>
+        </p:spPr>
+      </p:pic>
+      <p:pic>
+        <p:nvPicPr>
+          <p:cNvPr id="9" name="Picture 8">
+            <a:extLst>
+              <a:ext uri="{FF2B5EF4-FFF2-40B4-BE49-F238E27FC236}">
+                <a16:creationId xmlns:a16="http://schemas.microsoft.com/office/drawing/2014/main" id="{C8D7D3BF-878B-475F-A568-511C34EFFE7B}"/>
+              </a:ext>
+            </a:extLst>
+          </p:cNvPr>
+          <p:cNvPicPr>
+            <a:picLocks noChangeAspect="1"/>
+          </p:cNvPicPr>
+          <p:nvPr/>
+        </p:nvPicPr>
+        <p:blipFill>
+          <a:blip r:embed="rId7"/>
+          <a:stretch>
+            <a:fillRect/>
+          </a:stretch>
+        </p:blipFill>
+        <p:spPr>
+          <a:xfrm>
+            <a:off x="1375222" y="3116910"/>
+            <a:ext cx="1909516" cy="773543"/>
+          </a:xfrm>
+          <a:prstGeom prst="rect">
+            <a:avLst/>
+          </a:prstGeom>
+        </p:spPr>
+      </p:pic>
+      <p:pic>
+        <p:nvPicPr>
+          <p:cNvPr id="11" name="Picture 10">
+            <a:extLst>
+              <a:ext uri="{FF2B5EF4-FFF2-40B4-BE49-F238E27FC236}">
+                <a16:creationId xmlns:a16="http://schemas.microsoft.com/office/drawing/2014/main" id="{4FA75866-6BAA-4905-B33B-0B2166BA0AE8}"/>
+              </a:ext>
+            </a:extLst>
+          </p:cNvPr>
+          <p:cNvPicPr>
+            <a:picLocks noChangeAspect="1"/>
+          </p:cNvPicPr>
+          <p:nvPr/>
+        </p:nvPicPr>
+        <p:blipFill>
+          <a:blip r:embed="rId8"/>
+          <a:stretch>
+            <a:fillRect/>
+          </a:stretch>
+        </p:blipFill>
+        <p:spPr>
+          <a:xfrm>
+            <a:off x="4805224" y="3148666"/>
+            <a:ext cx="2314667" cy="554713"/>
+          </a:xfrm>
+          <a:prstGeom prst="rect">
+            <a:avLst/>
+          </a:prstGeom>
+        </p:spPr>
+      </p:pic>
+      <p:pic>
+        <p:nvPicPr>
+          <p:cNvPr id="12" name="Picture 11">
+            <a:extLst>
+              <a:ext uri="{FF2B5EF4-FFF2-40B4-BE49-F238E27FC236}">
+                <a16:creationId xmlns:a16="http://schemas.microsoft.com/office/drawing/2014/main" id="{2F309BC5-E153-4B52-8517-E24BD6676474}"/>
+              </a:ext>
+            </a:extLst>
+          </p:cNvPr>
+          <p:cNvPicPr>
+            <a:picLocks noChangeAspect="1"/>
+          </p:cNvPicPr>
+          <p:nvPr/>
+        </p:nvPicPr>
+        <p:blipFill>
+          <a:blip r:embed="rId9"/>
+          <a:stretch>
+            <a:fillRect/>
+          </a:stretch>
+        </p:blipFill>
+        <p:spPr>
+          <a:xfrm>
+            <a:off x="1518968" y="4378352"/>
+            <a:ext cx="1552706" cy="869515"/>
+          </a:xfrm>
+          <a:prstGeom prst="rect">
+            <a:avLst/>
+          </a:prstGeom>
+        </p:spPr>
+      </p:pic>
+      <p:pic>
+        <p:nvPicPr>
+          <p:cNvPr id="15" name="Picture 14" descr="Logo&#10;&#10;Description automatically generated">
+            <a:extLst>
+              <a:ext uri="{FF2B5EF4-FFF2-40B4-BE49-F238E27FC236}">
+                <a16:creationId xmlns:a16="http://schemas.microsoft.com/office/drawing/2014/main" id="{37D91302-385B-4588-AD48-79EF3A7940B1}"/>
+              </a:ext>
+            </a:extLst>
+          </p:cNvPr>
+          <p:cNvPicPr>
+            <a:picLocks noChangeAspect="1"/>
+          </p:cNvPicPr>
+          <p:nvPr/>
+        </p:nvPicPr>
+        <p:blipFill>
+          <a:blip r:embed="rId10">
+            <a:extLst>
+              <a:ext uri="{28A0092B-C50C-407E-A947-70E740481C1C}">
+                <a14:useLocalDpi xmlns:a14="http://schemas.microsoft.com/office/drawing/2010/main" val="0"/>
+              </a:ext>
+            </a:extLst>
+          </a:blip>
+          <a:stretch>
+            <a:fillRect/>
+          </a:stretch>
+        </p:blipFill>
+        <p:spPr>
+          <a:xfrm>
+            <a:off x="8517666" y="3116910"/>
+            <a:ext cx="1934197" cy="554713"/>
           </a:xfrm>
           <a:prstGeom prst="rect">
             <a:avLst/>
@@ -5928,6 +7898,582 @@
           </a:p>
         </p:txBody>
       </p:sp>
+      <p:sp>
+        <p:nvSpPr>
+          <p:cNvPr id="4" name="TextBox 3">
+            <a:extLst>
+              <a:ext uri="{FF2B5EF4-FFF2-40B4-BE49-F238E27FC236}">
+                <a16:creationId xmlns:a16="http://schemas.microsoft.com/office/drawing/2014/main" id="{3178FC24-ADF5-4858-A55F-CD3A28A6DB12}"/>
+              </a:ext>
+            </a:extLst>
+          </p:cNvPr>
+          <p:cNvSpPr txBox="1"/>
+          <p:nvPr/>
+        </p:nvSpPr>
+        <p:spPr>
+          <a:xfrm>
+            <a:off x="665825" y="1180731"/>
+            <a:ext cx="6183616" cy="3631763"/>
+          </a:xfrm>
+          <a:prstGeom prst="rect">
+            <a:avLst/>
+          </a:prstGeom>
+          <a:noFill/>
+        </p:spPr>
+        <p:txBody>
+          <a:bodyPr wrap="none" rtlCol="0">
+            <a:spAutoFit/>
+          </a:bodyPr>
+          <a:lstStyle/>
+          <a:p>
+            <a:pPr marL="285750" indent="-285750">
+              <a:spcAft>
+                <a:spcPts val="6000"/>
+              </a:spcAft>
+              <a:buFont typeface="Arial" panose="020B0604020202020204" pitchFamily="34" charset="0"/>
+              <a:buChar char="•"/>
+            </a:pPr>
+            <a:r>
+              <a:rPr lang="en-US" sz="2000" dirty="0" err="1">
+                <a:solidFill>
+                  <a:schemeClr val="accent2"/>
+                </a:solidFill>
+              </a:rPr>
+              <a:t>Odbacivanje</a:t>
+            </a:r>
+            <a:r>
+              <a:rPr lang="en-US" sz="2000" dirty="0">
+                <a:solidFill>
+                  <a:schemeClr val="accent2"/>
+                </a:solidFill>
+              </a:rPr>
+              <a:t> </a:t>
+            </a:r>
+            <a:r>
+              <a:rPr lang="en-US" sz="2000" dirty="0" err="1">
+                <a:solidFill>
+                  <a:schemeClr val="accent2"/>
+                </a:solidFill>
+              </a:rPr>
+              <a:t>redova</a:t>
+            </a:r>
+            <a:r>
+              <a:rPr lang="en-US" sz="2000" dirty="0">
+                <a:solidFill>
+                  <a:schemeClr val="accent2"/>
+                </a:solidFill>
+              </a:rPr>
+              <a:t> </a:t>
+            </a:r>
+            <a:r>
+              <a:rPr lang="en-US" sz="2000" dirty="0" err="1">
+                <a:solidFill>
+                  <a:schemeClr val="accent2"/>
+                </a:solidFill>
+              </a:rPr>
+              <a:t>sa</a:t>
+            </a:r>
+            <a:r>
+              <a:rPr lang="en-US" sz="2000" dirty="0">
+                <a:solidFill>
+                  <a:schemeClr val="accent2"/>
+                </a:solidFill>
+              </a:rPr>
+              <a:t> </a:t>
+            </a:r>
+            <a:r>
+              <a:rPr lang="en-US" sz="2000" dirty="0" err="1">
+                <a:solidFill>
+                  <a:schemeClr val="accent2"/>
+                </a:solidFill>
+              </a:rPr>
+              <a:t>svim</a:t>
+            </a:r>
+            <a:r>
+              <a:rPr lang="en-US" sz="2000" dirty="0">
+                <a:solidFill>
+                  <a:schemeClr val="accent2"/>
+                </a:solidFill>
+              </a:rPr>
+              <a:t> </a:t>
+            </a:r>
+            <a:r>
+              <a:rPr lang="en-US" sz="2000" dirty="0" err="1">
+                <a:solidFill>
+                  <a:schemeClr val="accent2"/>
+                </a:solidFill>
+              </a:rPr>
+              <a:t>nedostaju</a:t>
+            </a:r>
+            <a:r>
+              <a:rPr lang="sr-Latn-RS" sz="2000" dirty="0" err="1">
+                <a:solidFill>
+                  <a:schemeClr val="accent2"/>
+                </a:solidFill>
+              </a:rPr>
+              <a:t>ćim</a:t>
+            </a:r>
+            <a:r>
+              <a:rPr lang="sr-Latn-RS" sz="2000" dirty="0">
+                <a:solidFill>
+                  <a:schemeClr val="accent2"/>
+                </a:solidFill>
+              </a:rPr>
+              <a:t> vrednostima</a:t>
+            </a:r>
+            <a:endParaRPr lang="en-US" sz="2000" dirty="0">
+              <a:solidFill>
+                <a:schemeClr val="accent2"/>
+              </a:solidFill>
+            </a:endParaRPr>
+          </a:p>
+          <a:p>
+            <a:pPr marL="285750" indent="-285750">
+              <a:spcAft>
+                <a:spcPts val="6000"/>
+              </a:spcAft>
+              <a:buFont typeface="Arial" panose="020B0604020202020204" pitchFamily="34" charset="0"/>
+              <a:buChar char="•"/>
+            </a:pPr>
+            <a:r>
+              <a:rPr lang="en-US" sz="2000" dirty="0" err="1">
+                <a:solidFill>
+                  <a:schemeClr val="accent2"/>
+                </a:solidFill>
+              </a:rPr>
+              <a:t>Konverzija</a:t>
+            </a:r>
+            <a:r>
+              <a:rPr lang="en-US" sz="2000" dirty="0">
+                <a:solidFill>
+                  <a:schemeClr val="accent2"/>
+                </a:solidFill>
+              </a:rPr>
+              <a:t> </a:t>
+            </a:r>
+            <a:r>
+              <a:rPr lang="en-US" sz="2000" dirty="0" err="1">
+                <a:solidFill>
+                  <a:schemeClr val="accent2"/>
+                </a:solidFill>
+              </a:rPr>
+              <a:t>tipova</a:t>
+            </a:r>
+            <a:r>
+              <a:rPr lang="en-US" sz="2000" dirty="0">
+                <a:solidFill>
+                  <a:schemeClr val="accent2"/>
+                </a:solidFill>
+              </a:rPr>
+              <a:t> </a:t>
+            </a:r>
+            <a:r>
+              <a:rPr lang="en-US" sz="2000" dirty="0" err="1">
+                <a:solidFill>
+                  <a:schemeClr val="accent2"/>
+                </a:solidFill>
+              </a:rPr>
+              <a:t>vrednosti</a:t>
+            </a:r>
+            <a:endParaRPr lang="en-US" sz="2000" dirty="0">
+              <a:solidFill>
+                <a:schemeClr val="accent2"/>
+              </a:solidFill>
+            </a:endParaRPr>
+          </a:p>
+          <a:p>
+            <a:pPr marL="285750" indent="-285750">
+              <a:spcAft>
+                <a:spcPts val="6000"/>
+              </a:spcAft>
+              <a:buFont typeface="Arial" panose="020B0604020202020204" pitchFamily="34" charset="0"/>
+              <a:buChar char="•"/>
+            </a:pPr>
+            <a:r>
+              <a:rPr lang="en-US" sz="2000" dirty="0" err="1">
+                <a:solidFill>
+                  <a:schemeClr val="accent2"/>
+                </a:solidFill>
+              </a:rPr>
+              <a:t>Zamena</a:t>
+            </a:r>
+            <a:r>
+              <a:rPr lang="en-US" sz="2000" dirty="0">
+                <a:solidFill>
+                  <a:schemeClr val="accent2"/>
+                </a:solidFill>
+              </a:rPr>
+              <a:t> </a:t>
+            </a:r>
+            <a:r>
+              <a:rPr lang="en-US" sz="2000" dirty="0" err="1">
+                <a:solidFill>
+                  <a:schemeClr val="accent2"/>
+                </a:solidFill>
+              </a:rPr>
+              <a:t>nedostaju</a:t>
+            </a:r>
+            <a:r>
+              <a:rPr lang="sr-Latn-RS" sz="2000" dirty="0" err="1">
+                <a:solidFill>
+                  <a:schemeClr val="accent2"/>
+                </a:solidFill>
+              </a:rPr>
+              <a:t>ćih</a:t>
+            </a:r>
+            <a:r>
+              <a:rPr lang="sr-Latn-RS" sz="2000" dirty="0">
+                <a:solidFill>
+                  <a:schemeClr val="accent2"/>
+                </a:solidFill>
+              </a:rPr>
+              <a:t> vrednosti</a:t>
+            </a:r>
+          </a:p>
+          <a:p>
+            <a:pPr marL="285750" indent="-285750">
+              <a:spcAft>
+                <a:spcPts val="6000"/>
+              </a:spcAft>
+              <a:buFont typeface="Arial" panose="020B0604020202020204" pitchFamily="34" charset="0"/>
+              <a:buChar char="•"/>
+            </a:pPr>
+            <a:r>
+              <a:rPr lang="sr-Latn-RS" sz="2000" dirty="0" err="1">
+                <a:solidFill>
+                  <a:schemeClr val="accent2"/>
+                </a:solidFill>
+              </a:rPr>
+              <a:t>Labelarno</a:t>
+            </a:r>
+            <a:r>
+              <a:rPr lang="sr-Latn-RS" sz="2000" dirty="0">
+                <a:solidFill>
+                  <a:schemeClr val="accent2"/>
+                </a:solidFill>
+              </a:rPr>
+              <a:t> </a:t>
+            </a:r>
+            <a:r>
+              <a:rPr lang="sr-Latn-RS" sz="2000" dirty="0" err="1">
+                <a:solidFill>
+                  <a:schemeClr val="accent2"/>
+                </a:solidFill>
+              </a:rPr>
+              <a:t>enkodovanje</a:t>
+            </a:r>
+            <a:endParaRPr lang="sr-Latn-RS" sz="2000" dirty="0">
+              <a:solidFill>
+                <a:schemeClr val="accent2"/>
+              </a:solidFill>
+            </a:endParaRPr>
+          </a:p>
+        </p:txBody>
+      </p:sp>
+      <p:pic>
+        <p:nvPicPr>
+          <p:cNvPr id="5" name="Picture 4">
+            <a:extLst>
+              <a:ext uri="{FF2B5EF4-FFF2-40B4-BE49-F238E27FC236}">
+                <a16:creationId xmlns:a16="http://schemas.microsoft.com/office/drawing/2014/main" id="{B2681883-5E14-4BE7-B900-49D2CC78F986}"/>
+              </a:ext>
+            </a:extLst>
+          </p:cNvPr>
+          <p:cNvPicPr>
+            <a:picLocks noChangeAspect="1"/>
+          </p:cNvPicPr>
+          <p:nvPr/>
+        </p:nvPicPr>
+        <p:blipFill>
+          <a:blip r:embed="rId2"/>
+          <a:stretch>
+            <a:fillRect/>
+          </a:stretch>
+        </p:blipFill>
+        <p:spPr>
+          <a:xfrm>
+            <a:off x="7861109" y="954193"/>
+            <a:ext cx="3538677" cy="1033866"/>
+          </a:xfrm>
+          <a:prstGeom prst="rect">
+            <a:avLst/>
+          </a:prstGeom>
+        </p:spPr>
+      </p:pic>
+      <p:sp>
+        <p:nvSpPr>
+          <p:cNvPr id="6" name="Arrow: Right 5">
+            <a:extLst>
+              <a:ext uri="{FF2B5EF4-FFF2-40B4-BE49-F238E27FC236}">
+                <a16:creationId xmlns:a16="http://schemas.microsoft.com/office/drawing/2014/main" id="{01AA8D29-3E3D-449D-B0DA-41B888BF3E14}"/>
+              </a:ext>
+            </a:extLst>
+          </p:cNvPr>
+          <p:cNvSpPr/>
+          <p:nvPr/>
+        </p:nvSpPr>
+        <p:spPr>
+          <a:xfrm>
+            <a:off x="6956417" y="1264732"/>
+            <a:ext cx="558765" cy="239696"/>
+          </a:xfrm>
+          <a:prstGeom prst="rightArrow">
+            <a:avLst/>
+          </a:prstGeom>
+        </p:spPr>
+        <p:style>
+          <a:lnRef idx="2">
+            <a:schemeClr val="accent1">
+              <a:shade val="50000"/>
+            </a:schemeClr>
+          </a:lnRef>
+          <a:fillRef idx="1">
+            <a:schemeClr val="accent1"/>
+          </a:fillRef>
+          <a:effectRef idx="0">
+            <a:schemeClr val="accent1"/>
+          </a:effectRef>
+          <a:fontRef idx="minor">
+            <a:schemeClr val="lt1"/>
+          </a:fontRef>
+        </p:style>
+        <p:txBody>
+          <a:bodyPr rtlCol="0" anchor="ctr"/>
+          <a:lstStyle/>
+          <a:p>
+            <a:pPr algn="ctr"/>
+            <a:endParaRPr lang="sr-Latn-RS"/>
+          </a:p>
+        </p:txBody>
+      </p:sp>
+      <p:pic>
+        <p:nvPicPr>
+          <p:cNvPr id="8" name="Picture 7">
+            <a:extLst>
+              <a:ext uri="{FF2B5EF4-FFF2-40B4-BE49-F238E27FC236}">
+                <a16:creationId xmlns:a16="http://schemas.microsoft.com/office/drawing/2014/main" id="{7852896F-5238-4FA3-B0E5-66A7DE831FB3}"/>
+              </a:ext>
+            </a:extLst>
+          </p:cNvPr>
+          <p:cNvPicPr>
+            <a:picLocks noChangeAspect="1"/>
+          </p:cNvPicPr>
+          <p:nvPr/>
+        </p:nvPicPr>
+        <p:blipFill>
+          <a:blip r:embed="rId3"/>
+          <a:stretch>
+            <a:fillRect/>
+          </a:stretch>
+        </p:blipFill>
+        <p:spPr>
+          <a:xfrm>
+            <a:off x="5338580" y="2133148"/>
+            <a:ext cx="4508638" cy="595481"/>
+          </a:xfrm>
+          <a:prstGeom prst="rect">
+            <a:avLst/>
+          </a:prstGeom>
+        </p:spPr>
+      </p:pic>
+      <p:sp>
+        <p:nvSpPr>
+          <p:cNvPr id="9" name="Arrow: Right 8">
+            <a:extLst>
+              <a:ext uri="{FF2B5EF4-FFF2-40B4-BE49-F238E27FC236}">
+                <a16:creationId xmlns:a16="http://schemas.microsoft.com/office/drawing/2014/main" id="{E25AE0A4-D5B3-4A36-B091-18AB29204D5E}"/>
+              </a:ext>
+            </a:extLst>
+          </p:cNvPr>
+          <p:cNvSpPr/>
+          <p:nvPr/>
+        </p:nvSpPr>
+        <p:spPr>
+          <a:xfrm>
+            <a:off x="4558246" y="2329826"/>
+            <a:ext cx="558765" cy="239696"/>
+          </a:xfrm>
+          <a:prstGeom prst="rightArrow">
+            <a:avLst/>
+          </a:prstGeom>
+        </p:spPr>
+        <p:style>
+          <a:lnRef idx="2">
+            <a:schemeClr val="accent1">
+              <a:shade val="50000"/>
+            </a:schemeClr>
+          </a:lnRef>
+          <a:fillRef idx="1">
+            <a:schemeClr val="accent1"/>
+          </a:fillRef>
+          <a:effectRef idx="0">
+            <a:schemeClr val="accent1"/>
+          </a:effectRef>
+          <a:fontRef idx="minor">
+            <a:schemeClr val="lt1"/>
+          </a:fontRef>
+        </p:style>
+        <p:txBody>
+          <a:bodyPr rtlCol="0" anchor="ctr"/>
+          <a:lstStyle/>
+          <a:p>
+            <a:pPr algn="ctr"/>
+            <a:endParaRPr lang="sr-Latn-RS"/>
+          </a:p>
+        </p:txBody>
+      </p:sp>
+      <p:pic>
+        <p:nvPicPr>
+          <p:cNvPr id="11" name="Picture 10">
+            <a:extLst>
+              <a:ext uri="{FF2B5EF4-FFF2-40B4-BE49-F238E27FC236}">
+                <a16:creationId xmlns:a16="http://schemas.microsoft.com/office/drawing/2014/main" id="{DD66CA8F-8753-45FE-993D-244898FCB1B9}"/>
+              </a:ext>
+            </a:extLst>
+          </p:cNvPr>
+          <p:cNvPicPr>
+            <a:picLocks noChangeAspect="1"/>
+          </p:cNvPicPr>
+          <p:nvPr/>
+        </p:nvPicPr>
+        <p:blipFill>
+          <a:blip r:embed="rId4"/>
+          <a:stretch>
+            <a:fillRect/>
+          </a:stretch>
+        </p:blipFill>
+        <p:spPr>
+          <a:xfrm>
+            <a:off x="5338580" y="3231132"/>
+            <a:ext cx="6397700" cy="537896"/>
+          </a:xfrm>
+          <a:prstGeom prst="rect">
+            <a:avLst/>
+          </a:prstGeom>
+        </p:spPr>
+      </p:pic>
+      <p:sp>
+        <p:nvSpPr>
+          <p:cNvPr id="12" name="Arrow: Right 11">
+            <a:extLst>
+              <a:ext uri="{FF2B5EF4-FFF2-40B4-BE49-F238E27FC236}">
+                <a16:creationId xmlns:a16="http://schemas.microsoft.com/office/drawing/2014/main" id="{61CEE341-4288-4182-87A1-D7DAA92290EC}"/>
+              </a:ext>
+            </a:extLst>
+          </p:cNvPr>
+          <p:cNvSpPr/>
+          <p:nvPr/>
+        </p:nvSpPr>
+        <p:spPr>
+          <a:xfrm>
+            <a:off x="4582481" y="3380232"/>
+            <a:ext cx="558765" cy="239696"/>
+          </a:xfrm>
+          <a:prstGeom prst="rightArrow">
+            <a:avLst/>
+          </a:prstGeom>
+        </p:spPr>
+        <p:style>
+          <a:lnRef idx="2">
+            <a:schemeClr val="accent1">
+              <a:shade val="50000"/>
+            </a:schemeClr>
+          </a:lnRef>
+          <a:fillRef idx="1">
+            <a:schemeClr val="accent1"/>
+          </a:fillRef>
+          <a:effectRef idx="0">
+            <a:schemeClr val="accent1"/>
+          </a:effectRef>
+          <a:fontRef idx="minor">
+            <a:schemeClr val="lt1"/>
+          </a:fontRef>
+        </p:style>
+        <p:txBody>
+          <a:bodyPr rtlCol="0" anchor="ctr"/>
+          <a:lstStyle/>
+          <a:p>
+            <a:pPr algn="ctr"/>
+            <a:endParaRPr lang="sr-Latn-RS" dirty="0"/>
+          </a:p>
+        </p:txBody>
+      </p:sp>
+      <p:pic>
+        <p:nvPicPr>
+          <p:cNvPr id="14" name="Picture 13">
+            <a:extLst>
+              <a:ext uri="{FF2B5EF4-FFF2-40B4-BE49-F238E27FC236}">
+                <a16:creationId xmlns:a16="http://schemas.microsoft.com/office/drawing/2014/main" id="{2FA8F111-580D-49B3-B9D1-D740312F9909}"/>
+              </a:ext>
+            </a:extLst>
+          </p:cNvPr>
+          <p:cNvPicPr>
+            <a:picLocks noChangeAspect="1"/>
+          </p:cNvPicPr>
+          <p:nvPr/>
+        </p:nvPicPr>
+        <p:blipFill>
+          <a:blip r:embed="rId5"/>
+          <a:stretch>
+            <a:fillRect/>
+          </a:stretch>
+        </p:blipFill>
+        <p:spPr>
+          <a:xfrm>
+            <a:off x="5411342" y="4059206"/>
+            <a:ext cx="3881518" cy="982560"/>
+          </a:xfrm>
+          <a:prstGeom prst="rect">
+            <a:avLst/>
+          </a:prstGeom>
+        </p:spPr>
+      </p:pic>
+      <p:sp>
+        <p:nvSpPr>
+          <p:cNvPr id="15" name="Arrow: Right 14">
+            <a:extLst>
+              <a:ext uri="{FF2B5EF4-FFF2-40B4-BE49-F238E27FC236}">
+                <a16:creationId xmlns:a16="http://schemas.microsoft.com/office/drawing/2014/main" id="{A9B35779-8F58-49D1-91B5-277B828DAEBE}"/>
+              </a:ext>
+            </a:extLst>
+          </p:cNvPr>
+          <p:cNvSpPr/>
+          <p:nvPr/>
+        </p:nvSpPr>
+        <p:spPr>
+          <a:xfrm>
+            <a:off x="4558245" y="4497901"/>
+            <a:ext cx="558765" cy="239696"/>
+          </a:xfrm>
+          <a:prstGeom prst="rightArrow">
+            <a:avLst/>
+          </a:prstGeom>
+        </p:spPr>
+        <p:style>
+          <a:lnRef idx="2">
+            <a:schemeClr val="accent1">
+              <a:shade val="50000"/>
+            </a:schemeClr>
+          </a:lnRef>
+          <a:fillRef idx="1">
+            <a:schemeClr val="accent1"/>
+          </a:fillRef>
+          <a:effectRef idx="0">
+            <a:schemeClr val="accent1"/>
+          </a:effectRef>
+          <a:fontRef idx="minor">
+            <a:schemeClr val="lt1"/>
+          </a:fontRef>
+        </p:style>
+        <p:txBody>
+          <a:bodyPr rtlCol="0" anchor="ctr"/>
+          <a:lstStyle/>
+          <a:p>
+            <a:pPr algn="ctr"/>
+            <a:endParaRPr lang="sr-Latn-RS" dirty="0"/>
+          </a:p>
+        </p:txBody>
+      </p:sp>
     </p:spTree>
     <p:extLst>
       <p:ext uri="{BB962C8B-B14F-4D97-AF65-F5344CB8AC3E}">
@@ -6019,14 +8565,77 @@
         </p:blipFill>
         <p:spPr>
           <a:xfrm>
-            <a:off x="866548" y="836822"/>
-            <a:ext cx="8357853" cy="4294472"/>
+            <a:off x="1070734" y="1613155"/>
+            <a:ext cx="8357853" cy="4288974"/>
           </a:xfrm>
           <a:prstGeom prst="rect">
             <a:avLst/>
           </a:prstGeom>
         </p:spPr>
       </p:pic>
+      <p:sp>
+        <p:nvSpPr>
+          <p:cNvPr id="6" name="TextBox 5">
+            <a:extLst>
+              <a:ext uri="{FF2B5EF4-FFF2-40B4-BE49-F238E27FC236}">
+                <a16:creationId xmlns:a16="http://schemas.microsoft.com/office/drawing/2014/main" id="{2F781989-9EB5-44FC-9D5B-00BDFFFCB4C7}"/>
+              </a:ext>
+            </a:extLst>
+          </p:cNvPr>
+          <p:cNvSpPr txBox="1"/>
+          <p:nvPr/>
+        </p:nvSpPr>
+        <p:spPr>
+          <a:xfrm>
+            <a:off x="613467" y="1105323"/>
+            <a:ext cx="10239418" cy="1015663"/>
+          </a:xfrm>
+          <a:prstGeom prst="rect">
+            <a:avLst/>
+          </a:prstGeom>
+          <a:noFill/>
+        </p:spPr>
+        <p:txBody>
+          <a:bodyPr wrap="square">
+            <a:spAutoFit/>
+          </a:bodyPr>
+          <a:lstStyle/>
+          <a:p>
+            <a:pPr marL="285750" indent="-285750">
+              <a:spcAft>
+                <a:spcPts val="2400"/>
+              </a:spcAft>
+              <a:buFont typeface="Arial" panose="020B0604020202020204" pitchFamily="34" charset="0"/>
+              <a:buChar char="•"/>
+            </a:pPr>
+            <a:r>
+              <a:rPr lang="sr-Latn-RS" sz="2000" dirty="0">
+                <a:solidFill>
+                  <a:schemeClr val="accent2"/>
+                </a:solidFill>
+              </a:rPr>
+              <a:t>Formula iz finansija koja računa skor visine kreditnog rizika preduzeća</a:t>
+            </a:r>
+          </a:p>
+          <a:p>
+            <a:pPr marL="285750" indent="-285750">
+              <a:spcAft>
+                <a:spcPts val="2400"/>
+              </a:spcAft>
+              <a:buFont typeface="Arial" panose="020B0604020202020204" pitchFamily="34" charset="0"/>
+              <a:buChar char="•"/>
+            </a:pPr>
+            <a:r>
+              <a:rPr lang="sr-Latn-RS" sz="2000" dirty="0">
+                <a:solidFill>
+                  <a:schemeClr val="accent2"/>
+                </a:solidFill>
+              </a:rPr>
+              <a:t>Postoji nekoliko verzija u zavisnosti od Pravne forme, u programu se obrađuju 3 verzije</a:t>
+            </a:r>
+          </a:p>
+        </p:txBody>
+      </p:sp>
     </p:spTree>
     <p:extLst>
       <p:ext uri="{BB962C8B-B14F-4D97-AF65-F5344CB8AC3E}">
@@ -6062,7 +8671,7 @@
           <p:cNvPr id="2" name="TextBox 1">
             <a:extLst>
               <a:ext uri="{FF2B5EF4-FFF2-40B4-BE49-F238E27FC236}">
-                <a16:creationId xmlns:a16="http://schemas.microsoft.com/office/drawing/2014/main" id="{960997FA-6A10-4A88-A658-971CF65FDFD6}"/>
+                <a16:creationId xmlns:a16="http://schemas.microsoft.com/office/drawing/2014/main" id="{1A0079AC-00A5-403B-98DB-CA2395E8CC55}"/>
               </a:ext>
             </a:extLst>
           </p:cNvPr>
@@ -6072,7 +8681,7 @@
         <p:spPr>
           <a:xfrm>
             <a:off x="577048" y="186430"/>
-            <a:ext cx="2922980" cy="584775"/>
+            <a:ext cx="5083956" cy="584775"/>
           </a:xfrm>
           <a:prstGeom prst="rect">
             <a:avLst/>
@@ -6091,7 +8700,7 @@
                   <a:schemeClr val="accent2"/>
                 </a:solidFill>
               </a:rPr>
-              <a:t>Fičer</a:t>
+              <a:t>Eksplorativna</a:t>
             </a:r>
             <a:r>
               <a:rPr lang="sr-Latn-RS" sz="3200" dirty="0">
@@ -6099,7 +8708,173 @@
                   <a:schemeClr val="accent2"/>
                 </a:solidFill>
               </a:rPr>
-              <a:t> Inženjering</a:t>
+              <a:t> analiza atributa</a:t>
+            </a:r>
+          </a:p>
+        </p:txBody>
+      </p:sp>
+      <p:pic>
+        <p:nvPicPr>
+          <p:cNvPr id="6" name="Picture 5">
+            <a:extLst>
+              <a:ext uri="{FF2B5EF4-FFF2-40B4-BE49-F238E27FC236}">
+                <a16:creationId xmlns:a16="http://schemas.microsoft.com/office/drawing/2014/main" id="{DFD78D06-CEF8-4DDC-92B0-616A8813BFDC}"/>
+              </a:ext>
+            </a:extLst>
+          </p:cNvPr>
+          <p:cNvPicPr>
+            <a:picLocks noChangeAspect="1"/>
+          </p:cNvPicPr>
+          <p:nvPr/>
+        </p:nvPicPr>
+        <p:blipFill>
+          <a:blip r:embed="rId2"/>
+          <a:stretch>
+            <a:fillRect/>
+          </a:stretch>
+        </p:blipFill>
+        <p:spPr>
+          <a:xfrm>
+            <a:off x="983735" y="3054102"/>
+            <a:ext cx="2948750" cy="2713704"/>
+          </a:xfrm>
+          <a:prstGeom prst="rect">
+            <a:avLst/>
+          </a:prstGeom>
+          <a:ln w="12700">
+            <a:solidFill>
+              <a:schemeClr val="accent2"/>
+            </a:solidFill>
+          </a:ln>
+        </p:spPr>
+      </p:pic>
+      <p:pic>
+        <p:nvPicPr>
+          <p:cNvPr id="7" name="Picture 6">
+            <a:extLst>
+              <a:ext uri="{FF2B5EF4-FFF2-40B4-BE49-F238E27FC236}">
+                <a16:creationId xmlns:a16="http://schemas.microsoft.com/office/drawing/2014/main" id="{19CF8E2A-2513-4207-9161-28D25D03858F}"/>
+              </a:ext>
+            </a:extLst>
+          </p:cNvPr>
+          <p:cNvPicPr>
+            <a:picLocks noChangeAspect="1"/>
+          </p:cNvPicPr>
+          <p:nvPr/>
+        </p:nvPicPr>
+        <p:blipFill>
+          <a:blip r:embed="rId3"/>
+          <a:stretch>
+            <a:fillRect/>
+          </a:stretch>
+        </p:blipFill>
+        <p:spPr>
+          <a:xfrm>
+            <a:off x="5076672" y="3054102"/>
+            <a:ext cx="5532144" cy="2718263"/>
+          </a:xfrm>
+          <a:prstGeom prst="rect">
+            <a:avLst/>
+          </a:prstGeom>
+          <a:ln w="12700">
+            <a:solidFill>
+              <a:schemeClr val="accent2"/>
+            </a:solidFill>
+          </a:ln>
+        </p:spPr>
+      </p:pic>
+      <p:sp>
+        <p:nvSpPr>
+          <p:cNvPr id="3" name="TextBox 2">
+            <a:extLst>
+              <a:ext uri="{FF2B5EF4-FFF2-40B4-BE49-F238E27FC236}">
+                <a16:creationId xmlns:a16="http://schemas.microsoft.com/office/drawing/2014/main" id="{0FCAD0A2-3A4C-4842-9907-EADD1412D144}"/>
+              </a:ext>
+            </a:extLst>
+          </p:cNvPr>
+          <p:cNvSpPr txBox="1"/>
+          <p:nvPr/>
+        </p:nvSpPr>
+        <p:spPr>
+          <a:xfrm>
+            <a:off x="816745" y="1085635"/>
+            <a:ext cx="8332537" cy="1538883"/>
+          </a:xfrm>
+          <a:prstGeom prst="rect">
+            <a:avLst/>
+          </a:prstGeom>
+          <a:noFill/>
+        </p:spPr>
+        <p:txBody>
+          <a:bodyPr wrap="none" rtlCol="0">
+            <a:spAutoFit/>
+          </a:bodyPr>
+          <a:lstStyle/>
+          <a:p>
+            <a:pPr marL="285750" indent="-285750">
+              <a:spcAft>
+                <a:spcPts val="2400"/>
+              </a:spcAft>
+              <a:buFont typeface="Arial" panose="020B0604020202020204" pitchFamily="34" charset="0"/>
+              <a:buChar char="•"/>
+            </a:pPr>
+            <a:r>
+              <a:rPr lang="sr-Latn-RS" dirty="0">
+                <a:solidFill>
+                  <a:schemeClr val="accent2"/>
+                </a:solidFill>
+              </a:rPr>
+              <a:t>Predstavlja proces istraživanja podataka kako bi se izvukle korisne informacije</a:t>
+            </a:r>
+          </a:p>
+          <a:p>
+            <a:pPr marL="285750" indent="-285750">
+              <a:spcAft>
+                <a:spcPts val="2400"/>
+              </a:spcAft>
+              <a:buFont typeface="Arial" panose="020B0604020202020204" pitchFamily="34" charset="0"/>
+              <a:buChar char="•"/>
+            </a:pPr>
+            <a:r>
+              <a:rPr lang="sr-Latn-RS" dirty="0">
+                <a:solidFill>
+                  <a:schemeClr val="accent2"/>
+                </a:solidFill>
+              </a:rPr>
+              <a:t> Slika levo prikazuje </a:t>
+            </a:r>
+            <a:r>
+              <a:rPr lang="sr-Latn-RS" dirty="0" err="1">
+                <a:solidFill>
+                  <a:schemeClr val="accent2"/>
+                </a:solidFill>
+              </a:rPr>
+              <a:t>Heat</a:t>
+            </a:r>
+            <a:r>
+              <a:rPr lang="sr-Latn-RS" dirty="0">
+                <a:solidFill>
+                  <a:schemeClr val="accent2"/>
+                </a:solidFill>
+              </a:rPr>
+              <a:t> mapu sa međusobnim korelacijama bilansa stanja i uspeha</a:t>
+            </a:r>
+          </a:p>
+          <a:p>
+            <a:pPr marL="285750" indent="-285750">
+              <a:spcAft>
+                <a:spcPts val="2400"/>
+              </a:spcAft>
+              <a:buFont typeface="Arial" panose="020B0604020202020204" pitchFamily="34" charset="0"/>
+              <a:buChar char="•"/>
+            </a:pPr>
+            <a:r>
+              <a:rPr lang="sr-Latn-RS" dirty="0">
+                <a:solidFill>
+                  <a:schemeClr val="accent2"/>
+                </a:solidFill>
+              </a:rPr>
+              <a:t>Slika desno prikazuje raspodelu 4 kategorije rizika za svaki od iznosa kredita</a:t>
             </a:r>
           </a:p>
         </p:txBody>
@@ -6107,7 +8882,7 @@
     </p:spTree>
     <p:extLst>
       <p:ext uri="{BB962C8B-B14F-4D97-AF65-F5344CB8AC3E}">
-        <p14:creationId xmlns:p14="http://schemas.microsoft.com/office/powerpoint/2010/main" val="2062734099"/>
+        <p14:creationId xmlns:p14="http://schemas.microsoft.com/office/powerpoint/2010/main" val="3147203367"/>
       </p:ext>
     </p:extLst>
   </p:cSld>
@@ -6139,7 +8914,7 @@
           <p:cNvPr id="2" name="TextBox 1">
             <a:extLst>
               <a:ext uri="{FF2B5EF4-FFF2-40B4-BE49-F238E27FC236}">
-                <a16:creationId xmlns:a16="http://schemas.microsoft.com/office/drawing/2014/main" id="{5B8912B4-74CD-4DA2-B33F-8C5CD6EE8C60}"/>
+                <a16:creationId xmlns:a16="http://schemas.microsoft.com/office/drawing/2014/main" id="{960997FA-6A10-4A88-A658-971CF65FDFD6}"/>
               </a:ext>
             </a:extLst>
           </p:cNvPr>
@@ -6149,7 +8924,7 @@
         <p:spPr>
           <a:xfrm>
             <a:off x="577048" y="186430"/>
-            <a:ext cx="5145448" cy="584775"/>
+            <a:ext cx="2922980" cy="584775"/>
           </a:xfrm>
           <a:prstGeom prst="rect">
             <a:avLst/>
@@ -6163,33 +8938,28 @@
           <a:lstStyle/>
           <a:p>
             <a:r>
+              <a:rPr lang="sr-Latn-RS" sz="3200" dirty="0" err="1">
+                <a:solidFill>
+                  <a:schemeClr val="accent2"/>
+                </a:solidFill>
+              </a:rPr>
+              <a:t>Fičer</a:t>
+            </a:r>
+            <a:r>
               <a:rPr lang="sr-Latn-RS" sz="3200" dirty="0">
                 <a:solidFill>
                   <a:schemeClr val="accent2"/>
                 </a:solidFill>
               </a:rPr>
-              <a:t>Optimizacija </a:t>
-            </a:r>
-            <a:r>
-              <a:rPr lang="sr-Latn-RS" sz="3200" dirty="0" err="1">
-                <a:solidFill>
-                  <a:schemeClr val="accent2"/>
-                </a:solidFill>
-              </a:rPr>
-              <a:t>hiperparametara</a:t>
-            </a:r>
-            <a:endParaRPr lang="sr-Latn-RS" sz="3200" dirty="0">
-              <a:solidFill>
-                <a:schemeClr val="accent2"/>
-              </a:solidFill>
-            </a:endParaRPr>
+              <a:t> Inženjering</a:t>
+            </a:r>
           </a:p>
         </p:txBody>
       </p:sp>
     </p:spTree>
     <p:extLst>
       <p:ext uri="{BB962C8B-B14F-4D97-AF65-F5344CB8AC3E}">
-        <p14:creationId xmlns:p14="http://schemas.microsoft.com/office/powerpoint/2010/main" val="2477311884"/>
+        <p14:creationId xmlns:p14="http://schemas.microsoft.com/office/powerpoint/2010/main" val="2062734099"/>
       </p:ext>
     </p:extLst>
   </p:cSld>
@@ -6221,7 +8991,7 @@
           <p:cNvPr id="2" name="TextBox 1">
             <a:extLst>
               <a:ext uri="{FF2B5EF4-FFF2-40B4-BE49-F238E27FC236}">
-                <a16:creationId xmlns:a16="http://schemas.microsoft.com/office/drawing/2014/main" id="{5BEBD908-5EE6-474B-936D-86D8322C6E6E}"/>
+                <a16:creationId xmlns:a16="http://schemas.microsoft.com/office/drawing/2014/main" id="{5B8912B4-74CD-4DA2-B33F-8C5CD6EE8C60}"/>
               </a:ext>
             </a:extLst>
           </p:cNvPr>
@@ -6231,7 +9001,7 @@
         <p:spPr>
           <a:xfrm>
             <a:off x="577048" y="186430"/>
-            <a:ext cx="6762044" cy="584775"/>
+            <a:ext cx="5145448" cy="584775"/>
           </a:xfrm>
           <a:prstGeom prst="rect">
             <a:avLst/>
@@ -6250,7 +9020,7 @@
                   <a:schemeClr val="accent2"/>
                 </a:solidFill>
               </a:rPr>
-              <a:t>Obučavanje </a:t>
+              <a:t>Optimizacija </a:t>
             </a:r>
             <a:r>
               <a:rPr lang="sr-Latn-RS" sz="3200" dirty="0" err="1">
@@ -6258,23 +9028,181 @@
                   <a:schemeClr val="accent2"/>
                 </a:solidFill>
               </a:rPr>
-              <a:t>Gradijentnim</a:t>
-            </a:r>
-            <a:r>
-              <a:rPr lang="sr-Latn-RS" sz="3200" dirty="0">
-                <a:solidFill>
-                  <a:schemeClr val="accent2"/>
-                </a:solidFill>
-              </a:rPr>
-              <a:t> Podsticanjem</a:t>
-            </a:r>
-          </a:p>
-        </p:txBody>
-      </p:sp>
+              <a:t>hiperparametara</a:t>
+            </a:r>
+            <a:endParaRPr lang="sr-Latn-RS" sz="3200" dirty="0">
+              <a:solidFill>
+                <a:schemeClr val="accent2"/>
+              </a:solidFill>
+            </a:endParaRPr>
+          </a:p>
+        </p:txBody>
+      </p:sp>
+      <p:sp>
+        <p:nvSpPr>
+          <p:cNvPr id="5" name="TextBox 4">
+            <a:extLst>
+              <a:ext uri="{FF2B5EF4-FFF2-40B4-BE49-F238E27FC236}">
+                <a16:creationId xmlns:a16="http://schemas.microsoft.com/office/drawing/2014/main" id="{9A150DB5-EA54-4E88-993B-C8357788F1CD}"/>
+              </a:ext>
+            </a:extLst>
+          </p:cNvPr>
+          <p:cNvSpPr txBox="1"/>
+          <p:nvPr/>
+        </p:nvSpPr>
+        <p:spPr>
+          <a:xfrm>
+            <a:off x="656947" y="1096013"/>
+            <a:ext cx="8747844" cy="1661993"/>
+          </a:xfrm>
+          <a:prstGeom prst="rect">
+            <a:avLst/>
+          </a:prstGeom>
+          <a:noFill/>
+        </p:spPr>
+        <p:txBody>
+          <a:bodyPr wrap="none" rtlCol="0">
+            <a:spAutoFit/>
+          </a:bodyPr>
+          <a:lstStyle/>
+          <a:p>
+            <a:pPr marL="285750" indent="-285750">
+              <a:spcAft>
+                <a:spcPts val="1200"/>
+              </a:spcAft>
+              <a:buFont typeface="Arial" panose="020B0604020202020204" pitchFamily="34" charset="0"/>
+              <a:buChar char="•"/>
+            </a:pPr>
+            <a:r>
+              <a:rPr lang="sr-Latn-RS" dirty="0">
+                <a:solidFill>
+                  <a:schemeClr val="accent2"/>
+                </a:solidFill>
+              </a:rPr>
+              <a:t>Metoda iscrpne pretrage po </a:t>
+            </a:r>
+            <a:r>
+              <a:rPr lang="sr-Latn-RS" dirty="0" err="1">
+                <a:solidFill>
+                  <a:schemeClr val="accent2"/>
+                </a:solidFill>
+              </a:rPr>
+              <a:t>rešetci</a:t>
+            </a:r>
+            <a:endParaRPr lang="sr-Latn-RS" dirty="0">
+              <a:solidFill>
+                <a:schemeClr val="accent2"/>
+              </a:solidFill>
+            </a:endParaRPr>
+          </a:p>
+          <a:p>
+            <a:pPr marL="285750" indent="-285750">
+              <a:spcAft>
+                <a:spcPts val="1200"/>
+              </a:spcAft>
+              <a:buFont typeface="Arial" panose="020B0604020202020204" pitchFamily="34" charset="0"/>
+              <a:buChar char="•"/>
+            </a:pPr>
+            <a:r>
+              <a:rPr lang="sr-Latn-RS" dirty="0">
+                <a:solidFill>
+                  <a:schemeClr val="accent2"/>
+                </a:solidFill>
+              </a:rPr>
+              <a:t>Precizna metoda, ali sa velikom vremenskom kompleksnošću</a:t>
+            </a:r>
+          </a:p>
+          <a:p>
+            <a:pPr marL="285750" indent="-285750">
+              <a:spcAft>
+                <a:spcPts val="1200"/>
+              </a:spcAft>
+              <a:buFont typeface="Arial" panose="020B0604020202020204" pitchFamily="34" charset="0"/>
+              <a:buChar char="•"/>
+            </a:pPr>
+            <a:r>
+              <a:rPr lang="sr-Latn-RS" dirty="0">
+                <a:solidFill>
+                  <a:schemeClr val="accent2"/>
+                </a:solidFill>
+              </a:rPr>
+              <a:t>Za sve parametre i vrednosti nalazi najbolju kombinaciju isprobavanjem svih kombinacija</a:t>
+            </a:r>
+          </a:p>
+          <a:p>
+            <a:pPr marL="285750" indent="-285750">
+              <a:spcAft>
+                <a:spcPts val="1200"/>
+              </a:spcAft>
+              <a:buFont typeface="Arial" panose="020B0604020202020204" pitchFamily="34" charset="0"/>
+              <a:buChar char="•"/>
+            </a:pPr>
+            <a:r>
+              <a:rPr lang="sr-Latn-RS" dirty="0">
+                <a:solidFill>
+                  <a:schemeClr val="accent2"/>
+                </a:solidFill>
+              </a:rPr>
+              <a:t>Vremenski optimalnije, pametnije metode su </a:t>
+            </a:r>
+            <a:r>
+              <a:rPr lang="sr-Latn-RS" dirty="0" err="1">
+                <a:solidFill>
+                  <a:schemeClr val="accent2"/>
+                </a:solidFill>
+              </a:rPr>
+              <a:t>Bajesovska</a:t>
+            </a:r>
+            <a:r>
+              <a:rPr lang="sr-Latn-RS" dirty="0">
+                <a:solidFill>
+                  <a:schemeClr val="accent2"/>
+                </a:solidFill>
+              </a:rPr>
+              <a:t>, Genetski algoritmi itd.</a:t>
+            </a:r>
+          </a:p>
+        </p:txBody>
+      </p:sp>
+      <p:pic>
+        <p:nvPicPr>
+          <p:cNvPr id="6" name="Picture 5">
+            <a:extLst>
+              <a:ext uri="{FF2B5EF4-FFF2-40B4-BE49-F238E27FC236}">
+                <a16:creationId xmlns:a16="http://schemas.microsoft.com/office/drawing/2014/main" id="{E6BAF2A5-81A8-49F5-9F9B-C7EB7A41AEBB}"/>
+              </a:ext>
+            </a:extLst>
+          </p:cNvPr>
+          <p:cNvPicPr>
+            <a:picLocks noChangeAspect="1"/>
+          </p:cNvPicPr>
+          <p:nvPr/>
+        </p:nvPicPr>
+        <p:blipFill>
+          <a:blip r:embed="rId2"/>
+          <a:stretch>
+            <a:fillRect/>
+          </a:stretch>
+        </p:blipFill>
+        <p:spPr>
+          <a:xfrm>
+            <a:off x="811491" y="3164012"/>
+            <a:ext cx="6651312" cy="2432515"/>
+          </a:xfrm>
+          <a:prstGeom prst="rect">
+            <a:avLst/>
+          </a:prstGeom>
+          <a:ln w="28575">
+            <a:solidFill>
+              <a:schemeClr val="accent2"/>
+            </a:solidFill>
+          </a:ln>
+        </p:spPr>
+      </p:pic>
     </p:spTree>
     <p:extLst>
       <p:ext uri="{BB962C8B-B14F-4D97-AF65-F5344CB8AC3E}">
-        <p14:creationId xmlns:p14="http://schemas.microsoft.com/office/powerpoint/2010/main" val="683805731"/>
+        <p14:creationId xmlns:p14="http://schemas.microsoft.com/office/powerpoint/2010/main" val="2477311884"/>
       </p:ext>
     </p:extLst>
   </p:cSld>

</xml_diff>

<commit_message>
Finished first version of ppt presentation
</commit_message>
<xml_diff>
--- a/docs/Prezentacija diplomskog rada.pptx
+++ b/docs/Prezentacija diplomskog rada.pptx
@@ -352,7 +352,7 @@
           <a:p>
             <a:fld id="{D95769E4-9C45-4562-9034-D558FA4342B8}" type="datetimeFigureOut">
               <a:rPr lang="sr-Latn-RS" smtClean="0"/>
-              <a:t>13.1.2021.</a:t>
+              <a:t>15.1.2021.</a:t>
             </a:fld>
             <a:endParaRPr lang="sr-Latn-RS"/>
           </a:p>
@@ -560,7 +560,7 @@
           <a:p>
             <a:fld id="{D95769E4-9C45-4562-9034-D558FA4342B8}" type="datetimeFigureOut">
               <a:rPr lang="sr-Latn-RS" smtClean="0"/>
-              <a:t>13.1.2021.</a:t>
+              <a:t>15.1.2021.</a:t>
             </a:fld>
             <a:endParaRPr lang="sr-Latn-RS"/>
           </a:p>
@@ -816,7 +816,7 @@
           <a:p>
             <a:fld id="{D95769E4-9C45-4562-9034-D558FA4342B8}" type="datetimeFigureOut">
               <a:rPr lang="sr-Latn-RS" smtClean="0"/>
-              <a:t>13.1.2021.</a:t>
+              <a:t>15.1.2021.</a:t>
             </a:fld>
             <a:endParaRPr lang="sr-Latn-RS"/>
           </a:p>
@@ -990,7 +990,7 @@
           <a:p>
             <a:fld id="{D95769E4-9C45-4562-9034-D558FA4342B8}" type="datetimeFigureOut">
               <a:rPr lang="sr-Latn-RS" smtClean="0"/>
-              <a:t>13.1.2021.</a:t>
+              <a:t>15.1.2021.</a:t>
             </a:fld>
             <a:endParaRPr lang="sr-Latn-RS"/>
           </a:p>
@@ -1333,7 +1333,7 @@
           <a:p>
             <a:fld id="{D95769E4-9C45-4562-9034-D558FA4342B8}" type="datetimeFigureOut">
               <a:rPr lang="sr-Latn-RS" smtClean="0"/>
-              <a:t>13.1.2021.</a:t>
+              <a:t>15.1.2021.</a:t>
             </a:fld>
             <a:endParaRPr lang="sr-Latn-RS"/>
           </a:p>
@@ -1608,7 +1608,7 @@
           <a:p>
             <a:fld id="{D95769E4-9C45-4562-9034-D558FA4342B8}" type="datetimeFigureOut">
               <a:rPr lang="sr-Latn-RS" smtClean="0"/>
-              <a:t>13.1.2021.</a:t>
+              <a:t>15.1.2021.</a:t>
             </a:fld>
             <a:endParaRPr lang="sr-Latn-RS"/>
           </a:p>
@@ -1987,7 +1987,7 @@
           <a:p>
             <a:fld id="{D95769E4-9C45-4562-9034-D558FA4342B8}" type="datetimeFigureOut">
               <a:rPr lang="sr-Latn-RS" smtClean="0"/>
-              <a:t>13.1.2021.</a:t>
+              <a:t>15.1.2021.</a:t>
             </a:fld>
             <a:endParaRPr lang="sr-Latn-RS"/>
           </a:p>
@@ -2105,7 +2105,7 @@
           <a:p>
             <a:fld id="{D95769E4-9C45-4562-9034-D558FA4342B8}" type="datetimeFigureOut">
               <a:rPr lang="sr-Latn-RS" smtClean="0"/>
-              <a:t>13.1.2021.</a:t>
+              <a:t>15.1.2021.</a:t>
             </a:fld>
             <a:endParaRPr lang="sr-Latn-RS"/>
           </a:p>
@@ -2276,7 +2276,7 @@
           <a:p>
             <a:fld id="{D95769E4-9C45-4562-9034-D558FA4342B8}" type="datetimeFigureOut">
               <a:rPr lang="sr-Latn-RS" smtClean="0"/>
-              <a:t>13.1.2021.</a:t>
+              <a:t>15.1.2021.</a:t>
             </a:fld>
             <a:endParaRPr lang="sr-Latn-RS"/>
           </a:p>
@@ -2630,7 +2630,7 @@
           <a:p>
             <a:fld id="{D95769E4-9C45-4562-9034-D558FA4342B8}" type="datetimeFigureOut">
               <a:rPr lang="sr-Latn-RS" smtClean="0"/>
-              <a:t>13.1.2021.</a:t>
+              <a:t>15.1.2021.</a:t>
             </a:fld>
             <a:endParaRPr lang="sr-Latn-RS"/>
           </a:p>
@@ -3012,7 +3012,7 @@
           <a:p>
             <a:fld id="{D95769E4-9C45-4562-9034-D558FA4342B8}" type="datetimeFigureOut">
               <a:rPr lang="sr-Latn-RS" smtClean="0"/>
-              <a:t>13.1.2021.</a:t>
+              <a:t>15.1.2021.</a:t>
             </a:fld>
             <a:endParaRPr lang="sr-Latn-RS"/>
           </a:p>
@@ -3299,7 +3299,7 @@
           <a:p>
             <a:fld id="{D95769E4-9C45-4562-9034-D558FA4342B8}" type="datetimeFigureOut">
               <a:rPr lang="sr-Latn-RS" smtClean="0"/>
-              <a:t>13.1.2021.</a:t>
+              <a:t>15.1.2021.</a:t>
             </a:fld>
             <a:endParaRPr lang="sr-Latn-RS"/>
           </a:p>
@@ -4136,8 +4136,8 @@
           </a:ln>
         </p:spPr>
       </p:pic>
-      <mc:AlternateContent xmlns:mc="http://schemas.openxmlformats.org/markup-compatibility/2006">
-        <mc:Choice xmlns:a14="http://schemas.microsoft.com/office/drawing/2010/main" Requires="a14">
+      <mc:AlternateContent xmlns:mc="http://schemas.openxmlformats.org/markup-compatibility/2006" xmlns:a14="http://schemas.microsoft.com/office/drawing/2010/main">
+        <mc:Choice Requires="a14">
           <p:sp>
             <p:nvSpPr>
               <p:cNvPr id="6" name="TextBox 5">
@@ -4602,7 +4602,7 @@
             </p:txBody>
           </p:sp>
         </mc:Choice>
-        <mc:Fallback>
+        <mc:Fallback xmlns="">
           <p:sp>
             <p:nvSpPr>
               <p:cNvPr id="6" name="TextBox 5">
@@ -4647,8 +4647,8 @@
           </p:sp>
         </mc:Fallback>
       </mc:AlternateContent>
-      <mc:AlternateContent xmlns:mc="http://schemas.openxmlformats.org/markup-compatibility/2006">
-        <mc:Choice xmlns:a14="http://schemas.microsoft.com/office/drawing/2010/main" Requires="a14">
+      <mc:AlternateContent xmlns:mc="http://schemas.openxmlformats.org/markup-compatibility/2006" xmlns:a14="http://schemas.microsoft.com/office/drawing/2010/main">
+        <mc:Choice Requires="a14">
           <p:sp>
             <p:nvSpPr>
               <p:cNvPr id="8" name="TextBox 7">
@@ -4927,7 +4927,7 @@
             </p:txBody>
           </p:sp>
         </mc:Choice>
-        <mc:Fallback>
+        <mc:Fallback xmlns="">
           <p:sp>
             <p:nvSpPr>
               <p:cNvPr id="8" name="TextBox 7">
@@ -7912,8 +7912,8 @@
         </p:nvSpPr>
         <p:spPr>
           <a:xfrm>
-            <a:off x="665825" y="1180731"/>
-            <a:ext cx="6183616" cy="3631763"/>
+            <a:off x="665824" y="1180731"/>
+            <a:ext cx="5430175" cy="3939540"/>
           </a:xfrm>
           <a:prstGeom prst="rect">
             <a:avLst/>
@@ -7921,7 +7921,7 @@
           <a:noFill/>
         </p:spPr>
         <p:txBody>
-          <a:bodyPr wrap="none" rtlCol="0">
+          <a:bodyPr wrap="square" rtlCol="0">
             <a:spAutoFit/>
           </a:bodyPr>
           <a:lstStyle/>
@@ -8192,12 +8192,17 @@
         </p:blipFill>
         <p:spPr>
           <a:xfrm>
-            <a:off x="7861109" y="954193"/>
-            <a:ext cx="3538677" cy="1033866"/>
+            <a:off x="6414049" y="1180731"/>
+            <a:ext cx="3172096" cy="926765"/>
           </a:xfrm>
           <a:prstGeom prst="rect">
             <a:avLst/>
           </a:prstGeom>
+          <a:ln w="12700">
+            <a:solidFill>
+              <a:schemeClr val="accent2"/>
+            </a:solidFill>
+          </a:ln>
         </p:spPr>
       </p:pic>
       <p:sp>
@@ -8214,7 +8219,7 @@
         </p:nvSpPr>
         <p:spPr>
           <a:xfrm>
-            <a:off x="6956417" y="1264732"/>
+            <a:off x="5586404" y="1412798"/>
             <a:ext cx="558765" cy="239696"/>
           </a:xfrm>
           <a:prstGeom prst="rightArrow">
@@ -8268,12 +8273,17 @@
         </p:blipFill>
         <p:spPr>
           <a:xfrm>
-            <a:off x="5338580" y="2133148"/>
-            <a:ext cx="4508638" cy="595481"/>
+            <a:off x="6414049" y="2486229"/>
+            <a:ext cx="3946192" cy="521196"/>
           </a:xfrm>
           <a:prstGeom prst="rect">
             <a:avLst/>
           </a:prstGeom>
+          <a:ln w="12700">
+            <a:solidFill>
+              <a:schemeClr val="accent2"/>
+            </a:solidFill>
+          </a:ln>
         </p:spPr>
       </p:pic>
       <p:sp>
@@ -8290,7 +8300,7 @@
         </p:nvSpPr>
         <p:spPr>
           <a:xfrm>
-            <a:off x="4558246" y="2329826"/>
+            <a:off x="5591890" y="2634837"/>
             <a:ext cx="558765" cy="239696"/>
           </a:xfrm>
           <a:prstGeom prst="rightArrow">
@@ -8344,12 +8354,17 @@
         </p:blipFill>
         <p:spPr>
           <a:xfrm>
-            <a:off x="5338580" y="3231132"/>
-            <a:ext cx="6397700" cy="537896"/>
+            <a:off x="6414049" y="3515953"/>
+            <a:ext cx="5527688" cy="464748"/>
           </a:xfrm>
           <a:prstGeom prst="rect">
             <a:avLst/>
           </a:prstGeom>
+          <a:ln w="12700">
+            <a:solidFill>
+              <a:schemeClr val="accent2"/>
+            </a:solidFill>
+          </a:ln>
         </p:spPr>
       </p:pic>
       <p:sp>
@@ -8366,7 +8381,7 @@
         </p:nvSpPr>
         <p:spPr>
           <a:xfrm>
-            <a:off x="4582481" y="3380232"/>
+            <a:off x="5591890" y="3658536"/>
             <a:ext cx="558765" cy="239696"/>
           </a:xfrm>
           <a:prstGeom prst="rightArrow">
@@ -8420,12 +8435,17 @@
         </p:blipFill>
         <p:spPr>
           <a:xfrm>
-            <a:off x="5411342" y="4059206"/>
-            <a:ext cx="3881518" cy="982560"/>
+            <a:off x="6414049" y="4489229"/>
+            <a:ext cx="3172096" cy="802978"/>
           </a:xfrm>
           <a:prstGeom prst="rect">
             <a:avLst/>
           </a:prstGeom>
+          <a:ln w="12700">
+            <a:solidFill>
+              <a:schemeClr val="accent2"/>
+            </a:solidFill>
+          </a:ln>
         </p:spPr>
       </p:pic>
       <p:sp>
@@ -8442,7 +8462,7 @@
         </p:nvSpPr>
         <p:spPr>
           <a:xfrm>
-            <a:off x="4558245" y="4497901"/>
+            <a:off x="5586404" y="4770870"/>
             <a:ext cx="558765" cy="239696"/>
           </a:xfrm>
           <a:prstGeom prst="rightArrow">
@@ -8956,6 +8976,630 @@
           </a:p>
         </p:txBody>
       </p:sp>
+      <p:sp>
+        <p:nvSpPr>
+          <p:cNvPr id="3" name="TextBox 2">
+            <a:extLst>
+              <a:ext uri="{FF2B5EF4-FFF2-40B4-BE49-F238E27FC236}">
+                <a16:creationId xmlns:a16="http://schemas.microsoft.com/office/drawing/2014/main" id="{FACEB37B-8514-4A28-BC3F-27A87094D7AD}"/>
+              </a:ext>
+            </a:extLst>
+          </p:cNvPr>
+          <p:cNvSpPr txBox="1"/>
+          <p:nvPr/>
+        </p:nvSpPr>
+        <p:spPr>
+          <a:xfrm>
+            <a:off x="577048" y="1154097"/>
+            <a:ext cx="5609377" cy="4585871"/>
+          </a:xfrm>
+          <a:prstGeom prst="rect">
+            <a:avLst/>
+          </a:prstGeom>
+          <a:noFill/>
+        </p:spPr>
+        <p:txBody>
+          <a:bodyPr wrap="square" rtlCol="0">
+            <a:spAutoFit/>
+          </a:bodyPr>
+          <a:lstStyle/>
+          <a:p>
+            <a:pPr marL="285750" indent="-285750">
+              <a:spcAft>
+                <a:spcPts val="7200"/>
+              </a:spcAft>
+              <a:buFont typeface="Arial" panose="020B0604020202020204" pitchFamily="34" charset="0"/>
+              <a:buChar char="•"/>
+            </a:pPr>
+            <a:r>
+              <a:rPr lang="en-US" sz="1600" dirty="0" err="1">
+                <a:solidFill>
+                  <a:schemeClr val="accent2"/>
+                </a:solidFill>
+              </a:rPr>
+              <a:t>Kreiranje</a:t>
+            </a:r>
+            <a:r>
+              <a:rPr lang="en-US" sz="1600" dirty="0">
+                <a:solidFill>
+                  <a:schemeClr val="accent2"/>
+                </a:solidFill>
+              </a:rPr>
+              <a:t> </a:t>
+            </a:r>
+            <a:r>
+              <a:rPr lang="en-US" sz="1600" dirty="0" err="1">
+                <a:solidFill>
+                  <a:schemeClr val="accent2"/>
+                </a:solidFill>
+              </a:rPr>
+              <a:t>srednjih</a:t>
+            </a:r>
+            <a:r>
+              <a:rPr lang="en-US" sz="1600" dirty="0">
+                <a:solidFill>
+                  <a:schemeClr val="accent2"/>
+                </a:solidFill>
+              </a:rPr>
+              <a:t> </a:t>
+            </a:r>
+            <a:r>
+              <a:rPr lang="en-US" sz="1600" dirty="0" err="1">
+                <a:solidFill>
+                  <a:schemeClr val="accent2"/>
+                </a:solidFill>
+              </a:rPr>
+              <a:t>vrednosti</a:t>
+            </a:r>
+            <a:r>
+              <a:rPr lang="en-US" sz="1600" dirty="0">
+                <a:solidFill>
+                  <a:schemeClr val="accent2"/>
+                </a:solidFill>
+              </a:rPr>
+              <a:t> za </a:t>
+            </a:r>
+            <a:r>
+              <a:rPr lang="en-US" sz="1600" dirty="0" err="1">
+                <a:solidFill>
+                  <a:schemeClr val="accent2"/>
+                </a:solidFill>
+              </a:rPr>
+              <a:t>sve</a:t>
+            </a:r>
+            <a:r>
+              <a:rPr lang="en-US" sz="1600" dirty="0">
+                <a:solidFill>
+                  <a:schemeClr val="accent2"/>
+                </a:solidFill>
+              </a:rPr>
+              <a:t> 3 </a:t>
+            </a:r>
+            <a:r>
+              <a:rPr lang="en-US" sz="1600" dirty="0" err="1">
+                <a:solidFill>
+                  <a:schemeClr val="accent2"/>
+                </a:solidFill>
+              </a:rPr>
+              <a:t>godine</a:t>
+            </a:r>
+            <a:r>
+              <a:rPr lang="en-US" sz="1600" dirty="0">
+                <a:solidFill>
+                  <a:schemeClr val="accent2"/>
+                </a:solidFill>
+              </a:rPr>
+              <a:t> </a:t>
+            </a:r>
+            <a:r>
+              <a:rPr lang="en-US" sz="1600" dirty="0" err="1">
+                <a:solidFill>
+                  <a:schemeClr val="accent2"/>
+                </a:solidFill>
+              </a:rPr>
+              <a:t>klju</a:t>
+            </a:r>
+            <a:r>
+              <a:rPr lang="sr-Latn-RS" sz="1600" dirty="0">
+                <a:solidFill>
+                  <a:schemeClr val="accent2"/>
+                </a:solidFill>
+              </a:rPr>
+              <a:t>č</a:t>
+            </a:r>
+            <a:r>
+              <a:rPr lang="en-US" sz="1600" dirty="0" err="1">
+                <a:solidFill>
+                  <a:schemeClr val="accent2"/>
+                </a:solidFill>
+              </a:rPr>
+              <a:t>nih</a:t>
+            </a:r>
+            <a:r>
+              <a:rPr lang="en-US" sz="1600" dirty="0">
+                <a:solidFill>
+                  <a:schemeClr val="accent2"/>
+                </a:solidFill>
+              </a:rPr>
+              <a:t> </a:t>
+            </a:r>
+            <a:r>
+              <a:rPr lang="en-US" sz="1600" dirty="0" err="1">
+                <a:solidFill>
+                  <a:schemeClr val="accent2"/>
+                </a:solidFill>
+              </a:rPr>
+              <a:t>bilansa</a:t>
+            </a:r>
+            <a:endParaRPr lang="sr-Latn-RS" sz="1600" dirty="0">
+              <a:solidFill>
+                <a:schemeClr val="accent2"/>
+              </a:solidFill>
+            </a:endParaRPr>
+          </a:p>
+          <a:p>
+            <a:pPr marL="285750" indent="-285750">
+              <a:spcAft>
+                <a:spcPts val="7200"/>
+              </a:spcAft>
+              <a:buFont typeface="Arial" panose="020B0604020202020204" pitchFamily="34" charset="0"/>
+              <a:buChar char="•"/>
+            </a:pPr>
+            <a:r>
+              <a:rPr lang="sr-Latn-RS" sz="1600" dirty="0">
+                <a:solidFill>
+                  <a:schemeClr val="accent2"/>
+                </a:solidFill>
+              </a:rPr>
+              <a:t>Formirana su 4 </a:t>
+            </a:r>
+            <a:r>
+              <a:rPr lang="sr-Latn-RS" sz="1600" dirty="0" err="1">
+                <a:solidFill>
+                  <a:schemeClr val="accent2"/>
+                </a:solidFill>
+              </a:rPr>
+              <a:t>diskretizovana</a:t>
+            </a:r>
+            <a:r>
+              <a:rPr lang="sr-Latn-RS" sz="1600" dirty="0">
+                <a:solidFill>
+                  <a:schemeClr val="accent2"/>
+                </a:solidFill>
+              </a:rPr>
+              <a:t> atributa za 4 kreditna iznosa koji su podeljeni na 4 kategorije rizika</a:t>
+            </a:r>
+          </a:p>
+          <a:p>
+            <a:pPr marL="285750" indent="-285750">
+              <a:spcAft>
+                <a:spcPts val="7200"/>
+              </a:spcAft>
+              <a:buFont typeface="Arial" panose="020B0604020202020204" pitchFamily="34" charset="0"/>
+              <a:buChar char="•"/>
+            </a:pPr>
+            <a:r>
+              <a:rPr lang="sr-Latn-RS" sz="1600" dirty="0">
+                <a:solidFill>
+                  <a:schemeClr val="accent2"/>
+                </a:solidFill>
+              </a:rPr>
+              <a:t>Kreirani su novi značajni atributi na osnovu postojećih</a:t>
+            </a:r>
+          </a:p>
+          <a:p>
+            <a:pPr marL="285750" indent="-285750">
+              <a:spcAft>
+                <a:spcPts val="7200"/>
+              </a:spcAft>
+              <a:buFont typeface="Arial" panose="020B0604020202020204" pitchFamily="34" charset="0"/>
+              <a:buChar char="•"/>
+            </a:pPr>
+            <a:r>
+              <a:rPr lang="sr-Latn-RS" sz="1600" dirty="0">
+                <a:solidFill>
+                  <a:schemeClr val="accent2"/>
+                </a:solidFill>
+              </a:rPr>
+              <a:t>Spojeni svi bitni atributi iz skupova podataka po ID tako da se formira jedinstven skup za obučavanje</a:t>
+            </a:r>
+            <a:r>
+              <a:rPr lang="en-US" sz="1600" dirty="0">
+                <a:solidFill>
+                  <a:schemeClr val="accent2"/>
+                </a:solidFill>
+              </a:rPr>
+              <a:t>, </a:t>
+            </a:r>
+            <a:r>
+              <a:rPr lang="en-US" sz="1600" dirty="0" err="1">
+                <a:solidFill>
+                  <a:schemeClr val="accent2"/>
+                </a:solidFill>
+              </a:rPr>
+              <a:t>odba</a:t>
+            </a:r>
+            <a:r>
+              <a:rPr lang="sr-Latn-RS" sz="1600" dirty="0" err="1">
+                <a:solidFill>
+                  <a:schemeClr val="accent2"/>
+                </a:solidFill>
+              </a:rPr>
+              <a:t>čeni</a:t>
+            </a:r>
+            <a:r>
+              <a:rPr lang="sr-Latn-RS" sz="1600" dirty="0">
+                <a:solidFill>
+                  <a:schemeClr val="accent2"/>
+                </a:solidFill>
+              </a:rPr>
+              <a:t> atribut </a:t>
+            </a:r>
+            <a:r>
+              <a:rPr lang="sr-Latn-RS" sz="1600" dirty="0" err="1">
+                <a:solidFill>
+                  <a:schemeClr val="accent2"/>
+                </a:solidFill>
+              </a:rPr>
+              <a:t>KupacID</a:t>
+            </a:r>
+            <a:r>
+              <a:rPr lang="sr-Latn-RS" sz="1600" dirty="0">
+                <a:solidFill>
+                  <a:schemeClr val="accent2"/>
+                </a:solidFill>
+              </a:rPr>
+              <a:t> i </a:t>
+            </a:r>
+            <a:r>
+              <a:rPr lang="sr-Latn-RS" sz="1600" dirty="0" err="1">
+                <a:solidFill>
+                  <a:schemeClr val="accent2"/>
+                </a:solidFill>
+              </a:rPr>
+              <a:t>KupacNaziv</a:t>
+            </a:r>
+            <a:r>
+              <a:rPr lang="sr-Latn-RS" sz="1600" dirty="0">
+                <a:solidFill>
+                  <a:schemeClr val="accent2"/>
+                </a:solidFill>
+              </a:rPr>
+              <a:t> jer su jedinstveni identifikatori</a:t>
+            </a:r>
+          </a:p>
+        </p:txBody>
+      </p:sp>
+      <p:pic>
+        <p:nvPicPr>
+          <p:cNvPr id="5" name="Picture 4">
+            <a:extLst>
+              <a:ext uri="{FF2B5EF4-FFF2-40B4-BE49-F238E27FC236}">
+                <a16:creationId xmlns:a16="http://schemas.microsoft.com/office/drawing/2014/main" id="{0F8CF071-ECF4-4A75-A2ED-6812F7D99C4E}"/>
+              </a:ext>
+            </a:extLst>
+          </p:cNvPr>
+          <p:cNvPicPr>
+            <a:picLocks noChangeAspect="1"/>
+          </p:cNvPicPr>
+          <p:nvPr/>
+        </p:nvPicPr>
+        <p:blipFill>
+          <a:blip r:embed="rId2"/>
+          <a:stretch>
+            <a:fillRect/>
+          </a:stretch>
+        </p:blipFill>
+        <p:spPr>
+          <a:xfrm>
+            <a:off x="7063801" y="1026809"/>
+            <a:ext cx="3953387" cy="556736"/>
+          </a:xfrm>
+          <a:prstGeom prst="rect">
+            <a:avLst/>
+          </a:prstGeom>
+          <a:ln w="12700">
+            <a:solidFill>
+              <a:schemeClr val="accent2"/>
+            </a:solidFill>
+          </a:ln>
+        </p:spPr>
+      </p:pic>
+      <p:sp>
+        <p:nvSpPr>
+          <p:cNvPr id="8" name="Arrow: Right 7">
+            <a:extLst>
+              <a:ext uri="{FF2B5EF4-FFF2-40B4-BE49-F238E27FC236}">
+                <a16:creationId xmlns:a16="http://schemas.microsoft.com/office/drawing/2014/main" id="{B81EBCE6-CD59-4798-ABB4-9DA099CC04BD}"/>
+              </a:ext>
+            </a:extLst>
+          </p:cNvPr>
+          <p:cNvSpPr/>
+          <p:nvPr/>
+        </p:nvSpPr>
+        <p:spPr>
+          <a:xfrm>
+            <a:off x="6259529" y="1224815"/>
+            <a:ext cx="558765" cy="239696"/>
+          </a:xfrm>
+          <a:prstGeom prst="rightArrow">
+            <a:avLst/>
+          </a:prstGeom>
+        </p:spPr>
+        <p:style>
+          <a:lnRef idx="2">
+            <a:schemeClr val="accent1">
+              <a:shade val="50000"/>
+            </a:schemeClr>
+          </a:lnRef>
+          <a:fillRef idx="1">
+            <a:schemeClr val="accent1"/>
+          </a:fillRef>
+          <a:effectRef idx="0">
+            <a:schemeClr val="accent1"/>
+          </a:effectRef>
+          <a:fontRef idx="minor">
+            <a:schemeClr val="lt1"/>
+          </a:fontRef>
+        </p:style>
+        <p:txBody>
+          <a:bodyPr rtlCol="0" anchor="ctr"/>
+          <a:lstStyle/>
+          <a:p>
+            <a:pPr algn="ctr"/>
+            <a:endParaRPr lang="sr-Latn-RS"/>
+          </a:p>
+        </p:txBody>
+      </p:sp>
+      <p:sp>
+        <p:nvSpPr>
+          <p:cNvPr id="9" name="Arrow: Right 8">
+            <a:extLst>
+              <a:ext uri="{FF2B5EF4-FFF2-40B4-BE49-F238E27FC236}">
+                <a16:creationId xmlns:a16="http://schemas.microsoft.com/office/drawing/2014/main" id="{9DDECB89-F293-43C2-8C75-BCBDC35DE6C6}"/>
+              </a:ext>
+            </a:extLst>
+          </p:cNvPr>
+          <p:cNvSpPr/>
+          <p:nvPr/>
+        </p:nvSpPr>
+        <p:spPr>
+          <a:xfrm>
+            <a:off x="6259527" y="2489721"/>
+            <a:ext cx="558765" cy="239696"/>
+          </a:xfrm>
+          <a:prstGeom prst="rightArrow">
+            <a:avLst/>
+          </a:prstGeom>
+        </p:spPr>
+        <p:style>
+          <a:lnRef idx="2">
+            <a:schemeClr val="accent1">
+              <a:shade val="50000"/>
+            </a:schemeClr>
+          </a:lnRef>
+          <a:fillRef idx="1">
+            <a:schemeClr val="accent1"/>
+          </a:fillRef>
+          <a:effectRef idx="0">
+            <a:schemeClr val="accent1"/>
+          </a:effectRef>
+          <a:fontRef idx="minor">
+            <a:schemeClr val="lt1"/>
+          </a:fontRef>
+        </p:style>
+        <p:txBody>
+          <a:bodyPr rtlCol="0" anchor="ctr"/>
+          <a:lstStyle/>
+          <a:p>
+            <a:pPr algn="ctr"/>
+            <a:endParaRPr lang="sr-Latn-RS"/>
+          </a:p>
+        </p:txBody>
+      </p:sp>
+      <p:pic>
+        <p:nvPicPr>
+          <p:cNvPr id="11" name="Picture 10" descr="Graphical user interface, table&#10;&#10;Description automatically generated">
+            <a:extLst>
+              <a:ext uri="{FF2B5EF4-FFF2-40B4-BE49-F238E27FC236}">
+                <a16:creationId xmlns:a16="http://schemas.microsoft.com/office/drawing/2014/main" id="{70B6D7E0-707F-4205-9317-A03A567D83FC}"/>
+              </a:ext>
+            </a:extLst>
+          </p:cNvPr>
+          <p:cNvPicPr>
+            <a:picLocks noChangeAspect="1"/>
+          </p:cNvPicPr>
+          <p:nvPr/>
+        </p:nvPicPr>
+        <p:blipFill>
+          <a:blip r:embed="rId3">
+            <a:extLst>
+              <a:ext uri="{28A0092B-C50C-407E-A947-70E740481C1C}">
+                <a14:useLocalDpi xmlns:a14="http://schemas.microsoft.com/office/drawing/2010/main" val="0"/>
+              </a:ext>
+            </a:extLst>
+          </a:blip>
+          <a:stretch>
+            <a:fillRect/>
+          </a:stretch>
+        </p:blipFill>
+        <p:spPr>
+          <a:xfrm>
+            <a:off x="7063801" y="2076641"/>
+            <a:ext cx="3243174" cy="1217613"/>
+          </a:xfrm>
+          <a:prstGeom prst="rect">
+            <a:avLst/>
+          </a:prstGeom>
+          <a:ln w="12700">
+            <a:solidFill>
+              <a:schemeClr val="accent2"/>
+            </a:solidFill>
+          </a:ln>
+        </p:spPr>
+      </p:pic>
+      <p:sp>
+        <p:nvSpPr>
+          <p:cNvPr id="12" name="Arrow: Right 11">
+            <a:extLst>
+              <a:ext uri="{FF2B5EF4-FFF2-40B4-BE49-F238E27FC236}">
+                <a16:creationId xmlns:a16="http://schemas.microsoft.com/office/drawing/2014/main" id="{DCF289C7-90DE-4C49-AE83-F041C601ABA8}"/>
+              </a:ext>
+            </a:extLst>
+          </p:cNvPr>
+          <p:cNvSpPr/>
+          <p:nvPr/>
+        </p:nvSpPr>
+        <p:spPr>
+          <a:xfrm>
+            <a:off x="6259527" y="3778021"/>
+            <a:ext cx="558765" cy="239696"/>
+          </a:xfrm>
+          <a:prstGeom prst="rightArrow">
+            <a:avLst/>
+          </a:prstGeom>
+        </p:spPr>
+        <p:style>
+          <a:lnRef idx="2">
+            <a:schemeClr val="accent1">
+              <a:shade val="50000"/>
+            </a:schemeClr>
+          </a:lnRef>
+          <a:fillRef idx="1">
+            <a:schemeClr val="accent1"/>
+          </a:fillRef>
+          <a:effectRef idx="0">
+            <a:schemeClr val="accent1"/>
+          </a:effectRef>
+          <a:fontRef idx="minor">
+            <a:schemeClr val="lt1"/>
+          </a:fontRef>
+        </p:style>
+        <p:txBody>
+          <a:bodyPr rtlCol="0" anchor="ctr"/>
+          <a:lstStyle/>
+          <a:p>
+            <a:pPr algn="ctr"/>
+            <a:endParaRPr lang="sr-Latn-RS"/>
+          </a:p>
+        </p:txBody>
+      </p:sp>
+      <p:sp>
+        <p:nvSpPr>
+          <p:cNvPr id="14" name="Arrow: Right 13">
+            <a:extLst>
+              <a:ext uri="{FF2B5EF4-FFF2-40B4-BE49-F238E27FC236}">
+                <a16:creationId xmlns:a16="http://schemas.microsoft.com/office/drawing/2014/main" id="{8DB1A5CD-8217-4EE5-ADA8-28CA1C353F80}"/>
+              </a:ext>
+            </a:extLst>
+          </p:cNvPr>
+          <p:cNvSpPr/>
+          <p:nvPr/>
+        </p:nvSpPr>
+        <p:spPr>
+          <a:xfrm>
+            <a:off x="6259527" y="5152268"/>
+            <a:ext cx="558765" cy="239696"/>
+          </a:xfrm>
+          <a:prstGeom prst="rightArrow">
+            <a:avLst/>
+          </a:prstGeom>
+        </p:spPr>
+        <p:style>
+          <a:lnRef idx="2">
+            <a:schemeClr val="accent1">
+              <a:shade val="50000"/>
+            </a:schemeClr>
+          </a:lnRef>
+          <a:fillRef idx="1">
+            <a:schemeClr val="accent1"/>
+          </a:fillRef>
+          <a:effectRef idx="0">
+            <a:schemeClr val="accent1"/>
+          </a:effectRef>
+          <a:fontRef idx="minor">
+            <a:schemeClr val="lt1"/>
+          </a:fontRef>
+        </p:style>
+        <p:txBody>
+          <a:bodyPr rtlCol="0" anchor="ctr"/>
+          <a:lstStyle/>
+          <a:p>
+            <a:pPr algn="ctr"/>
+            <a:endParaRPr lang="sr-Latn-RS"/>
+          </a:p>
+        </p:txBody>
+      </p:sp>
+      <p:pic>
+        <p:nvPicPr>
+          <p:cNvPr id="16" name="Picture 15">
+            <a:extLst>
+              <a:ext uri="{FF2B5EF4-FFF2-40B4-BE49-F238E27FC236}">
+                <a16:creationId xmlns:a16="http://schemas.microsoft.com/office/drawing/2014/main" id="{F67D4479-729D-4F50-93E0-C17272E60215}"/>
+              </a:ext>
+            </a:extLst>
+          </p:cNvPr>
+          <p:cNvPicPr>
+            <a:picLocks noChangeAspect="1"/>
+          </p:cNvPicPr>
+          <p:nvPr/>
+        </p:nvPicPr>
+        <p:blipFill>
+          <a:blip r:embed="rId4"/>
+          <a:stretch>
+            <a:fillRect/>
+          </a:stretch>
+        </p:blipFill>
+        <p:spPr>
+          <a:xfrm>
+            <a:off x="7063802" y="3561781"/>
+            <a:ext cx="4264106" cy="503368"/>
+          </a:xfrm>
+          <a:prstGeom prst="rect">
+            <a:avLst/>
+          </a:prstGeom>
+          <a:ln w="12700">
+            <a:solidFill>
+              <a:schemeClr val="accent2"/>
+            </a:solidFill>
+          </a:ln>
+        </p:spPr>
+      </p:pic>
+      <p:pic>
+        <p:nvPicPr>
+          <p:cNvPr id="18" name="Picture 17">
+            <a:extLst>
+              <a:ext uri="{FF2B5EF4-FFF2-40B4-BE49-F238E27FC236}">
+                <a16:creationId xmlns:a16="http://schemas.microsoft.com/office/drawing/2014/main" id="{835072BC-8418-421F-BE1D-27DCA7E64F09}"/>
+              </a:ext>
+            </a:extLst>
+          </p:cNvPr>
+          <p:cNvPicPr>
+            <a:picLocks noChangeAspect="1"/>
+          </p:cNvPicPr>
+          <p:nvPr/>
+        </p:nvPicPr>
+        <p:blipFill>
+          <a:blip r:embed="rId5"/>
+          <a:stretch>
+            <a:fillRect/>
+          </a:stretch>
+        </p:blipFill>
+        <p:spPr>
+          <a:xfrm>
+            <a:off x="7063801" y="4332676"/>
+            <a:ext cx="3802468" cy="1907662"/>
+          </a:xfrm>
+          <a:prstGeom prst="rect">
+            <a:avLst/>
+          </a:prstGeom>
+          <a:ln w="12700">
+            <a:solidFill>
+              <a:schemeClr val="accent2"/>
+            </a:solidFill>
+          </a:ln>
+        </p:spPr>
+      </p:pic>
     </p:spTree>
     <p:extLst>
       <p:ext uri="{BB962C8B-B14F-4D97-AF65-F5344CB8AC3E}">

</xml_diff>

<commit_message>
Removed word doc and updated ppt
</commit_message>
<xml_diff>
--- a/docs/Prezentacija diplomskog rada.pptx
+++ b/docs/Prezentacija diplomskog rada.pptx
@@ -211,7 +211,7 @@
           <a:p>
             <a:fld id="{72AC8FAB-349C-437D-9726-832D35FCD6E3}" type="datetimeFigureOut">
               <a:rPr lang="sr-Latn-RS" smtClean="0"/>
-              <a:t>17.1.2021.</a:t>
+              <a:t>18.1.2021.</a:t>
             </a:fld>
             <a:endParaRPr lang="sr-Latn-RS"/>
           </a:p>
@@ -1100,6 +1100,27 @@
               </a:rPr>
               <a:t> vrednosti</a:t>
             </a:r>
+            <a:r>
+              <a:rPr lang="en-US" sz="1200" dirty="0">
+                <a:solidFill>
+                  <a:schemeClr val="accent2"/>
+                </a:solidFill>
+              </a:rPr>
+              <a:t> </a:t>
+            </a:r>
+            <a:r>
+              <a:rPr lang="en-US" sz="1200" dirty="0" err="1">
+                <a:solidFill>
+                  <a:schemeClr val="accent2"/>
+                </a:solidFill>
+              </a:rPr>
+              <a:t>srednjim</a:t>
+            </a:r>
+            <a:endParaRPr lang="sr-Latn-RS" sz="1200" dirty="0">
+              <a:solidFill>
+                <a:schemeClr val="accent2"/>
+              </a:solidFill>
+            </a:endParaRPr>
           </a:p>
           <a:p>
             <a:pPr marL="0" marR="0" lvl="0" indent="0" algn="l" defTabSz="914400" rtl="0" eaLnBrk="1" fontAlgn="auto" latinLnBrk="0" hangingPunct="1">
@@ -3099,7 +3120,7 @@
           <a:p>
             <a:fld id="{D95769E4-9C45-4562-9034-D558FA4342B8}" type="datetimeFigureOut">
               <a:rPr lang="sr-Latn-RS" smtClean="0"/>
-              <a:t>17.1.2021.</a:t>
+              <a:t>18.1.2021.</a:t>
             </a:fld>
             <a:endParaRPr lang="sr-Latn-RS"/>
           </a:p>
@@ -3307,7 +3328,7 @@
           <a:p>
             <a:fld id="{D95769E4-9C45-4562-9034-D558FA4342B8}" type="datetimeFigureOut">
               <a:rPr lang="sr-Latn-RS" smtClean="0"/>
-              <a:t>17.1.2021.</a:t>
+              <a:t>18.1.2021.</a:t>
             </a:fld>
             <a:endParaRPr lang="sr-Latn-RS"/>
           </a:p>
@@ -3563,7 +3584,7 @@
           <a:p>
             <a:fld id="{D95769E4-9C45-4562-9034-D558FA4342B8}" type="datetimeFigureOut">
               <a:rPr lang="sr-Latn-RS" smtClean="0"/>
-              <a:t>17.1.2021.</a:t>
+              <a:t>18.1.2021.</a:t>
             </a:fld>
             <a:endParaRPr lang="sr-Latn-RS"/>
           </a:p>
@@ -3737,7 +3758,7 @@
           <a:p>
             <a:fld id="{D95769E4-9C45-4562-9034-D558FA4342B8}" type="datetimeFigureOut">
               <a:rPr lang="sr-Latn-RS" smtClean="0"/>
-              <a:t>17.1.2021.</a:t>
+              <a:t>18.1.2021.</a:t>
             </a:fld>
             <a:endParaRPr lang="sr-Latn-RS"/>
           </a:p>
@@ -4080,7 +4101,7 @@
           <a:p>
             <a:fld id="{D95769E4-9C45-4562-9034-D558FA4342B8}" type="datetimeFigureOut">
               <a:rPr lang="sr-Latn-RS" smtClean="0"/>
-              <a:t>17.1.2021.</a:t>
+              <a:t>18.1.2021.</a:t>
             </a:fld>
             <a:endParaRPr lang="sr-Latn-RS"/>
           </a:p>
@@ -4355,7 +4376,7 @@
           <a:p>
             <a:fld id="{D95769E4-9C45-4562-9034-D558FA4342B8}" type="datetimeFigureOut">
               <a:rPr lang="sr-Latn-RS" smtClean="0"/>
-              <a:t>17.1.2021.</a:t>
+              <a:t>18.1.2021.</a:t>
             </a:fld>
             <a:endParaRPr lang="sr-Latn-RS"/>
           </a:p>
@@ -4734,7 +4755,7 @@
           <a:p>
             <a:fld id="{D95769E4-9C45-4562-9034-D558FA4342B8}" type="datetimeFigureOut">
               <a:rPr lang="sr-Latn-RS" smtClean="0"/>
-              <a:t>17.1.2021.</a:t>
+              <a:t>18.1.2021.</a:t>
             </a:fld>
             <a:endParaRPr lang="sr-Latn-RS"/>
           </a:p>
@@ -4852,7 +4873,7 @@
           <a:p>
             <a:fld id="{D95769E4-9C45-4562-9034-D558FA4342B8}" type="datetimeFigureOut">
               <a:rPr lang="sr-Latn-RS" smtClean="0"/>
-              <a:t>17.1.2021.</a:t>
+              <a:t>18.1.2021.</a:t>
             </a:fld>
             <a:endParaRPr lang="sr-Latn-RS"/>
           </a:p>
@@ -5023,7 +5044,7 @@
           <a:p>
             <a:fld id="{D95769E4-9C45-4562-9034-D558FA4342B8}" type="datetimeFigureOut">
               <a:rPr lang="sr-Latn-RS" smtClean="0"/>
-              <a:t>17.1.2021.</a:t>
+              <a:t>18.1.2021.</a:t>
             </a:fld>
             <a:endParaRPr lang="sr-Latn-RS"/>
           </a:p>
@@ -5377,7 +5398,7 @@
           <a:p>
             <a:fld id="{D95769E4-9C45-4562-9034-D558FA4342B8}" type="datetimeFigureOut">
               <a:rPr lang="sr-Latn-RS" smtClean="0"/>
-              <a:t>17.1.2021.</a:t>
+              <a:t>18.1.2021.</a:t>
             </a:fld>
             <a:endParaRPr lang="sr-Latn-RS"/>
           </a:p>
@@ -5759,7 +5780,7 @@
           <a:p>
             <a:fld id="{D95769E4-9C45-4562-9034-D558FA4342B8}" type="datetimeFigureOut">
               <a:rPr lang="sr-Latn-RS" smtClean="0"/>
-              <a:t>17.1.2021.</a:t>
+              <a:t>18.1.2021.</a:t>
             </a:fld>
             <a:endParaRPr lang="sr-Latn-RS"/>
           </a:p>
@@ -6046,7 +6067,7 @@
           <a:p>
             <a:fld id="{D95769E4-9C45-4562-9034-D558FA4342B8}" type="datetimeFigureOut">
               <a:rPr lang="sr-Latn-RS" smtClean="0"/>
-              <a:t>17.1.2021.</a:t>
+              <a:t>18.1.2021.</a:t>
             </a:fld>
             <a:endParaRPr lang="sr-Latn-RS"/>
           </a:p>
@@ -6835,8 +6856,8 @@
         </p:blipFill>
         <p:spPr>
           <a:xfrm>
-            <a:off x="546820" y="4633670"/>
-            <a:ext cx="9429713" cy="764815"/>
+            <a:off x="546820" y="4426515"/>
+            <a:ext cx="11470453" cy="930333"/>
           </a:xfrm>
           <a:prstGeom prst="rect">
             <a:avLst/>
@@ -6870,8 +6891,8 @@
         </p:blipFill>
         <p:spPr>
           <a:xfrm>
-            <a:off x="552487" y="5585327"/>
-            <a:ext cx="4599989" cy="442611"/>
+            <a:off x="546820" y="5545792"/>
+            <a:ext cx="5335506" cy="513383"/>
           </a:xfrm>
           <a:prstGeom prst="rect">
             <a:avLst/>
@@ -6883,8 +6904,8 @@
           </a:ln>
         </p:spPr>
       </p:pic>
-      <mc:AlternateContent xmlns:mc="http://schemas.openxmlformats.org/markup-compatibility/2006" xmlns:a14="http://schemas.microsoft.com/office/drawing/2010/main">
-        <mc:Choice Requires="a14">
+      <mc:AlternateContent xmlns:mc="http://schemas.openxmlformats.org/markup-compatibility/2006">
+        <mc:Choice xmlns:a14="http://schemas.microsoft.com/office/drawing/2010/main" Requires="a14">
           <p:sp>
             <p:nvSpPr>
               <p:cNvPr id="6" name="TextBox 5">
@@ -6899,8 +6920,8 @@
             </p:nvSpPr>
             <p:spPr>
               <a:xfrm>
-                <a:off x="301837" y="3133861"/>
-                <a:ext cx="5963202" cy="576055"/>
+                <a:off x="0" y="3113587"/>
+                <a:ext cx="6717990" cy="697114"/>
               </a:xfrm>
               <a:prstGeom prst="rect">
                 <a:avLst/>
@@ -6923,7 +6944,7 @@
                       <m:sSub>
                         <m:sSubPr>
                           <m:ctrlPr>
-                            <a:rPr lang="sr-Latn-RS" sz="1600" i="1" smtClean="0">
+                            <a:rPr lang="sr-Latn-RS" sz="2000" i="1" smtClean="0">
                               <a:solidFill>
                                 <a:schemeClr val="accent2"/>
                               </a:solidFill>
@@ -6933,7 +6954,7 @@
                         </m:sSubPr>
                         <m:e>
                           <m:r>
-                            <a:rPr lang="sr-Latn-RS" sz="1600" i="1">
+                            <a:rPr lang="sr-Latn-RS" sz="2000" i="1">
                               <a:solidFill>
                                 <a:schemeClr val="accent2"/>
                               </a:solidFill>
@@ -6944,7 +6965,7 @@
                         </m:e>
                         <m:sub>
                           <m:r>
-                            <a:rPr lang="sr-Latn-RS" sz="1600" i="1">
+                            <a:rPr lang="sr-Latn-RS" sz="2000" i="1">
                               <a:solidFill>
                                 <a:schemeClr val="accent2"/>
                               </a:solidFill>
@@ -6957,7 +6978,7 @@
                       <m:d>
                         <m:dPr>
                           <m:ctrlPr>
-                            <a:rPr lang="sr-Latn-RS" sz="1600" i="1">
+                            <a:rPr lang="sr-Latn-RS" sz="2000" i="1">
                               <a:solidFill>
                                 <a:schemeClr val="accent2"/>
                               </a:solidFill>
@@ -6967,7 +6988,7 @@
                         </m:dPr>
                         <m:e>
                           <m:r>
-                            <a:rPr lang="sr-Latn-RS" sz="1600" i="1">
+                            <a:rPr lang="sr-Latn-RS" sz="2000" i="1">
                               <a:solidFill>
                                 <a:schemeClr val="accent2"/>
                               </a:solidFill>
@@ -6978,7 +6999,7 @@
                         </m:e>
                       </m:d>
                       <m:r>
-                        <a:rPr lang="sr-Latn-RS" sz="1600" i="0">
+                        <a:rPr lang="sr-Latn-RS" sz="2000" i="0">
                           <a:solidFill>
                             <a:schemeClr val="accent2"/>
                           </a:solidFill>
@@ -6989,7 +7010,7 @@
                       <m:sSub>
                         <m:sSubPr>
                           <m:ctrlPr>
-                            <a:rPr lang="sr-Latn-RS" sz="1600" i="1">
+                            <a:rPr lang="sr-Latn-RS" sz="2000" i="1">
                               <a:solidFill>
                                 <a:schemeClr val="accent2"/>
                               </a:solidFill>
@@ -6999,7 +7020,7 @@
                         </m:sSubPr>
                         <m:e>
                           <m:r>
-                            <a:rPr lang="sr-Latn-RS" sz="1600" i="1">
+                            <a:rPr lang="sr-Latn-RS" sz="2000" i="1">
                               <a:solidFill>
                                 <a:schemeClr val="accent2"/>
                               </a:solidFill>
@@ -7010,7 +7031,7 @@
                         </m:e>
                         <m:sub>
                           <m:r>
-                            <a:rPr lang="sr-Latn-RS" sz="1600" i="1">
+                            <a:rPr lang="sr-Latn-RS" sz="2000" i="1">
                               <a:solidFill>
                                 <a:schemeClr val="accent2"/>
                               </a:solidFill>
@@ -7019,7 +7040,7 @@
                             <m:t>𝑚</m:t>
                           </m:r>
                           <m:r>
-                            <a:rPr lang="sr-Latn-RS" sz="1600" i="0">
+                            <a:rPr lang="sr-Latn-RS" sz="2000" i="0">
                               <a:solidFill>
                                 <a:schemeClr val="accent2"/>
                               </a:solidFill>
@@ -7032,7 +7053,7 @@
                       <m:d>
                         <m:dPr>
                           <m:ctrlPr>
-                            <a:rPr lang="sr-Latn-RS" sz="1600" i="1">
+                            <a:rPr lang="sr-Latn-RS" sz="2000" i="1">
                               <a:solidFill>
                                 <a:schemeClr val="accent2"/>
                               </a:solidFill>
@@ -7042,7 +7063,7 @@
                         </m:dPr>
                         <m:e>
                           <m:r>
-                            <a:rPr lang="sr-Latn-RS" sz="1600" i="1">
+                            <a:rPr lang="sr-Latn-RS" sz="2000" i="1">
                               <a:solidFill>
                                 <a:schemeClr val="accent2"/>
                               </a:solidFill>
@@ -7053,7 +7074,7 @@
                         </m:e>
                       </m:d>
                       <m:r>
-                        <a:rPr lang="sr-Latn-RS" sz="1600" i="0">
+                        <a:rPr lang="sr-Latn-RS" sz="2000" i="0">
                           <a:solidFill>
                             <a:schemeClr val="accent2"/>
                           </a:solidFill>
@@ -7062,7 +7083,7 @@
                         <m:t>+</m:t>
                       </m:r>
                       <m:r>
-                        <a:rPr lang="sr-Latn-RS" sz="1600" i="1">
+                        <a:rPr lang="sr-Latn-RS" sz="2000" i="1">
                           <a:solidFill>
                             <a:schemeClr val="accent2"/>
                           </a:solidFill>
@@ -7076,7 +7097,7 @@
                           <m:limLoc m:val="subSup"/>
                           <m:grow m:val="on"/>
                           <m:ctrlPr>
-                            <a:rPr lang="sr-Latn-RS" sz="1600" i="1">
+                            <a:rPr lang="sr-Latn-RS" sz="2000" i="1">
                               <a:solidFill>
                                 <a:schemeClr val="accent2"/>
                               </a:solidFill>
@@ -7086,7 +7107,7 @@
                         </m:naryPr>
                         <m:sub>
                           <m:r>
-                            <a:rPr lang="sr-Latn-RS" sz="1600" i="1">
+                            <a:rPr lang="sr-Latn-RS" sz="2000" i="1">
                               <a:solidFill>
                                 <a:schemeClr val="accent2"/>
                               </a:solidFill>
@@ -7095,7 +7116,7 @@
                             <m:t>𝑖</m:t>
                           </m:r>
                           <m:r>
-                            <a:rPr lang="sr-Latn-RS" sz="1600" i="0">
+                            <a:rPr lang="sr-Latn-RS" sz="2000" i="0">
                               <a:solidFill>
                                 <a:schemeClr val="accent2"/>
                               </a:solidFill>
@@ -7106,7 +7127,7 @@
                         </m:sub>
                         <m:sup>
                           <m:r>
-                            <a:rPr lang="sr-Latn-RS" sz="1600" i="1">
+                            <a:rPr lang="sr-Latn-RS" sz="2000" i="1">
                               <a:solidFill>
                                 <a:schemeClr val="accent2"/>
                               </a:solidFill>
@@ -7117,7 +7138,7 @@
                         </m:sup>
                         <m:e>
                           <m:r>
-                            <a:rPr lang="sr-Latn-RS" sz="1600" i="1">
+                            <a:rPr lang="sr-Latn-RS" sz="2000" i="1">
                               <a:solidFill>
                                 <a:schemeClr val="accent2"/>
                               </a:solidFill>
@@ -7128,7 +7149,7 @@
                           <m:d>
                             <m:dPr>
                               <m:ctrlPr>
-                                <a:rPr lang="sr-Latn-RS" sz="1600" i="1">
+                                <a:rPr lang="sr-Latn-RS" sz="2000" i="1">
                                   <a:solidFill>
                                     <a:schemeClr val="accent2"/>
                                   </a:solidFill>
@@ -7140,7 +7161,7 @@
                               <m:sSub>
                                 <m:sSubPr>
                                   <m:ctrlPr>
-                                    <a:rPr lang="sr-Latn-RS" sz="1600" i="1">
+                                    <a:rPr lang="sr-Latn-RS" sz="2000" i="1">
                                       <a:solidFill>
                                         <a:schemeClr val="accent2"/>
                                       </a:solidFill>
@@ -7150,7 +7171,7 @@
                                 </m:sSubPr>
                                 <m:e>
                                   <m:r>
-                                    <a:rPr lang="sr-Latn-RS" sz="1600" i="1">
+                                    <a:rPr lang="sr-Latn-RS" sz="2000" i="1">
                                       <a:solidFill>
                                         <a:schemeClr val="accent2"/>
                                       </a:solidFill>
@@ -7161,7 +7182,7 @@
                                 </m:e>
                                 <m:sub>
                                   <m:r>
-                                    <a:rPr lang="sr-Latn-RS" sz="1600" i="1">
+                                    <a:rPr lang="sr-Latn-RS" sz="2000" i="1">
                                       <a:solidFill>
                                         <a:schemeClr val="accent2"/>
                                       </a:solidFill>
@@ -7172,7 +7193,7 @@
                                 </m:sub>
                               </m:sSub>
                               <m:r>
-                                <a:rPr lang="sr-Latn-RS" sz="1600" i="0">
+                                <a:rPr lang="sr-Latn-RS" sz="2000" i="0">
                                   <a:solidFill>
                                     <a:schemeClr val="accent2"/>
                                   </a:solidFill>
@@ -7183,7 +7204,7 @@
                               <m:sSub>
                                 <m:sSubPr>
                                   <m:ctrlPr>
-                                    <a:rPr lang="sr-Latn-RS" sz="1600" i="1">
+                                    <a:rPr lang="sr-Latn-RS" sz="2000" i="1">
                                       <a:solidFill>
                                         <a:schemeClr val="accent2"/>
                                       </a:solidFill>
@@ -7193,7 +7214,7 @@
                                 </m:sSubPr>
                                 <m:e>
                                   <m:r>
-                                    <a:rPr lang="sr-Latn-RS" sz="1600" i="1">
+                                    <a:rPr lang="sr-Latn-RS" sz="2000" i="1">
                                       <a:solidFill>
                                         <a:schemeClr val="accent2"/>
                                       </a:solidFill>
@@ -7204,7 +7225,7 @@
                                 </m:e>
                                 <m:sub>
                                   <m:r>
-                                    <a:rPr lang="sr-Latn-RS" sz="1600" i="1">
+                                    <a:rPr lang="sr-Latn-RS" sz="2000" i="1">
                                       <a:solidFill>
                                         <a:schemeClr val="accent2"/>
                                       </a:solidFill>
@@ -7213,7 +7234,7 @@
                                     <m:t>𝑚</m:t>
                                   </m:r>
                                   <m:r>
-                                    <a:rPr lang="sr-Latn-RS" sz="1600" i="0">
+                                    <a:rPr lang="sr-Latn-RS" sz="2000" i="0">
                                       <a:solidFill>
                                         <a:schemeClr val="accent2"/>
                                       </a:solidFill>
@@ -7226,7 +7247,7 @@
                               <m:d>
                                 <m:dPr>
                                   <m:ctrlPr>
-                                    <a:rPr lang="sr-Latn-RS" sz="1600" i="1">
+                                    <a:rPr lang="sr-Latn-RS" sz="2000" i="1">
                                       <a:solidFill>
                                         <a:schemeClr val="accent2"/>
                                       </a:solidFill>
@@ -7238,7 +7259,7 @@
                                   <m:sSub>
                                     <m:sSubPr>
                                       <m:ctrlPr>
-                                        <a:rPr lang="sr-Latn-RS" sz="1600" i="1">
+                                        <a:rPr lang="sr-Latn-RS" sz="2000" i="1">
                                           <a:solidFill>
                                             <a:schemeClr val="accent2"/>
                                           </a:solidFill>
@@ -7248,7 +7269,7 @@
                                     </m:sSubPr>
                                     <m:e>
                                       <m:r>
-                                        <a:rPr lang="sr-Latn-RS" sz="1600" i="1">
+                                        <a:rPr lang="sr-Latn-RS" sz="2000" i="1">
                                           <a:solidFill>
                                             <a:schemeClr val="accent2"/>
                                           </a:solidFill>
@@ -7259,7 +7280,7 @@
                                     </m:e>
                                     <m:sub>
                                       <m:r>
-                                        <a:rPr lang="sr-Latn-RS" sz="1600" i="1">
+                                        <a:rPr lang="sr-Latn-RS" sz="2000" i="1">
                                           <a:solidFill>
                                             <a:schemeClr val="accent2"/>
                                           </a:solidFill>
@@ -7272,7 +7293,7 @@
                                 </m:e>
                               </m:d>
                               <m:r>
-                                <a:rPr lang="sr-Latn-RS" sz="1600" i="0">
+                                <a:rPr lang="sr-Latn-RS" sz="2000" i="0">
                                   <a:solidFill>
                                     <a:schemeClr val="accent2"/>
                                   </a:solidFill>
@@ -7281,7 +7302,7 @@
                                 <m:t>+ </m:t>
                               </m:r>
                               <m:r>
-                                <a:rPr lang="sr-Latn-RS" sz="1600" i="1">
+                                <a:rPr lang="sr-Latn-RS" sz="2000" i="1">
                                   <a:solidFill>
                                     <a:schemeClr val="accent2"/>
                                   </a:solidFill>
@@ -7292,7 +7313,7 @@
                               <m:d>
                                 <m:dPr>
                                   <m:ctrlPr>
-                                    <a:rPr lang="sr-Latn-RS" sz="1600" i="1">
+                                    <a:rPr lang="sr-Latn-RS" sz="2000" i="1">
                                       <a:solidFill>
                                         <a:schemeClr val="accent2"/>
                                       </a:solidFill>
@@ -7304,7 +7325,7 @@
                                   <m:sSub>
                                     <m:sSubPr>
                                       <m:ctrlPr>
-                                        <a:rPr lang="sr-Latn-RS" sz="1600" i="1">
+                                        <a:rPr lang="sr-Latn-RS" sz="2000" i="1">
                                           <a:solidFill>
                                             <a:schemeClr val="accent2"/>
                                           </a:solidFill>
@@ -7314,7 +7335,7 @@
                                     </m:sSubPr>
                                     <m:e>
                                       <m:r>
-                                        <a:rPr lang="sr-Latn-RS" sz="1600" i="1">
+                                        <a:rPr lang="sr-Latn-RS" sz="2000" i="1">
                                           <a:solidFill>
                                             <a:schemeClr val="accent2"/>
                                           </a:solidFill>
@@ -7325,7 +7346,7 @@
                                     </m:e>
                                     <m:sub>
                                       <m:r>
-                                        <a:rPr lang="sr-Latn-RS" sz="1600" i="1">
+                                        <a:rPr lang="sr-Latn-RS" sz="2000" i="1">
                                           <a:solidFill>
                                             <a:schemeClr val="accent2"/>
                                           </a:solidFill>
@@ -7344,12 +7365,12 @@
                     </m:oMath>
                   </m:oMathPara>
                 </a14:m>
-                <a:endParaRPr lang="sr-Latn-RS" sz="1600" dirty="0"/>
+                <a:endParaRPr lang="sr-Latn-RS" sz="2000" dirty="0"/>
               </a:p>
             </p:txBody>
           </p:sp>
         </mc:Choice>
-        <mc:Fallback xmlns="">
+        <mc:Fallback>
           <p:sp>
             <p:nvSpPr>
               <p:cNvPr id="6" name="TextBox 5">
@@ -7366,8 +7387,8 @@
             </p:nvSpPr>
             <p:spPr>
               <a:xfrm>
-                <a:off x="301837" y="3133861"/>
-                <a:ext cx="5963202" cy="576055"/>
+                <a:off x="0" y="3113587"/>
+                <a:ext cx="6717990" cy="697114"/>
               </a:xfrm>
               <a:prstGeom prst="rect">
                 <a:avLst/>
@@ -7394,8 +7415,8 @@
           </p:sp>
         </mc:Fallback>
       </mc:AlternateContent>
-      <mc:AlternateContent xmlns:mc="http://schemas.openxmlformats.org/markup-compatibility/2006" xmlns:a14="http://schemas.microsoft.com/office/drawing/2010/main">
-        <mc:Choice Requires="a14">
+      <mc:AlternateContent xmlns:mc="http://schemas.openxmlformats.org/markup-compatibility/2006">
+        <mc:Choice xmlns:a14="http://schemas.microsoft.com/office/drawing/2010/main" Requires="a14">
           <p:sp>
             <p:nvSpPr>
               <p:cNvPr id="8" name="TextBox 7">
@@ -7410,8 +7431,8 @@
             </p:nvSpPr>
             <p:spPr>
               <a:xfrm>
-                <a:off x="976914" y="1789652"/>
-                <a:ext cx="4216523" cy="338554"/>
+                <a:off x="744219" y="1189665"/>
+                <a:ext cx="4216523" cy="461665"/>
               </a:xfrm>
               <a:prstGeom prst="rect">
                 <a:avLst/>
@@ -7434,7 +7455,7 @@
                       <m:sSub>
                         <m:sSubPr>
                           <m:ctrlPr>
-                            <a:rPr lang="sr-Latn-RS" sz="1600" i="1" smtClean="0">
+                            <a:rPr lang="sr-Latn-RS" sz="2400" i="1" smtClean="0">
                               <a:solidFill>
                                 <a:schemeClr val="accent2"/>
                               </a:solidFill>
@@ -7444,7 +7465,7 @@
                         </m:sSubPr>
                         <m:e>
                           <m:r>
-                            <a:rPr lang="sr-Latn-RS" sz="1600" i="1">
+                            <a:rPr lang="sr-Latn-RS" sz="2400" i="1">
                               <a:solidFill>
                                 <a:schemeClr val="accent2"/>
                               </a:solidFill>
@@ -7455,7 +7476,7 @@
                         </m:e>
                         <m:sub>
                           <m:r>
-                            <a:rPr lang="sr-Latn-RS" sz="1600" i="1">
+                            <a:rPr lang="sr-Latn-RS" sz="2400" i="1">
                               <a:solidFill>
                                 <a:schemeClr val="accent2"/>
                               </a:solidFill>
@@ -7468,7 +7489,7 @@
                       <m:d>
                         <m:dPr>
                           <m:ctrlPr>
-                            <a:rPr lang="sr-Latn-RS" sz="1600" i="1">
+                            <a:rPr lang="sr-Latn-RS" sz="2400" i="1">
                               <a:solidFill>
                                 <a:schemeClr val="accent2"/>
                               </a:solidFill>
@@ -7478,7 +7499,7 @@
                         </m:dPr>
                         <m:e>
                           <m:r>
-                            <a:rPr lang="sr-Latn-RS" sz="1600" i="1">
+                            <a:rPr lang="sr-Latn-RS" sz="2400" i="1">
                               <a:solidFill>
                                 <a:schemeClr val="accent2"/>
                               </a:solidFill>
@@ -7489,7 +7510,7 @@
                         </m:e>
                       </m:d>
                       <m:r>
-                        <a:rPr lang="sr-Latn-RS" sz="1600" i="0">
+                        <a:rPr lang="sr-Latn-RS" sz="2400" i="0">
                           <a:solidFill>
                             <a:schemeClr val="accent2"/>
                           </a:solidFill>
@@ -7500,7 +7521,7 @@
                       <m:sSub>
                         <m:sSubPr>
                           <m:ctrlPr>
-                            <a:rPr lang="sr-Latn-RS" sz="1600" i="1">
+                            <a:rPr lang="sr-Latn-RS" sz="2400" i="1">
                               <a:solidFill>
                                 <a:schemeClr val="accent2"/>
                               </a:solidFill>
@@ -7510,7 +7531,7 @@
                         </m:sSubPr>
                         <m:e>
                           <m:r>
-                            <a:rPr lang="sr-Latn-RS" sz="1600" i="1">
+                            <a:rPr lang="sr-Latn-RS" sz="2400" i="1">
                               <a:solidFill>
                                 <a:schemeClr val="accent2"/>
                               </a:solidFill>
@@ -7521,7 +7542,7 @@
                         </m:e>
                         <m:sub>
                           <m:r>
-                            <a:rPr lang="sr-Latn-RS" sz="1600" i="1">
+                            <a:rPr lang="sr-Latn-RS" sz="2400" i="1">
                               <a:solidFill>
                                 <a:schemeClr val="accent2"/>
                               </a:solidFill>
@@ -7530,7 +7551,7 @@
                             <m:t>𝑚</m:t>
                           </m:r>
                           <m:r>
-                            <a:rPr lang="sr-Latn-RS" sz="1600" i="0">
+                            <a:rPr lang="sr-Latn-RS" sz="2400" i="0">
                               <a:solidFill>
                                 <a:schemeClr val="accent2"/>
                               </a:solidFill>
@@ -7543,7 +7564,7 @@
                       <m:d>
                         <m:dPr>
                           <m:ctrlPr>
-                            <a:rPr lang="sr-Latn-RS" sz="1600" i="1">
+                            <a:rPr lang="sr-Latn-RS" sz="2400" i="1">
                               <a:solidFill>
                                 <a:schemeClr val="accent2"/>
                               </a:solidFill>
@@ -7553,7 +7574,7 @@
                         </m:dPr>
                         <m:e>
                           <m:r>
-                            <a:rPr lang="sr-Latn-RS" sz="1600" i="1">
+                            <a:rPr lang="sr-Latn-RS" sz="2400" i="1">
                               <a:solidFill>
                                 <a:schemeClr val="accent2"/>
                               </a:solidFill>
@@ -7564,7 +7585,7 @@
                         </m:e>
                       </m:d>
                       <m:r>
-                        <a:rPr lang="sr-Latn-RS" sz="1600" i="0">
+                        <a:rPr lang="sr-Latn-RS" sz="2400" i="0">
                           <a:solidFill>
                             <a:schemeClr val="accent2"/>
                           </a:solidFill>
@@ -7575,7 +7596,7 @@
                       <m:sSub>
                         <m:sSubPr>
                           <m:ctrlPr>
-                            <a:rPr lang="sr-Latn-RS" sz="1600" i="1">
+                            <a:rPr lang="sr-Latn-RS" sz="2400" i="1">
                               <a:solidFill>
                                 <a:schemeClr val="accent2"/>
                               </a:solidFill>
@@ -7588,7 +7609,7 @@
                             <m:rPr>
                               <m:sty m:val="p"/>
                             </m:rPr>
-                            <a:rPr lang="sr-Latn-RS" sz="1600" i="0">
+                            <a:rPr lang="sr-Latn-RS" sz="2400" i="0">
                               <a:solidFill>
                                 <a:schemeClr val="accent2"/>
                               </a:solidFill>
@@ -7599,7 +7620,7 @@
                         </m:e>
                         <m:sub>
                           <m:r>
-                            <a:rPr lang="sr-Latn-RS" sz="1600" i="1">
+                            <a:rPr lang="sr-Latn-RS" sz="2400" i="1">
                               <a:solidFill>
                                 <a:schemeClr val="accent2"/>
                               </a:solidFill>
@@ -7612,7 +7633,7 @@
                       <m:sSub>
                         <m:sSubPr>
                           <m:ctrlPr>
-                            <a:rPr lang="sr-Latn-RS" sz="1600" i="1">
+                            <a:rPr lang="sr-Latn-RS" sz="2400" i="1">
                               <a:solidFill>
                                 <a:schemeClr val="accent2"/>
                               </a:solidFill>
@@ -7622,7 +7643,7 @@
                         </m:sSubPr>
                         <m:e>
                           <m:r>
-                            <a:rPr lang="sr-Latn-RS" sz="1600" i="1">
+                            <a:rPr lang="sr-Latn-RS" sz="2400" i="1">
                               <a:solidFill>
                                 <a:schemeClr val="accent2"/>
                               </a:solidFill>
@@ -7633,7 +7654,7 @@
                         </m:e>
                         <m:sub>
                           <m:r>
-                            <a:rPr lang="sr-Latn-RS" sz="1600" i="1">
+                            <a:rPr lang="sr-Latn-RS" sz="2400" i="1">
                               <a:solidFill>
                                 <a:schemeClr val="accent2"/>
                               </a:solidFill>
@@ -7646,7 +7667,7 @@
                       <m:d>
                         <m:dPr>
                           <m:ctrlPr>
-                            <a:rPr lang="sr-Latn-RS" sz="1600" i="1">
+                            <a:rPr lang="sr-Latn-RS" sz="2400" i="1">
                               <a:solidFill>
                                 <a:schemeClr val="accent2"/>
                               </a:solidFill>
@@ -7656,7 +7677,7 @@
                         </m:dPr>
                         <m:e>
                           <m:r>
-                            <a:rPr lang="sr-Latn-RS" sz="1600" i="1">
+                            <a:rPr lang="sr-Latn-RS" sz="2400" i="1">
                               <a:solidFill>
                                 <a:schemeClr val="accent2"/>
                               </a:solidFill>
@@ -7669,12 +7690,12 @@
                     </m:oMath>
                   </m:oMathPara>
                 </a14:m>
-                <a:endParaRPr lang="sr-Latn-RS" sz="1600" dirty="0"/>
+                <a:endParaRPr lang="sr-Latn-RS" sz="2400" dirty="0"/>
               </a:p>
             </p:txBody>
           </p:sp>
         </mc:Choice>
-        <mc:Fallback xmlns="">
+        <mc:Fallback>
           <p:sp>
             <p:nvSpPr>
               <p:cNvPr id="8" name="TextBox 7">
@@ -7691,8 +7712,8 @@
             </p:nvSpPr>
             <p:spPr>
               <a:xfrm>
-                <a:off x="976914" y="1789652"/>
-                <a:ext cx="4216523" cy="338554"/>
+                <a:off x="744219" y="1189665"/>
+                <a:ext cx="4216523" cy="461665"/>
               </a:xfrm>
               <a:prstGeom prst="rect">
                 <a:avLst/>
@@ -7700,7 +7721,7 @@
               <a:blipFill>
                 <a:blip r:embed="rId6"/>
                 <a:stretch>
-                  <a:fillRect b="-1818"/>
+                  <a:fillRect b="-7895"/>
                 </a:stretch>
               </a:blipFill>
             </p:spPr>
@@ -7735,8 +7756,8 @@
         </p:nvCxnSpPr>
         <p:spPr>
           <a:xfrm>
-            <a:off x="2902998" y="2272689"/>
-            <a:ext cx="0" cy="719850"/>
+            <a:off x="2582487" y="1960775"/>
+            <a:ext cx="0" cy="1003483"/>
           </a:xfrm>
           <a:prstGeom prst="straightConnector1">
             <a:avLst/>
@@ -7785,8 +7806,8 @@
         </p:blipFill>
         <p:spPr>
           <a:xfrm>
-            <a:off x="6265039" y="1684790"/>
-            <a:ext cx="4814293" cy="2708040"/>
+            <a:off x="6598773" y="1189665"/>
+            <a:ext cx="5418500" cy="3047906"/>
           </a:xfrm>
           <a:prstGeom prst="rect">
             <a:avLst/>
@@ -7902,8 +7923,8 @@
         </p:blipFill>
         <p:spPr>
           <a:xfrm>
-            <a:off x="577048" y="2144919"/>
-            <a:ext cx="10465515" cy="1456121"/>
+            <a:off x="577048" y="2281287"/>
+            <a:ext cx="11458682" cy="1244339"/>
           </a:xfrm>
           <a:prstGeom prst="rect">
             <a:avLst/>
@@ -8006,7 +8027,7 @@
         </p:blipFill>
         <p:spPr>
           <a:xfrm>
-            <a:off x="5345633" y="3937511"/>
+            <a:off x="5483944" y="3971056"/>
             <a:ext cx="2908685" cy="1913237"/>
           </a:xfrm>
           <a:prstGeom prst="rect">
@@ -8111,7 +8132,7 @@
         </p:blipFill>
         <p:spPr>
           <a:xfrm>
-            <a:off x="4514955" y="1007252"/>
+            <a:off x="4687376" y="1007252"/>
             <a:ext cx="2908684" cy="2649277"/>
           </a:xfrm>
           <a:prstGeom prst="rect">
@@ -8181,7 +8202,7 @@
         </p:blipFill>
         <p:spPr>
           <a:xfrm>
-            <a:off x="287881" y="3879677"/>
+            <a:off x="489035" y="3869650"/>
             <a:ext cx="4613930" cy="2082504"/>
           </a:xfrm>
           <a:prstGeom prst="rect">
@@ -9735,7 +9756,7 @@
         <p:spPr>
           <a:xfrm>
             <a:off x="577049" y="1100831"/>
-            <a:ext cx="7910004" cy="2693045"/>
+            <a:ext cx="9980972" cy="3400931"/>
           </a:xfrm>
           <a:prstGeom prst="rect">
             <a:avLst/>
@@ -9765,30 +9786,64 @@
           <a:p>
             <a:pPr marL="285750" indent="-285750">
               <a:spcAft>
-                <a:spcPts val="1800"/>
+                <a:spcPts val="3000"/>
               </a:spcAft>
               <a:buFont typeface="Arial" panose="020B0604020202020204" pitchFamily="34" charset="0"/>
               <a:buChar char="•"/>
             </a:pPr>
             <a:r>
-              <a:rPr lang="sr-Latn-RS" sz="2000" dirty="0">
-                <a:solidFill>
-                  <a:schemeClr val="accent2"/>
-                </a:solidFill>
-              </a:rPr>
-              <a:t>Fakture.csv 							- </a:t>
-            </a:r>
-            <a:r>
-              <a:rPr lang="sr-Latn-RS" sz="2000" b="0" i="0" dirty="0">
+              <a:rPr lang="sr-Latn-RS" sz="2400" dirty="0">
+                <a:solidFill>
+                  <a:schemeClr val="accent2"/>
+                </a:solidFill>
+              </a:rPr>
+              <a:t>Fakture.csv 							</a:t>
+            </a:r>
+            <a:r>
+              <a:rPr lang="en-US" sz="2400" dirty="0">
+                <a:solidFill>
+                  <a:schemeClr val="accent2"/>
+                </a:solidFill>
+              </a:rPr>
+              <a:t>	</a:t>
+            </a:r>
+            <a:r>
+              <a:rPr lang="sr-Latn-RS" sz="2400" dirty="0">
+                <a:solidFill>
+                  <a:schemeClr val="accent2"/>
+                </a:solidFill>
+              </a:rPr>
+              <a:t>- </a:t>
+            </a:r>
+            <a:r>
+              <a:rPr lang="sr-Latn-RS" sz="2400" b="0" i="0" dirty="0">
                 <a:solidFill>
                   <a:schemeClr val="accent2"/>
                 </a:solidFill>
                 <a:effectLst/>
               </a:rPr>
-              <a:t>955 457 redova, 9 kolona</a:t>
-            </a:r>
-            <a:r>
-              <a:rPr lang="sr-Latn-RS" sz="2000" dirty="0">
+              <a:t>955 457 redova, </a:t>
+            </a:r>
+            <a:r>
+              <a:rPr lang="en-US" sz="2400" b="0" i="0" dirty="0">
+                <a:solidFill>
+                  <a:schemeClr val="accent2"/>
+                </a:solidFill>
+                <a:effectLst/>
+              </a:rPr>
+              <a:t>		</a:t>
+            </a:r>
+            <a:r>
+              <a:rPr lang="sr-Latn-RS" sz="2400" b="0" i="0" dirty="0">
+                <a:solidFill>
+                  <a:schemeClr val="accent2"/>
+                </a:solidFill>
+                <a:effectLst/>
+              </a:rPr>
+              <a:t>9 kolona</a:t>
+            </a:r>
+            <a:r>
+              <a:rPr lang="sr-Latn-RS" sz="2400" dirty="0">
                 <a:solidFill>
                   <a:schemeClr val="accent2"/>
                 </a:solidFill>
@@ -9799,13 +9854,13 @@
           <a:p>
             <a:pPr marL="285750" indent="-285750">
               <a:spcAft>
-                <a:spcPts val="1800"/>
+                <a:spcPts val="3000"/>
               </a:spcAft>
               <a:buFont typeface="Arial" panose="020B0604020202020204" pitchFamily="34" charset="0"/>
               <a:buChar char="•"/>
             </a:pPr>
             <a:r>
-              <a:rPr lang="sr-Latn-RS" sz="2000" dirty="0">
+              <a:rPr lang="sr-Latn-RS" sz="2400" dirty="0">
                 <a:solidFill>
                   <a:schemeClr val="accent2"/>
                 </a:solidFill>
@@ -9813,15 +9868,33 @@
               <a:t>FaktureProizvodi.csv					- </a:t>
             </a:r>
             <a:r>
-              <a:rPr lang="sr-Latn-RS" sz="2000" b="0" i="0" dirty="0">
+              <a:rPr lang="sr-Latn-RS" sz="2400" b="0" i="0" dirty="0">
                 <a:solidFill>
                   <a:schemeClr val="accent2"/>
                 </a:solidFill>
                 <a:effectLst/>
               </a:rPr>
-              <a:t>1 506 147 redova, 6 kolona</a:t>
-            </a:r>
-            <a:endParaRPr lang="sr-Latn-RS" sz="2000" dirty="0">
+              <a:t>1 506 147 redova, </a:t>
+            </a:r>
+            <a:r>
+              <a:rPr lang="en-US" sz="2400" b="0" i="0" dirty="0">
+                <a:solidFill>
+                  <a:schemeClr val="accent2"/>
+                </a:solidFill>
+                <a:effectLst/>
+              </a:rPr>
+              <a:t>	</a:t>
+            </a:r>
+            <a:r>
+              <a:rPr lang="sr-Latn-RS" sz="2400" b="0" i="0" dirty="0">
+                <a:solidFill>
+                  <a:schemeClr val="accent2"/>
+                </a:solidFill>
+                <a:effectLst/>
+              </a:rPr>
+              <a:t>6 kolona</a:t>
+            </a:r>
+            <a:endParaRPr lang="sr-Latn-RS" sz="2400" dirty="0">
               <a:solidFill>
                 <a:schemeClr val="accent2"/>
               </a:solidFill>
@@ -9830,35 +9903,67 @@
           <a:p>
             <a:pPr marL="285750" indent="-285750">
               <a:spcAft>
-                <a:spcPts val="1800"/>
+                <a:spcPts val="3000"/>
               </a:spcAft>
               <a:buFont typeface="Arial" panose="020B0604020202020204" pitchFamily="34" charset="0"/>
               <a:buChar char="•"/>
             </a:pPr>
             <a:r>
-              <a:rPr lang="sr-Latn-RS" sz="2000" dirty="0">
-                <a:solidFill>
-                  <a:schemeClr val="accent2"/>
-                </a:solidFill>
-              </a:rPr>
-              <a:t>Kupci.csv								- 2 299 redova, 4 kolone</a:t>
+              <a:rPr lang="sr-Latn-RS" sz="2400" dirty="0">
+                <a:solidFill>
+                  <a:schemeClr val="accent2"/>
+                </a:solidFill>
+              </a:rPr>
+              <a:t>Kupci.csv								- 2 299 redova, </a:t>
+            </a:r>
+            <a:r>
+              <a:rPr lang="en-US" sz="2400" dirty="0">
+                <a:solidFill>
+                  <a:schemeClr val="accent2"/>
+                </a:solidFill>
+              </a:rPr>
+              <a:t>		</a:t>
+            </a:r>
+            <a:r>
+              <a:rPr lang="sr-Latn-RS" sz="2400" dirty="0">
+                <a:solidFill>
+                  <a:schemeClr val="accent2"/>
+                </a:solidFill>
+              </a:rPr>
+              <a:t>4 kolone</a:t>
             </a:r>
           </a:p>
           <a:p>
             <a:pPr marL="285750" indent="-285750">
               <a:spcAft>
-                <a:spcPts val="1800"/>
+                <a:spcPts val="3000"/>
               </a:spcAft>
               <a:buFont typeface="Arial" panose="020B0604020202020204" pitchFamily="34" charset="0"/>
               <a:buChar char="•"/>
             </a:pPr>
             <a:r>
-              <a:rPr lang="sr-Latn-RS" sz="2000" dirty="0">
-                <a:solidFill>
-                  <a:schemeClr val="accent2"/>
-                </a:solidFill>
-              </a:rPr>
-              <a:t>Finansijska i vlasnička struktura.csv		- 8 082 redova, 644 kolone</a:t>
+              <a:rPr lang="sr-Latn-RS" sz="2400" dirty="0">
+                <a:solidFill>
+                  <a:schemeClr val="accent2"/>
+                </a:solidFill>
+              </a:rPr>
+              <a:t>Finansijska i vlasnička struktura.csv	- 8 082 redova, </a:t>
+            </a:r>
+            <a:r>
+              <a:rPr lang="en-US" sz="2400" dirty="0">
+                <a:solidFill>
+                  <a:schemeClr val="accent2"/>
+                </a:solidFill>
+              </a:rPr>
+              <a:t>		</a:t>
+            </a:r>
+            <a:r>
+              <a:rPr lang="sr-Latn-RS" sz="2400" dirty="0">
+                <a:solidFill>
+                  <a:schemeClr val="accent2"/>
+                </a:solidFill>
+              </a:rPr>
+              <a:t>644 kolone</a:t>
             </a:r>
           </a:p>
         </p:txBody>
@@ -9942,7 +10047,7 @@
       </p:sp>
       <p:pic>
         <p:nvPicPr>
-          <p:cNvPr id="5" name="Picture 4">
+          <p:cNvPr id="29" name="Picture 28">
             <a:extLst>
               <a:ext uri="{FF2B5EF4-FFF2-40B4-BE49-F238E27FC236}">
                 <a16:creationId xmlns:a16="http://schemas.microsoft.com/office/drawing/2014/main" id="{B2681883-5E14-4BE7-B900-49D2CC78F986}"/>
@@ -9962,8 +10067,8 @@
         </p:blipFill>
         <p:spPr>
           <a:xfrm>
-            <a:off x="758973" y="1171853"/>
-            <a:ext cx="3946191" cy="1152926"/>
+            <a:off x="676030" y="893105"/>
+            <a:ext cx="4926551" cy="1439350"/>
           </a:xfrm>
           <a:prstGeom prst="rect">
             <a:avLst/>
@@ -9977,7 +10082,7 @@
       </p:pic>
       <p:pic>
         <p:nvPicPr>
-          <p:cNvPr id="8" name="Picture 7">
+          <p:cNvPr id="31" name="Picture 30">
             <a:extLst>
               <a:ext uri="{FF2B5EF4-FFF2-40B4-BE49-F238E27FC236}">
                 <a16:creationId xmlns:a16="http://schemas.microsoft.com/office/drawing/2014/main" id="{7852896F-5238-4FA3-B0E5-66A7DE831FB3}"/>
@@ -9997,8 +10102,8 @@
         </p:blipFill>
         <p:spPr>
           <a:xfrm>
-            <a:off x="758973" y="2648528"/>
-            <a:ext cx="5220310" cy="689476"/>
+            <a:off x="676030" y="2544428"/>
+            <a:ext cx="6317322" cy="834364"/>
           </a:xfrm>
           <a:prstGeom prst="rect">
             <a:avLst/>
@@ -10012,7 +10117,7 @@
       </p:pic>
       <p:pic>
         <p:nvPicPr>
-          <p:cNvPr id="11" name="Picture 10">
+          <p:cNvPr id="33" name="Picture 32">
             <a:extLst>
               <a:ext uri="{FF2B5EF4-FFF2-40B4-BE49-F238E27FC236}">
                 <a16:creationId xmlns:a16="http://schemas.microsoft.com/office/drawing/2014/main" id="{DD66CA8F-8753-45FE-993D-244898FCB1B9}"/>
@@ -10032,8 +10137,8 @@
         </p:blipFill>
         <p:spPr>
           <a:xfrm>
-            <a:off x="758972" y="3737353"/>
-            <a:ext cx="6955283" cy="584775"/>
+            <a:off x="676030" y="3590765"/>
+            <a:ext cx="9923869" cy="834363"/>
           </a:xfrm>
           <a:prstGeom prst="rect">
             <a:avLst/>
@@ -10047,7 +10152,7 @@
       </p:pic>
       <p:pic>
         <p:nvPicPr>
-          <p:cNvPr id="14" name="Picture 13">
+          <p:cNvPr id="35" name="Picture 34">
             <a:extLst>
               <a:ext uri="{FF2B5EF4-FFF2-40B4-BE49-F238E27FC236}">
                 <a16:creationId xmlns:a16="http://schemas.microsoft.com/office/drawing/2014/main" id="{2FA8F111-580D-49B3-B9D1-D740312F9909}"/>
@@ -10067,8 +10172,8 @@
         </p:blipFill>
         <p:spPr>
           <a:xfrm>
-            <a:off x="758972" y="4693526"/>
-            <a:ext cx="4141502" cy="1048371"/>
+            <a:off x="676030" y="4642609"/>
+            <a:ext cx="5642188" cy="1428252"/>
           </a:xfrm>
           <a:prstGeom prst="rect">
             <a:avLst/>
@@ -10171,8 +10276,8 @@
         </p:blipFill>
         <p:spPr>
           <a:xfrm>
-            <a:off x="769077" y="896718"/>
-            <a:ext cx="9006519" cy="4621848"/>
+            <a:off x="716047" y="769774"/>
+            <a:ext cx="10363979" cy="5318452"/>
           </a:xfrm>
           <a:prstGeom prst="rect">
             <a:avLst/>
@@ -10645,8 +10750,8 @@
         </p:blipFill>
         <p:spPr>
           <a:xfrm>
-            <a:off x="680743" y="1557474"/>
-            <a:ext cx="8856384" cy="3238953"/>
+            <a:off x="577048" y="1246390"/>
+            <a:ext cx="11181195" cy="4089182"/>
           </a:xfrm>
           <a:prstGeom prst="rect">
             <a:avLst/>

</xml_diff>